<commit_message>
18/03/2019 at 13:42:12  Version 1.1 Github A  doc/arrow_measure_pptx.jpg A  doc/flow.jpg A  doc/freq_measure.JPG A  doc/freq_measure_pptx.JPG A  doc/freq_measure_pptx.png  M doc/images.pptx A  doc/lets_play.jpg A  doc/lets_play_pptx.jpg A  doc/menu_run.JPG A  doc/menu_stop.JPG A  doc/plot_stopped.JPG A  doc/plot_stopped_pptx.JPG A  doc/plotter_details.JPG A  doc/plotter_details_pptx.JPG A  doc/yasp_cover.JPG A  installer/yaclLib.zip A  installer/yaspLib.zip  M mainwindow.cpp  M mainwindow.hpp A  xml/dialTest.xml A  xml/test.xml A  xml/widgets.xml  M yasp.pro  M yaspLib/examples/plotTest/plotTest.ino AM yaspLib/examples/simple/simple.ino  M yaspLib/yasplib.cpp  M yaspLib/yasplib.h
</commit_message>
<xml_diff>
--- a/doc/images.pptx
+++ b/doc/images.pptx
@@ -12,7 +12,10 @@
     <p:sldId id="260" r:id="rId6"/>
     <p:sldId id="261" r:id="rId7"/>
     <p:sldId id="262" r:id="rId8"/>
-    <p:sldId id="263" r:id="rId9"/>
+    <p:sldId id="264" r:id="rId9"/>
+    <p:sldId id="263" r:id="rId10"/>
+    <p:sldId id="265" r:id="rId11"/>
+    <p:sldId id="266" r:id="rId12"/>
   </p:sldIdLst>
   <p:sldSz cx="12192000" cy="6858000"/>
   <p:notesSz cx="6858000" cy="9144000"/>
@@ -111,6 +114,11 @@
       </a:defRPr>
     </a:lvl9pPr>
   </p:defaultTextStyle>
+  <p:extLst>
+    <p:ext uri="{EFAFB233-063F-42B5-8137-9DF3F51BA10A}">
+      <p15:sldGuideLst xmlns:p15="http://schemas.microsoft.com/office/powerpoint/2012/main"/>
+    </p:ext>
+  </p:extLst>
 </p:presentation>
 </file>
 
@@ -245,7 +253,7 @@
           <a:p>
             <a:fld id="{9A2D6F07-9B14-4B65-97D8-EE305D3D2280}" type="datetimeFigureOut">
               <a:rPr lang="fr-FR" smtClean="0"/>
-              <a:t>06/03/2019</a:t>
+              <a:t>18/03/2019</a:t>
             </a:fld>
             <a:endParaRPr lang="fr-FR"/>
           </a:p>
@@ -415,7 +423,7 @@
           <a:p>
             <a:fld id="{9A2D6F07-9B14-4B65-97D8-EE305D3D2280}" type="datetimeFigureOut">
               <a:rPr lang="fr-FR" smtClean="0"/>
-              <a:t>06/03/2019</a:t>
+              <a:t>18/03/2019</a:t>
             </a:fld>
             <a:endParaRPr lang="fr-FR"/>
           </a:p>
@@ -595,7 +603,7 @@
           <a:p>
             <a:fld id="{9A2D6F07-9B14-4B65-97D8-EE305D3D2280}" type="datetimeFigureOut">
               <a:rPr lang="fr-FR" smtClean="0"/>
-              <a:t>06/03/2019</a:t>
+              <a:t>18/03/2019</a:t>
             </a:fld>
             <a:endParaRPr lang="fr-FR"/>
           </a:p>
@@ -765,7 +773,7 @@
           <a:p>
             <a:fld id="{9A2D6F07-9B14-4B65-97D8-EE305D3D2280}" type="datetimeFigureOut">
               <a:rPr lang="fr-FR" smtClean="0"/>
-              <a:t>06/03/2019</a:t>
+              <a:t>18/03/2019</a:t>
             </a:fld>
             <a:endParaRPr lang="fr-FR"/>
           </a:p>
@@ -1011,7 +1019,7 @@
           <a:p>
             <a:fld id="{9A2D6F07-9B14-4B65-97D8-EE305D3D2280}" type="datetimeFigureOut">
               <a:rPr lang="fr-FR" smtClean="0"/>
-              <a:t>06/03/2019</a:t>
+              <a:t>18/03/2019</a:t>
             </a:fld>
             <a:endParaRPr lang="fr-FR"/>
           </a:p>
@@ -1243,7 +1251,7 @@
           <a:p>
             <a:fld id="{9A2D6F07-9B14-4B65-97D8-EE305D3D2280}" type="datetimeFigureOut">
               <a:rPr lang="fr-FR" smtClean="0"/>
-              <a:t>06/03/2019</a:t>
+              <a:t>18/03/2019</a:t>
             </a:fld>
             <a:endParaRPr lang="fr-FR"/>
           </a:p>
@@ -1610,7 +1618,7 @@
           <a:p>
             <a:fld id="{9A2D6F07-9B14-4B65-97D8-EE305D3D2280}" type="datetimeFigureOut">
               <a:rPr lang="fr-FR" smtClean="0"/>
-              <a:t>06/03/2019</a:t>
+              <a:t>18/03/2019</a:t>
             </a:fld>
             <a:endParaRPr lang="fr-FR"/>
           </a:p>
@@ -1728,7 +1736,7 @@
           <a:p>
             <a:fld id="{9A2D6F07-9B14-4B65-97D8-EE305D3D2280}" type="datetimeFigureOut">
               <a:rPr lang="fr-FR" smtClean="0"/>
-              <a:t>06/03/2019</a:t>
+              <a:t>18/03/2019</a:t>
             </a:fld>
             <a:endParaRPr lang="fr-FR"/>
           </a:p>
@@ -1823,7 +1831,7 @@
           <a:p>
             <a:fld id="{9A2D6F07-9B14-4B65-97D8-EE305D3D2280}" type="datetimeFigureOut">
               <a:rPr lang="fr-FR" smtClean="0"/>
-              <a:t>06/03/2019</a:t>
+              <a:t>18/03/2019</a:t>
             </a:fld>
             <a:endParaRPr lang="fr-FR"/>
           </a:p>
@@ -2100,7 +2108,7 @@
           <a:p>
             <a:fld id="{9A2D6F07-9B14-4B65-97D8-EE305D3D2280}" type="datetimeFigureOut">
               <a:rPr lang="fr-FR" smtClean="0"/>
-              <a:t>06/03/2019</a:t>
+              <a:t>18/03/2019</a:t>
             </a:fld>
             <a:endParaRPr lang="fr-FR"/>
           </a:p>
@@ -2353,7 +2361,7 @@
           <a:p>
             <a:fld id="{9A2D6F07-9B14-4B65-97D8-EE305D3D2280}" type="datetimeFigureOut">
               <a:rPr lang="fr-FR" smtClean="0"/>
-              <a:t>06/03/2019</a:t>
+              <a:t>18/03/2019</a:t>
             </a:fld>
             <a:endParaRPr lang="fr-FR"/>
           </a:p>
@@ -2566,7 +2574,7 @@
           <a:p>
             <a:fld id="{9A2D6F07-9B14-4B65-97D8-EE305D3D2280}" type="datetimeFigureOut">
               <a:rPr lang="fr-FR" smtClean="0"/>
-              <a:t>06/03/2019</a:t>
+              <a:t>18/03/2019</a:t>
             </a:fld>
             <a:endParaRPr lang="fr-FR"/>
           </a:p>
@@ -3160,13 +3168,13 @@
         </p:nvSpPr>
         <p:spPr>
           <a:xfrm>
-            <a:off x="106471" y="4231363"/>
+            <a:off x="106471" y="4845054"/>
             <a:ext cx="1597069" cy="538619"/>
           </a:xfrm>
           <a:prstGeom prst="wedgeRoundRectCallout">
             <a:avLst>
-              <a:gd name="adj1" fmla="val 73202"/>
-              <a:gd name="adj2" fmla="val 87234"/>
+              <a:gd name="adj1" fmla="val 71665"/>
+              <a:gd name="adj2" fmla="val -85952"/>
               <a:gd name="adj3" fmla="val 16667"/>
             </a:avLst>
           </a:prstGeom>
@@ -3213,10 +3221,2946 @@
           </a:p>
         </p:txBody>
       </p:sp>
+      <p:sp>
+        <p:nvSpPr>
+          <p:cNvPr id="2" name="Rectangle 1"/>
+          <p:cNvSpPr/>
+          <p:nvPr/>
+        </p:nvSpPr>
+        <p:spPr>
+          <a:xfrm>
+            <a:off x="8182303" y="1371600"/>
+            <a:ext cx="1277007" cy="341586"/>
+          </a:xfrm>
+          <a:prstGeom prst="rect">
+            <a:avLst/>
+          </a:prstGeom>
+          <a:solidFill>
+            <a:srgbClr val="EEF5FB"/>
+          </a:solidFill>
+          <a:ln>
+            <a:noFill/>
+          </a:ln>
+        </p:spPr>
+        <p:style>
+          <a:lnRef idx="2">
+            <a:schemeClr val="accent1">
+              <a:shade val="50000"/>
+            </a:schemeClr>
+          </a:lnRef>
+          <a:fillRef idx="1">
+            <a:schemeClr val="accent1"/>
+          </a:fillRef>
+          <a:effectRef idx="0">
+            <a:schemeClr val="accent1"/>
+          </a:effectRef>
+          <a:fontRef idx="minor">
+            <a:schemeClr val="lt1"/>
+          </a:fontRef>
+        </p:style>
+        <p:txBody>
+          <a:bodyPr rtlCol="0" anchor="ctr"/>
+          <a:lstStyle/>
+          <a:p>
+            <a:pPr algn="ctr"/>
+            <a:endParaRPr lang="fr-FR"/>
+          </a:p>
+        </p:txBody>
+      </p:sp>
+      <p:sp>
+        <p:nvSpPr>
+          <p:cNvPr id="3" name="Rounded Rectangular Callout 2"/>
+          <p:cNvSpPr/>
+          <p:nvPr/>
+        </p:nvSpPr>
+        <p:spPr>
+          <a:xfrm>
+            <a:off x="447805" y="3583378"/>
+            <a:ext cx="914400" cy="581526"/>
+          </a:xfrm>
+          <a:prstGeom prst="wedgeRoundRectCallout">
+            <a:avLst>
+              <a:gd name="adj1" fmla="val 233495"/>
+              <a:gd name="adj2" fmla="val 31720"/>
+              <a:gd name="adj3" fmla="val 16667"/>
+            </a:avLst>
+          </a:prstGeom>
+          <a:solidFill>
+            <a:srgbClr val="92F59F">
+              <a:alpha val="20000"/>
+            </a:srgbClr>
+          </a:solidFill>
+        </p:spPr>
+        <p:style>
+          <a:lnRef idx="2">
+            <a:schemeClr val="accent1">
+              <a:shade val="50000"/>
+            </a:schemeClr>
+          </a:lnRef>
+          <a:fillRef idx="1">
+            <a:schemeClr val="accent1"/>
+          </a:fillRef>
+          <a:effectRef idx="0">
+            <a:schemeClr val="accent1"/>
+          </a:effectRef>
+          <a:fontRef idx="minor">
+            <a:schemeClr val="lt1"/>
+          </a:fontRef>
+        </p:style>
+        <p:txBody>
+          <a:bodyPr rtlCol="0" anchor="ctr"/>
+          <a:lstStyle/>
+          <a:p>
+            <a:pPr algn="ctr"/>
+            <a:r>
+              <a:rPr lang="en-US" sz="1400" b="1" dirty="0" smtClean="0">
+                <a:solidFill>
+                  <a:schemeClr val="tx1"/>
+                </a:solidFill>
+              </a:rPr>
+              <a:t>Splitter</a:t>
+            </a:r>
+          </a:p>
+          <a:p>
+            <a:pPr algn="ctr"/>
+            <a:r>
+              <a:rPr lang="en-US" sz="1400" b="1" dirty="0" smtClean="0">
+                <a:solidFill>
+                  <a:schemeClr val="tx1"/>
+                </a:solidFill>
+              </a:rPr>
+              <a:t>Line</a:t>
+            </a:r>
+            <a:endParaRPr lang="en-US" sz="1400" b="1" dirty="0">
+              <a:solidFill>
+                <a:schemeClr val="tx1"/>
+              </a:solidFill>
+            </a:endParaRPr>
+          </a:p>
+        </p:txBody>
+      </p:sp>
     </p:spTree>
     <p:extLst>
       <p:ext uri="{BB962C8B-B14F-4D97-AF65-F5344CB8AC3E}">
         <p14:creationId xmlns:p14="http://schemas.microsoft.com/office/powerpoint/2010/main" val="1707535782"/>
+      </p:ext>
+    </p:extLst>
+  </p:cSld>
+  <p:clrMapOvr>
+    <a:masterClrMapping/>
+  </p:clrMapOvr>
+  <p:timing>
+    <p:tnLst>
+      <p:par>
+        <p:cTn id="1" dur="indefinite" restart="never" nodeType="tmRoot"/>
+      </p:par>
+    </p:tnLst>
+  </p:timing>
+</p:sld>
+</file>
+
+<file path=ppt/slides/slide10.xml><?xml version="1.0" encoding="utf-8"?>
+<p:sld xmlns:a="http://schemas.openxmlformats.org/drawingml/2006/main" xmlns:r="http://schemas.openxmlformats.org/officeDocument/2006/relationships" xmlns:p="http://schemas.openxmlformats.org/presentationml/2006/main">
+  <p:cSld>
+    <p:spTree>
+      <p:nvGrpSpPr>
+        <p:cNvPr id="1" name=""/>
+        <p:cNvGrpSpPr/>
+        <p:nvPr/>
+      </p:nvGrpSpPr>
+      <p:grpSpPr>
+        <a:xfrm>
+          <a:off x="0" y="0"/>
+          <a:ext cx="0" cy="0"/>
+          <a:chOff x="0" y="0"/>
+          <a:chExt cx="0" cy="0"/>
+        </a:xfrm>
+      </p:grpSpPr>
+      <p:sp>
+        <p:nvSpPr>
+          <p:cNvPr id="20" name="TextBox 19"/>
+          <p:cNvSpPr txBox="1"/>
+          <p:nvPr/>
+        </p:nvSpPr>
+        <p:spPr>
+          <a:xfrm>
+            <a:off x="2246110" y="1485645"/>
+            <a:ext cx="9211506" cy="4939703"/>
+          </a:xfrm>
+          <a:prstGeom prst="rect">
+            <a:avLst/>
+          </a:prstGeom>
+          <a:noFill/>
+          <a:ln>
+            <a:solidFill>
+              <a:schemeClr val="accent1">
+                <a:shade val="50000"/>
+              </a:schemeClr>
+            </a:solidFill>
+          </a:ln>
+        </p:spPr>
+        <p:txBody>
+          <a:bodyPr wrap="square" rtlCol="0">
+            <a:noAutofit/>
+          </a:bodyPr>
+          <a:lstStyle/>
+          <a:p>
+            <a:r>
+              <a:rPr lang="en-US" sz="1400" b="1" dirty="0" smtClean="0"/>
+              <a:t>One Plot Selected</a:t>
+            </a:r>
+          </a:p>
+          <a:p>
+            <a:pPr algn="ctr"/>
+            <a:endParaRPr lang="en-US" sz="1400" b="1" dirty="0"/>
+          </a:p>
+        </p:txBody>
+      </p:sp>
+      <p:sp>
+        <p:nvSpPr>
+          <p:cNvPr id="19" name="TextBox 18"/>
+          <p:cNvSpPr txBox="1"/>
+          <p:nvPr/>
+        </p:nvSpPr>
+        <p:spPr>
+          <a:xfrm>
+            <a:off x="4478923" y="272610"/>
+            <a:ext cx="3430534" cy="991595"/>
+          </a:xfrm>
+          <a:prstGeom prst="rect">
+            <a:avLst/>
+          </a:prstGeom>
+          <a:noFill/>
+          <a:ln>
+            <a:solidFill>
+              <a:schemeClr val="accent1">
+                <a:shade val="50000"/>
+              </a:schemeClr>
+            </a:solidFill>
+          </a:ln>
+        </p:spPr>
+        <p:txBody>
+          <a:bodyPr wrap="square" rtlCol="0">
+            <a:noAutofit/>
+          </a:bodyPr>
+          <a:lstStyle/>
+          <a:p>
+            <a:r>
+              <a:rPr lang="en-US" sz="1400" b="1" dirty="0" smtClean="0"/>
+              <a:t>No Plot Selected</a:t>
+            </a:r>
+          </a:p>
+          <a:p>
+            <a:pPr algn="ctr"/>
+            <a:endParaRPr lang="en-US" sz="1400" b="1" dirty="0"/>
+          </a:p>
+        </p:txBody>
+      </p:sp>
+      <p:sp>
+        <p:nvSpPr>
+          <p:cNvPr id="12" name="Rounded Rectangle 11"/>
+          <p:cNvSpPr/>
+          <p:nvPr/>
+        </p:nvSpPr>
+        <p:spPr>
+          <a:xfrm>
+            <a:off x="1245793" y="840757"/>
+            <a:ext cx="2368850" cy="312983"/>
+          </a:xfrm>
+          <a:prstGeom prst="roundRect">
+            <a:avLst/>
+          </a:prstGeom>
+        </p:spPr>
+        <p:style>
+          <a:lnRef idx="2">
+            <a:schemeClr val="accent1"/>
+          </a:lnRef>
+          <a:fillRef idx="1">
+            <a:schemeClr val="lt1"/>
+          </a:fillRef>
+          <a:effectRef idx="0">
+            <a:schemeClr val="accent1"/>
+          </a:effectRef>
+          <a:fontRef idx="minor">
+            <a:schemeClr val="dk1"/>
+          </a:fontRef>
+        </p:style>
+        <p:txBody>
+          <a:bodyPr rtlCol="0" anchor="ctr"/>
+          <a:lstStyle/>
+          <a:p>
+            <a:pPr lvl="0" algn="ctr"/>
+            <a:r>
+              <a:rPr lang="en-US" sz="1400" b="1" dirty="0">
+                <a:solidFill>
+                  <a:prstClr val="black"/>
+                </a:solidFill>
+              </a:rPr>
+              <a:t>No Plot Selected</a:t>
+            </a:r>
+            <a:endParaRPr lang="en-US" sz="1400" b="1" dirty="0">
+              <a:solidFill>
+                <a:prstClr val="black"/>
+              </a:solidFill>
+            </a:endParaRPr>
+          </a:p>
+        </p:txBody>
+      </p:sp>
+      <p:sp>
+        <p:nvSpPr>
+          <p:cNvPr id="13" name="Flowchart: Manual Input 12"/>
+          <p:cNvSpPr/>
+          <p:nvPr/>
+        </p:nvSpPr>
+        <p:spPr>
+          <a:xfrm>
+            <a:off x="5107956" y="606020"/>
+            <a:ext cx="2172467" cy="469474"/>
+          </a:xfrm>
+          <a:prstGeom prst="flowChartManualInput">
+            <a:avLst/>
+          </a:prstGeom>
+        </p:spPr>
+        <p:style>
+          <a:lnRef idx="2">
+            <a:schemeClr val="accent1"/>
+          </a:lnRef>
+          <a:fillRef idx="1">
+            <a:schemeClr val="lt1"/>
+          </a:fillRef>
+          <a:effectRef idx="0">
+            <a:schemeClr val="accent1"/>
+          </a:effectRef>
+          <a:fontRef idx="minor">
+            <a:schemeClr val="dk1"/>
+          </a:fontRef>
+        </p:style>
+        <p:txBody>
+          <a:bodyPr rtlCol="0" anchor="ctr"/>
+          <a:lstStyle/>
+          <a:p>
+            <a:pPr lvl="0" algn="ctr"/>
+            <a:r>
+              <a:rPr lang="en-US" sz="1400" b="1">
+                <a:solidFill>
+                  <a:prstClr val="black"/>
+                </a:solidFill>
+              </a:rPr>
+              <a:t>Click on a Plot Info Line</a:t>
+            </a:r>
+            <a:endParaRPr lang="en-US" sz="1400" b="1" dirty="0">
+              <a:solidFill>
+                <a:prstClr val="black"/>
+              </a:solidFill>
+            </a:endParaRPr>
+          </a:p>
+        </p:txBody>
+      </p:sp>
+      <p:sp>
+        <p:nvSpPr>
+          <p:cNvPr id="14" name="Flowchart: Decision 13"/>
+          <p:cNvSpPr/>
+          <p:nvPr/>
+        </p:nvSpPr>
+        <p:spPr>
+          <a:xfrm>
+            <a:off x="6265773" y="1679992"/>
+            <a:ext cx="2839347" cy="612648"/>
+          </a:xfrm>
+          <a:prstGeom prst="flowChartDecision">
+            <a:avLst/>
+          </a:prstGeom>
+        </p:spPr>
+        <p:style>
+          <a:lnRef idx="2">
+            <a:schemeClr val="accent1"/>
+          </a:lnRef>
+          <a:fillRef idx="1">
+            <a:schemeClr val="lt1"/>
+          </a:fillRef>
+          <a:effectRef idx="0">
+            <a:schemeClr val="accent1"/>
+          </a:effectRef>
+          <a:fontRef idx="minor">
+            <a:schemeClr val="dk1"/>
+          </a:fontRef>
+        </p:style>
+        <p:txBody>
+          <a:bodyPr rtlCol="0" anchor="ctr"/>
+          <a:lstStyle/>
+          <a:p>
+            <a:pPr algn="ctr"/>
+            <a:r>
+              <a:rPr lang="en-US" sz="1400" b="1" dirty="0" smtClean="0"/>
+              <a:t>Plotting Stopped</a:t>
+            </a:r>
+            <a:endParaRPr lang="en-US" sz="1400" b="1" dirty="0"/>
+          </a:p>
+        </p:txBody>
+      </p:sp>
+      <p:sp>
+        <p:nvSpPr>
+          <p:cNvPr id="21" name="Flowchart: Alternate Process 20"/>
+          <p:cNvSpPr/>
+          <p:nvPr/>
+        </p:nvSpPr>
+        <p:spPr>
+          <a:xfrm>
+            <a:off x="2534545" y="1863587"/>
+            <a:ext cx="914400" cy="478657"/>
+          </a:xfrm>
+          <a:prstGeom prst="flowChartAlternateProcess">
+            <a:avLst/>
+          </a:prstGeom>
+        </p:spPr>
+        <p:style>
+          <a:lnRef idx="2">
+            <a:schemeClr val="accent1"/>
+          </a:lnRef>
+          <a:fillRef idx="1">
+            <a:schemeClr val="lt1"/>
+          </a:fillRef>
+          <a:effectRef idx="0">
+            <a:schemeClr val="accent1"/>
+          </a:effectRef>
+          <a:fontRef idx="minor">
+            <a:schemeClr val="dk1"/>
+          </a:fontRef>
+        </p:style>
+        <p:txBody>
+          <a:bodyPr rtlCol="0" anchor="ctr"/>
+          <a:lstStyle/>
+          <a:p>
+            <a:pPr lvl="0" algn="ctr"/>
+            <a:r>
+              <a:rPr lang="en-US" sz="1400" b="1">
+                <a:solidFill>
+                  <a:prstClr val="black"/>
+                </a:solidFill>
+              </a:rPr>
+              <a:t>ESC Key</a:t>
+            </a:r>
+            <a:endParaRPr lang="en-US" sz="1400" b="1" dirty="0">
+              <a:solidFill>
+                <a:prstClr val="black"/>
+              </a:solidFill>
+            </a:endParaRPr>
+          </a:p>
+        </p:txBody>
+      </p:sp>
+      <p:pic>
+        <p:nvPicPr>
+          <p:cNvPr id="22" name="Picture 21"/>
+          <p:cNvPicPr>
+            <a:picLocks noChangeAspect="1"/>
+          </p:cNvPicPr>
+          <p:nvPr/>
+        </p:nvPicPr>
+        <p:blipFill>
+          <a:blip r:embed="rId2" cstate="print">
+            <a:extLst>
+              <a:ext uri="{28A0092B-C50C-407E-A947-70E740481C1C}">
+                <a14:useLocalDpi xmlns:a14="http://schemas.microsoft.com/office/drawing/2010/main" val="0"/>
+              </a:ext>
+            </a:extLst>
+          </a:blip>
+          <a:stretch>
+            <a:fillRect/>
+          </a:stretch>
+        </p:blipFill>
+        <p:spPr>
+          <a:xfrm>
+            <a:off x="4510877" y="1843840"/>
+            <a:ext cx="1402897" cy="1334277"/>
+          </a:xfrm>
+          <a:prstGeom prst="rect">
+            <a:avLst/>
+          </a:prstGeom>
+        </p:spPr>
+      </p:pic>
+      <p:pic>
+        <p:nvPicPr>
+          <p:cNvPr id="23" name="Picture 22"/>
+          <p:cNvPicPr>
+            <a:picLocks noChangeAspect="1"/>
+          </p:cNvPicPr>
+          <p:nvPr/>
+        </p:nvPicPr>
+        <p:blipFill>
+          <a:blip r:embed="rId3">
+            <a:extLst>
+              <a:ext uri="{28A0092B-C50C-407E-A947-70E740481C1C}">
+                <a14:useLocalDpi xmlns:a14="http://schemas.microsoft.com/office/drawing/2010/main" val="0"/>
+              </a:ext>
+            </a:extLst>
+          </a:blip>
+          <a:stretch>
+            <a:fillRect/>
+          </a:stretch>
+        </p:blipFill>
+        <p:spPr>
+          <a:xfrm>
+            <a:off x="9494559" y="1843840"/>
+            <a:ext cx="1563397" cy="1896864"/>
+          </a:xfrm>
+          <a:prstGeom prst="rect">
+            <a:avLst/>
+          </a:prstGeom>
+        </p:spPr>
+      </p:pic>
+      <p:sp>
+        <p:nvSpPr>
+          <p:cNvPr id="24" name="TextBox 23"/>
+          <p:cNvSpPr txBox="1"/>
+          <p:nvPr/>
+        </p:nvSpPr>
+        <p:spPr>
+          <a:xfrm>
+            <a:off x="5368015" y="3918382"/>
+            <a:ext cx="5689941" cy="2068651"/>
+          </a:xfrm>
+          <a:prstGeom prst="rect">
+            <a:avLst/>
+          </a:prstGeom>
+          <a:noFill/>
+          <a:ln>
+            <a:solidFill>
+              <a:schemeClr val="accent1">
+                <a:shade val="50000"/>
+              </a:schemeClr>
+            </a:solidFill>
+          </a:ln>
+        </p:spPr>
+        <p:txBody>
+          <a:bodyPr wrap="square" rtlCol="0">
+            <a:noAutofit/>
+          </a:bodyPr>
+          <a:lstStyle/>
+          <a:p>
+            <a:r>
+              <a:rPr lang="en-US" sz="1400" b="1" dirty="0" smtClean="0"/>
+              <a:t>One Plot Selected</a:t>
+            </a:r>
+          </a:p>
+          <a:p>
+            <a:pPr algn="ctr"/>
+            <a:endParaRPr lang="en-US" sz="1400" b="1" dirty="0"/>
+          </a:p>
+        </p:txBody>
+      </p:sp>
+    </p:spTree>
+    <p:extLst>
+      <p:ext uri="{BB962C8B-B14F-4D97-AF65-F5344CB8AC3E}">
+        <p14:creationId xmlns:p14="http://schemas.microsoft.com/office/powerpoint/2010/main" val="2417454024"/>
+      </p:ext>
+    </p:extLst>
+  </p:cSld>
+  <p:clrMapOvr>
+    <a:masterClrMapping/>
+  </p:clrMapOvr>
+  <p:timing>
+    <p:tnLst>
+      <p:par>
+        <p:cTn id="1" dur="indefinite" restart="never" nodeType="tmRoot"/>
+      </p:par>
+    </p:tnLst>
+  </p:timing>
+</p:sld>
+</file>
+
+<file path=ppt/slides/slide11.xml><?xml version="1.0" encoding="utf-8"?>
+<p:sld xmlns:a="http://schemas.openxmlformats.org/drawingml/2006/main" xmlns:r="http://schemas.openxmlformats.org/officeDocument/2006/relationships" xmlns:p="http://schemas.openxmlformats.org/presentationml/2006/main">
+  <p:cSld>
+    <p:spTree>
+      <p:nvGrpSpPr>
+        <p:cNvPr id="1" name=""/>
+        <p:cNvGrpSpPr/>
+        <p:nvPr/>
+      </p:nvGrpSpPr>
+      <p:grpSpPr>
+        <a:xfrm>
+          <a:off x="0" y="0"/>
+          <a:ext cx="0" cy="0"/>
+          <a:chOff x="0" y="0"/>
+          <a:chExt cx="0" cy="0"/>
+        </a:xfrm>
+      </p:grpSpPr>
+      <p:cxnSp>
+        <p:nvCxnSpPr>
+          <p:cNvPr id="55" name="Elbow Connector 54"/>
+          <p:cNvCxnSpPr>
+            <a:stCxn id="29" idx="3"/>
+            <a:endCxn id="26" idx="1"/>
+          </p:cNvCxnSpPr>
+          <p:nvPr/>
+        </p:nvCxnSpPr>
+        <p:spPr>
+          <a:xfrm flipV="1">
+            <a:off x="2542006" y="1261622"/>
+            <a:ext cx="5034564" cy="4475564"/>
+          </a:xfrm>
+          <a:prstGeom prst="bentConnector3">
+            <a:avLst>
+              <a:gd name="adj1" fmla="val 53202"/>
+            </a:avLst>
+          </a:prstGeom>
+          <a:ln w="25400">
+            <a:solidFill>
+              <a:schemeClr val="bg2">
+                <a:lumMod val="50000"/>
+              </a:schemeClr>
+            </a:solidFill>
+            <a:tailEnd type="triangle" w="lg" len="lg"/>
+          </a:ln>
+        </p:spPr>
+        <p:style>
+          <a:lnRef idx="1">
+            <a:schemeClr val="accent1"/>
+          </a:lnRef>
+          <a:fillRef idx="0">
+            <a:schemeClr val="accent1"/>
+          </a:fillRef>
+          <a:effectRef idx="0">
+            <a:schemeClr val="accent1"/>
+          </a:effectRef>
+          <a:fontRef idx="minor">
+            <a:schemeClr val="tx1"/>
+          </a:fontRef>
+        </p:style>
+      </p:cxnSp>
+      <p:cxnSp>
+        <p:nvCxnSpPr>
+          <p:cNvPr id="80" name="Elbow Connector 79"/>
+          <p:cNvCxnSpPr>
+            <a:stCxn id="31" idx="1"/>
+            <a:endCxn id="19" idx="3"/>
+          </p:cNvCxnSpPr>
+          <p:nvPr/>
+        </p:nvCxnSpPr>
+        <p:spPr>
+          <a:xfrm rot="10800000">
+            <a:off x="3401692" y="1265094"/>
+            <a:ext cx="3609419" cy="5046358"/>
+          </a:xfrm>
+          <a:prstGeom prst="bentConnector3">
+            <a:avLst>
+              <a:gd name="adj1" fmla="val 61409"/>
+            </a:avLst>
+          </a:prstGeom>
+          <a:ln w="25400">
+            <a:solidFill>
+              <a:schemeClr val="bg2">
+                <a:lumMod val="50000"/>
+              </a:schemeClr>
+            </a:solidFill>
+            <a:tailEnd type="triangle" w="lg" len="lg"/>
+          </a:ln>
+        </p:spPr>
+        <p:style>
+          <a:lnRef idx="1">
+            <a:schemeClr val="accent1"/>
+          </a:lnRef>
+          <a:fillRef idx="0">
+            <a:schemeClr val="accent1"/>
+          </a:fillRef>
+          <a:effectRef idx="0">
+            <a:schemeClr val="accent1"/>
+          </a:effectRef>
+          <a:fontRef idx="minor">
+            <a:schemeClr val="tx1"/>
+          </a:fontRef>
+        </p:style>
+      </p:cxnSp>
+      <p:sp>
+        <p:nvSpPr>
+          <p:cNvPr id="14" name="Flowchart: Decision 13"/>
+          <p:cNvSpPr/>
+          <p:nvPr/>
+        </p:nvSpPr>
+        <p:spPr>
+          <a:xfrm>
+            <a:off x="4160825" y="200482"/>
+            <a:ext cx="2839347" cy="586578"/>
+          </a:xfrm>
+          <a:prstGeom prst="flowChartDecision">
+            <a:avLst/>
+          </a:prstGeom>
+          <a:ln w="25400"/>
+        </p:spPr>
+        <p:style>
+          <a:lnRef idx="2">
+            <a:schemeClr val="accent1"/>
+          </a:lnRef>
+          <a:fillRef idx="1">
+            <a:schemeClr val="lt1"/>
+          </a:fillRef>
+          <a:effectRef idx="0">
+            <a:schemeClr val="accent1"/>
+          </a:effectRef>
+          <a:fontRef idx="minor">
+            <a:schemeClr val="dk1"/>
+          </a:fontRef>
+        </p:style>
+        <p:txBody>
+          <a:bodyPr rtlCol="0" anchor="ctr"/>
+          <a:lstStyle/>
+          <a:p>
+            <a:pPr algn="ctr"/>
+            <a:r>
+              <a:rPr lang="en-US" sz="1400" b="1" dirty="0" smtClean="0"/>
+              <a:t>Plotting Stopped</a:t>
+            </a:r>
+            <a:endParaRPr lang="en-US" sz="1400" b="1" dirty="0"/>
+          </a:p>
+        </p:txBody>
+      </p:sp>
+      <p:cxnSp>
+        <p:nvCxnSpPr>
+          <p:cNvPr id="68" name="Elbow Connector 67"/>
+          <p:cNvCxnSpPr>
+            <a:stCxn id="14" idx="1"/>
+            <a:endCxn id="19" idx="0"/>
+          </p:cNvCxnSpPr>
+          <p:nvPr/>
+        </p:nvCxnSpPr>
+        <p:spPr>
+          <a:xfrm rot="10800000" flipV="1">
+            <a:off x="2077651" y="493770"/>
+            <a:ext cx="2083174" cy="456565"/>
+          </a:xfrm>
+          <a:prstGeom prst="bentConnector2">
+            <a:avLst/>
+          </a:prstGeom>
+          <a:ln w="25400">
+            <a:tailEnd type="triangle" w="lg" len="lg"/>
+          </a:ln>
+        </p:spPr>
+        <p:style>
+          <a:lnRef idx="1">
+            <a:schemeClr val="accent1"/>
+          </a:lnRef>
+          <a:fillRef idx="0">
+            <a:schemeClr val="accent1"/>
+          </a:fillRef>
+          <a:effectRef idx="0">
+            <a:schemeClr val="accent1"/>
+          </a:effectRef>
+          <a:fontRef idx="minor">
+            <a:schemeClr val="tx1"/>
+          </a:fontRef>
+        </p:style>
+      </p:cxnSp>
+      <p:cxnSp>
+        <p:nvCxnSpPr>
+          <p:cNvPr id="70" name="Elbow Connector 69"/>
+          <p:cNvCxnSpPr>
+            <a:stCxn id="14" idx="3"/>
+            <a:endCxn id="26" idx="0"/>
+          </p:cNvCxnSpPr>
+          <p:nvPr/>
+        </p:nvCxnSpPr>
+        <p:spPr>
+          <a:xfrm>
+            <a:off x="7000172" y="493771"/>
+            <a:ext cx="1885250" cy="453093"/>
+          </a:xfrm>
+          <a:prstGeom prst="bentConnector2">
+            <a:avLst/>
+          </a:prstGeom>
+          <a:ln w="25400">
+            <a:tailEnd type="triangle" w="lg" len="lg"/>
+          </a:ln>
+        </p:spPr>
+        <p:style>
+          <a:lnRef idx="1">
+            <a:schemeClr val="accent1"/>
+          </a:lnRef>
+          <a:fillRef idx="0">
+            <a:schemeClr val="accent1"/>
+          </a:fillRef>
+          <a:effectRef idx="0">
+            <a:schemeClr val="accent1"/>
+          </a:effectRef>
+          <a:fontRef idx="minor">
+            <a:schemeClr val="tx1"/>
+          </a:fontRef>
+        </p:style>
+      </p:cxnSp>
+      <p:grpSp>
+        <p:nvGrpSpPr>
+          <p:cNvPr id="100" name="Group 99"/>
+          <p:cNvGrpSpPr/>
+          <p:nvPr/>
+        </p:nvGrpSpPr>
+        <p:grpSpPr>
+          <a:xfrm>
+            <a:off x="750847" y="950336"/>
+            <a:ext cx="2650844" cy="5198850"/>
+            <a:chOff x="750847" y="950336"/>
+            <a:chExt cx="2650844" cy="5198850"/>
+          </a:xfrm>
+        </p:grpSpPr>
+        <p:grpSp>
+          <p:nvGrpSpPr>
+            <p:cNvPr id="10" name="Group 9"/>
+            <p:cNvGrpSpPr/>
+            <p:nvPr/>
+          </p:nvGrpSpPr>
+          <p:grpSpPr>
+            <a:xfrm>
+              <a:off x="750847" y="950336"/>
+              <a:ext cx="2650844" cy="5198850"/>
+              <a:chOff x="750847" y="950336"/>
+              <a:chExt cx="2650844" cy="5198850"/>
+            </a:xfrm>
+          </p:grpSpPr>
+          <p:sp>
+            <p:nvSpPr>
+              <p:cNvPr id="19" name="TextBox 18"/>
+              <p:cNvSpPr txBox="1"/>
+              <p:nvPr/>
+            </p:nvSpPr>
+            <p:spPr>
+              <a:xfrm>
+                <a:off x="753610" y="950336"/>
+                <a:ext cx="2648081" cy="629516"/>
+              </a:xfrm>
+              <a:prstGeom prst="rect">
+                <a:avLst/>
+              </a:prstGeom>
+              <a:noFill/>
+              <a:ln>
+                <a:solidFill>
+                  <a:schemeClr val="accent1">
+                    <a:shade val="50000"/>
+                  </a:schemeClr>
+                </a:solidFill>
+              </a:ln>
+            </p:spPr>
+            <p:txBody>
+              <a:bodyPr wrap="square" rtlCol="0">
+                <a:noAutofit/>
+              </a:bodyPr>
+              <a:lstStyle/>
+              <a:p>
+                <a:pPr algn="ctr"/>
+                <a:r>
+                  <a:rPr lang="en-US" sz="1400" b="1" dirty="0" smtClean="0"/>
+                  <a:t>No Plot Selected - </a:t>
+                </a:r>
+                <a:r>
+                  <a:rPr lang="en-US" sz="1400" b="1" dirty="0"/>
+                  <a:t>Plot </a:t>
+                </a:r>
+                <a:r>
+                  <a:rPr lang="en-US" sz="1400" b="1" dirty="0" smtClean="0"/>
+                  <a:t>Running</a:t>
+                </a:r>
+              </a:p>
+              <a:p>
+                <a:pPr algn="ctr"/>
+                <a:r>
+                  <a:rPr lang="en-US" sz="1400" b="1" i="1" dirty="0" smtClean="0">
+                    <a:solidFill>
+                      <a:schemeClr val="accent5"/>
+                    </a:solidFill>
+                  </a:rPr>
+                  <a:t>No Context Menu</a:t>
+                </a:r>
+              </a:p>
+              <a:p>
+                <a:pPr algn="ctr"/>
+                <a:endParaRPr lang="en-US" sz="1400" b="1" dirty="0"/>
+              </a:p>
+            </p:txBody>
+          </p:sp>
+          <p:sp>
+            <p:nvSpPr>
+              <p:cNvPr id="27" name="Flowchart: Manual Input 26"/>
+              <p:cNvSpPr/>
+              <p:nvPr/>
+            </p:nvSpPr>
+            <p:spPr>
+              <a:xfrm>
+                <a:off x="1219702" y="1801316"/>
+                <a:ext cx="1710363" cy="354542"/>
+              </a:xfrm>
+              <a:prstGeom prst="flowChartManualInput">
+                <a:avLst/>
+              </a:prstGeom>
+              <a:solidFill>
+                <a:schemeClr val="accent4">
+                  <a:alpha val="50000"/>
+                </a:schemeClr>
+              </a:solidFill>
+              <a:ln>
+                <a:noFill/>
+              </a:ln>
+            </p:spPr>
+            <p:style>
+              <a:lnRef idx="0">
+                <a:scrgbClr r="0" g="0" b="0"/>
+              </a:lnRef>
+              <a:fillRef idx="0">
+                <a:scrgbClr r="0" g="0" b="0"/>
+              </a:fillRef>
+              <a:effectRef idx="0">
+                <a:scrgbClr r="0" g="0" b="0"/>
+              </a:effectRef>
+              <a:fontRef idx="minor">
+                <a:schemeClr val="lt1"/>
+              </a:fontRef>
+            </p:style>
+            <p:txBody>
+              <a:bodyPr rtlCol="0" anchor="ctr">
+                <a:spAutoFit/>
+              </a:bodyPr>
+              <a:lstStyle/>
+              <a:p>
+                <a:pPr lvl="0" algn="ctr"/>
+                <a:r>
+                  <a:rPr lang="en-US" sz="1200" b="1" dirty="0">
+                    <a:solidFill>
+                      <a:prstClr val="black"/>
+                    </a:solidFill>
+                  </a:rPr>
+                  <a:t>Click on a Plot Info Line</a:t>
+                </a:r>
+                <a:endParaRPr lang="en-US" sz="1200" b="1" dirty="0">
+                  <a:solidFill>
+                    <a:prstClr val="black"/>
+                  </a:solidFill>
+                </a:endParaRPr>
+              </a:p>
+            </p:txBody>
+          </p:sp>
+          <p:grpSp>
+            <p:nvGrpSpPr>
+              <p:cNvPr id="9" name="Group 8"/>
+              <p:cNvGrpSpPr/>
+              <p:nvPr/>
+            </p:nvGrpSpPr>
+            <p:grpSpPr>
+              <a:xfrm>
+                <a:off x="750847" y="2431405"/>
+                <a:ext cx="2648081" cy="3717781"/>
+                <a:chOff x="750847" y="2431405"/>
+                <a:chExt cx="2648081" cy="3717781"/>
+              </a:xfrm>
+            </p:grpSpPr>
+            <p:sp>
+              <p:nvSpPr>
+                <p:cNvPr id="24" name="TextBox 23"/>
+                <p:cNvSpPr txBox="1"/>
+                <p:nvPr/>
+              </p:nvSpPr>
+              <p:spPr>
+                <a:xfrm>
+                  <a:off x="750847" y="2431405"/>
+                  <a:ext cx="2648081" cy="3717781"/>
+                </a:xfrm>
+                <a:prstGeom prst="rect">
+                  <a:avLst/>
+                </a:prstGeom>
+                <a:noFill/>
+                <a:ln>
+                  <a:solidFill>
+                    <a:schemeClr val="accent1">
+                      <a:shade val="50000"/>
+                    </a:schemeClr>
+                  </a:solidFill>
+                </a:ln>
+              </p:spPr>
+              <p:txBody>
+                <a:bodyPr wrap="square" rtlCol="0">
+                  <a:noAutofit/>
+                </a:bodyPr>
+                <a:lstStyle/>
+                <a:p>
+                  <a:pPr algn="ctr"/>
+                  <a:r>
+                    <a:rPr lang="en-US" sz="1400" b="1" dirty="0" smtClean="0"/>
+                    <a:t>Plot Selected - Plot Running</a:t>
+                  </a:r>
+                </a:p>
+                <a:p>
+                  <a:pPr algn="ctr"/>
+                  <a:endParaRPr lang="en-US" sz="1400" b="1" dirty="0"/>
+                </a:p>
+              </p:txBody>
+            </p:sp>
+            <p:sp>
+              <p:nvSpPr>
+                <p:cNvPr id="21" name="Flowchart: Alternate Process 20"/>
+                <p:cNvSpPr/>
+                <p:nvPr/>
+              </p:nvSpPr>
+              <p:spPr>
+                <a:xfrm>
+                  <a:off x="1712192" y="4318857"/>
+                  <a:ext cx="725387" cy="292463"/>
+                </a:xfrm>
+                <a:prstGeom prst="flowChartAlternateProcess">
+                  <a:avLst/>
+                </a:prstGeom>
+                <a:solidFill>
+                  <a:schemeClr val="accent6">
+                    <a:alpha val="50000"/>
+                  </a:schemeClr>
+                </a:solidFill>
+                <a:ln>
+                  <a:noFill/>
+                </a:ln>
+              </p:spPr>
+              <p:style>
+                <a:lnRef idx="0">
+                  <a:scrgbClr r="0" g="0" b="0"/>
+                </a:lnRef>
+                <a:fillRef idx="0">
+                  <a:scrgbClr r="0" g="0" b="0"/>
+                </a:fillRef>
+                <a:effectRef idx="0">
+                  <a:scrgbClr r="0" g="0" b="0"/>
+                </a:effectRef>
+                <a:fontRef idx="minor">
+                  <a:schemeClr val="lt1"/>
+                </a:fontRef>
+              </p:style>
+              <p:txBody>
+                <a:bodyPr rtlCol="0" anchor="ctr"/>
+                <a:lstStyle/>
+                <a:p>
+                  <a:pPr lvl="0" algn="ctr"/>
+                  <a:r>
+                    <a:rPr lang="en-US" sz="1200" b="1" dirty="0">
+                      <a:solidFill>
+                        <a:prstClr val="black"/>
+                      </a:solidFill>
+                    </a:rPr>
+                    <a:t>ESC Key</a:t>
+                  </a:r>
+                  <a:endParaRPr lang="en-US" sz="1200" b="1" dirty="0">
+                    <a:solidFill>
+                      <a:prstClr val="black"/>
+                    </a:solidFill>
+                  </a:endParaRPr>
+                </a:p>
+              </p:txBody>
+            </p:sp>
+            <p:pic>
+              <p:nvPicPr>
+                <p:cNvPr id="22" name="Picture 21"/>
+                <p:cNvPicPr>
+                  <a:picLocks noChangeAspect="1"/>
+                </p:cNvPicPr>
+                <p:nvPr/>
+              </p:nvPicPr>
+              <p:blipFill>
+                <a:blip r:embed="rId2" cstate="print">
+                  <a:extLst>
+                    <a:ext uri="{28A0092B-C50C-407E-A947-70E740481C1C}">
+                      <a14:useLocalDpi xmlns:a14="http://schemas.microsoft.com/office/drawing/2010/main" val="0"/>
+                    </a:ext>
+                  </a:extLst>
+                </a:blip>
+                <a:stretch>
+                  <a:fillRect/>
+                </a:stretch>
+              </p:blipFill>
+              <p:spPr>
+                <a:xfrm>
+                  <a:off x="1373438" y="2872005"/>
+                  <a:ext cx="1402897" cy="1334277"/>
+                </a:xfrm>
+                <a:prstGeom prst="rect">
+                  <a:avLst/>
+                </a:prstGeom>
+              </p:spPr>
+            </p:pic>
+            <p:sp>
+              <p:nvSpPr>
+                <p:cNvPr id="18" name="Flowchart: Manual Input 17"/>
+                <p:cNvSpPr/>
+                <p:nvPr/>
+              </p:nvSpPr>
+              <p:spPr>
+                <a:xfrm>
+                  <a:off x="1185438" y="4659101"/>
+                  <a:ext cx="1778893" cy="354542"/>
+                </a:xfrm>
+                <a:prstGeom prst="flowChartManualInput">
+                  <a:avLst/>
+                </a:prstGeom>
+                <a:solidFill>
+                  <a:schemeClr val="accent4">
+                    <a:alpha val="50000"/>
+                  </a:schemeClr>
+                </a:solidFill>
+                <a:ln>
+                  <a:noFill/>
+                </a:ln>
+              </p:spPr>
+              <p:style>
+                <a:lnRef idx="0">
+                  <a:scrgbClr r="0" g="0" b="0"/>
+                </a:lnRef>
+                <a:fillRef idx="0">
+                  <a:scrgbClr r="0" g="0" b="0"/>
+                </a:fillRef>
+                <a:effectRef idx="0">
+                  <a:scrgbClr r="0" g="0" b="0"/>
+                </a:effectRef>
+                <a:fontRef idx="minor">
+                  <a:schemeClr val="lt1"/>
+                </a:fontRef>
+              </p:style>
+              <p:txBody>
+                <a:bodyPr rtlCol="0" anchor="ctr">
+                  <a:spAutoFit/>
+                </a:bodyPr>
+                <a:lstStyle/>
+                <a:p>
+                  <a:pPr lvl="0" algn="ctr"/>
+                  <a:r>
+                    <a:rPr lang="en-US" sz="1200" b="1" dirty="0">
+                      <a:solidFill>
+                        <a:prstClr val="black"/>
+                      </a:solidFill>
+                    </a:rPr>
+                    <a:t>Click on </a:t>
+                  </a:r>
+                  <a:r>
+                    <a:rPr lang="en-US" sz="1200" b="1" dirty="0" smtClean="0">
+                      <a:solidFill>
+                        <a:prstClr val="black"/>
+                      </a:solidFill>
+                    </a:rPr>
+                    <a:t>Operation Mode</a:t>
+                  </a:r>
+                  <a:endParaRPr lang="en-US" sz="1200" b="1" dirty="0">
+                    <a:solidFill>
+                      <a:prstClr val="black"/>
+                    </a:solidFill>
+                  </a:endParaRPr>
+                </a:p>
+              </p:txBody>
+            </p:sp>
+            <p:sp>
+              <p:nvSpPr>
+                <p:cNvPr id="25" name="Flowchart: Manual Input 24"/>
+                <p:cNvSpPr/>
+                <p:nvPr/>
+              </p:nvSpPr>
+              <p:spPr>
+                <a:xfrm>
+                  <a:off x="1010281" y="5107097"/>
+                  <a:ext cx="2129206" cy="354542"/>
+                </a:xfrm>
+                <a:prstGeom prst="flowChartManualInput">
+                  <a:avLst/>
+                </a:prstGeom>
+                <a:solidFill>
+                  <a:schemeClr val="accent4">
+                    <a:alpha val="50000"/>
+                  </a:schemeClr>
+                </a:solidFill>
+                <a:ln>
+                  <a:noFill/>
+                </a:ln>
+              </p:spPr>
+              <p:style>
+                <a:lnRef idx="0">
+                  <a:scrgbClr r="0" g="0" b="0"/>
+                </a:lnRef>
+                <a:fillRef idx="0">
+                  <a:scrgbClr r="0" g="0" b="0"/>
+                </a:fillRef>
+                <a:effectRef idx="0">
+                  <a:scrgbClr r="0" g="0" b="0"/>
+                </a:effectRef>
+                <a:fontRef idx="minor">
+                  <a:schemeClr val="lt1"/>
+                </a:fontRef>
+              </p:style>
+              <p:txBody>
+                <a:bodyPr rtlCol="0" anchor="ctr">
+                  <a:spAutoFit/>
+                </a:bodyPr>
+                <a:lstStyle/>
+                <a:p>
+                  <a:pPr lvl="0" algn="ctr"/>
+                  <a:r>
+                    <a:rPr lang="en-US" sz="1200" b="1" dirty="0">
+                      <a:solidFill>
+                        <a:prstClr val="black"/>
+                      </a:solidFill>
+                    </a:rPr>
+                    <a:t>Click on </a:t>
+                  </a:r>
+                  <a:r>
+                    <a:rPr lang="en-US" sz="1200" b="1" dirty="0" smtClean="0">
+                      <a:solidFill>
+                        <a:prstClr val="black"/>
+                      </a:solidFill>
+                    </a:rPr>
+                    <a:t>another </a:t>
+                  </a:r>
+                  <a:r>
+                    <a:rPr lang="en-US" sz="1200" b="1" dirty="0">
+                      <a:solidFill>
+                        <a:prstClr val="black"/>
+                      </a:solidFill>
+                    </a:rPr>
+                    <a:t>Plot Info Line</a:t>
+                  </a:r>
+                  <a:endParaRPr lang="en-US" sz="1200" b="1" dirty="0">
+                    <a:solidFill>
+                      <a:prstClr val="black"/>
+                    </a:solidFill>
+                  </a:endParaRPr>
+                </a:p>
+              </p:txBody>
+            </p:sp>
+            <p:sp>
+              <p:nvSpPr>
+                <p:cNvPr id="29" name="Flowchart: Alternate Process 28"/>
+                <p:cNvSpPr/>
+                <p:nvPr/>
+              </p:nvSpPr>
+              <p:spPr>
+                <a:xfrm>
+                  <a:off x="1607759" y="5590954"/>
+                  <a:ext cx="934247" cy="292463"/>
+                </a:xfrm>
+                <a:prstGeom prst="flowChartAlternateProcess">
+                  <a:avLst/>
+                </a:prstGeom>
+                <a:solidFill>
+                  <a:schemeClr val="accent3"/>
+                </a:solidFill>
+                <a:ln>
+                  <a:noFill/>
+                </a:ln>
+              </p:spPr>
+              <p:style>
+                <a:lnRef idx="0">
+                  <a:scrgbClr r="0" g="0" b="0"/>
+                </a:lnRef>
+                <a:fillRef idx="0">
+                  <a:scrgbClr r="0" g="0" b="0"/>
+                </a:fillRef>
+                <a:effectRef idx="0">
+                  <a:scrgbClr r="0" g="0" b="0"/>
+                </a:effectRef>
+                <a:fontRef idx="minor">
+                  <a:schemeClr val="lt1"/>
+                </a:fontRef>
+              </p:style>
+              <p:txBody>
+                <a:bodyPr rtlCol="0" anchor="ctr"/>
+                <a:lstStyle/>
+                <a:p>
+                  <a:pPr lvl="0" algn="ctr"/>
+                  <a:r>
+                    <a:rPr lang="en-US" sz="1200" b="1" dirty="0" smtClean="0">
+                      <a:solidFill>
+                        <a:prstClr val="black"/>
+                      </a:solidFill>
+                    </a:rPr>
+                    <a:t>Stop Plot</a:t>
+                  </a:r>
+                  <a:endParaRPr lang="en-US" sz="1200" b="1" dirty="0">
+                    <a:solidFill>
+                      <a:prstClr val="black"/>
+                    </a:solidFill>
+                  </a:endParaRPr>
+                </a:p>
+              </p:txBody>
+            </p:sp>
+          </p:grpSp>
+        </p:grpSp>
+        <p:cxnSp>
+          <p:nvCxnSpPr>
+            <p:cNvPr id="47" name="Elbow Connector 46"/>
+            <p:cNvCxnSpPr>
+              <a:stCxn id="25" idx="1"/>
+              <a:endCxn id="24" idx="0"/>
+            </p:cNvCxnSpPr>
+            <p:nvPr/>
+          </p:nvCxnSpPr>
+          <p:spPr>
+            <a:xfrm rot="10800000" flipH="1">
+              <a:off x="1010280" y="2431406"/>
+              <a:ext cx="1064607" cy="2852963"/>
+            </a:xfrm>
+            <a:prstGeom prst="bentConnector4">
+              <a:avLst>
+                <a:gd name="adj1" fmla="val -45842"/>
+                <a:gd name="adj2" fmla="val 105646"/>
+              </a:avLst>
+            </a:prstGeom>
+            <a:ln w="25400">
+              <a:solidFill>
+                <a:schemeClr val="accent4"/>
+              </a:solidFill>
+              <a:tailEnd type="triangle" w="lg" len="lg"/>
+            </a:ln>
+          </p:spPr>
+          <p:style>
+            <a:lnRef idx="1">
+              <a:schemeClr val="accent1"/>
+            </a:lnRef>
+            <a:fillRef idx="0">
+              <a:schemeClr val="accent1"/>
+            </a:fillRef>
+            <a:effectRef idx="0">
+              <a:schemeClr val="accent1"/>
+            </a:effectRef>
+            <a:fontRef idx="minor">
+              <a:schemeClr val="tx1"/>
+            </a:fontRef>
+          </p:style>
+        </p:cxnSp>
+        <p:cxnSp>
+          <p:nvCxnSpPr>
+            <p:cNvPr id="52" name="Elbow Connector 51"/>
+            <p:cNvCxnSpPr>
+              <a:stCxn id="18" idx="3"/>
+              <a:endCxn id="19" idx="3"/>
+            </p:cNvCxnSpPr>
+            <p:nvPr/>
+          </p:nvCxnSpPr>
+          <p:spPr>
+            <a:xfrm flipV="1">
+              <a:off x="2964331" y="1265094"/>
+              <a:ext cx="437360" cy="3571278"/>
+            </a:xfrm>
+            <a:prstGeom prst="bentConnector3">
+              <a:avLst>
+                <a:gd name="adj1" fmla="val 274344"/>
+              </a:avLst>
+            </a:prstGeom>
+            <a:ln w="25400">
+              <a:solidFill>
+                <a:schemeClr val="accent4"/>
+              </a:solidFill>
+              <a:tailEnd type="triangle" w="lg" len="lg"/>
+            </a:ln>
+          </p:spPr>
+          <p:style>
+            <a:lnRef idx="1">
+              <a:schemeClr val="accent1"/>
+            </a:lnRef>
+            <a:fillRef idx="0">
+              <a:schemeClr val="accent1"/>
+            </a:fillRef>
+            <a:effectRef idx="0">
+              <a:schemeClr val="accent1"/>
+            </a:effectRef>
+            <a:fontRef idx="minor">
+              <a:schemeClr val="tx1"/>
+            </a:fontRef>
+          </p:style>
+        </p:cxnSp>
+        <p:cxnSp>
+          <p:nvCxnSpPr>
+            <p:cNvPr id="61" name="Elbow Connector 60"/>
+            <p:cNvCxnSpPr>
+              <a:stCxn id="21" idx="3"/>
+              <a:endCxn id="19" idx="3"/>
+            </p:cNvCxnSpPr>
+            <p:nvPr/>
+          </p:nvCxnSpPr>
+          <p:spPr>
+            <a:xfrm flipV="1">
+              <a:off x="2437579" y="1265094"/>
+              <a:ext cx="964112" cy="3199995"/>
+            </a:xfrm>
+            <a:prstGeom prst="bentConnector3">
+              <a:avLst>
+                <a:gd name="adj1" fmla="val 142170"/>
+              </a:avLst>
+            </a:prstGeom>
+            <a:ln w="25400">
+              <a:solidFill>
+                <a:schemeClr val="accent6">
+                  <a:lumMod val="60000"/>
+                  <a:lumOff val="40000"/>
+                </a:schemeClr>
+              </a:solidFill>
+              <a:tailEnd type="triangle" w="lg" len="lg"/>
+            </a:ln>
+          </p:spPr>
+          <p:style>
+            <a:lnRef idx="1">
+              <a:schemeClr val="accent1"/>
+            </a:lnRef>
+            <a:fillRef idx="0">
+              <a:schemeClr val="accent1"/>
+            </a:fillRef>
+            <a:effectRef idx="0">
+              <a:schemeClr val="accent1"/>
+            </a:effectRef>
+            <a:fontRef idx="minor">
+              <a:schemeClr val="tx1"/>
+            </a:fontRef>
+          </p:style>
+        </p:cxnSp>
+        <p:cxnSp>
+          <p:nvCxnSpPr>
+            <p:cNvPr id="69" name="Elbow Connector 68"/>
+            <p:cNvCxnSpPr>
+              <a:stCxn id="27" idx="2"/>
+              <a:endCxn id="24" idx="0"/>
+            </p:cNvCxnSpPr>
+            <p:nvPr/>
+          </p:nvCxnSpPr>
+          <p:spPr>
+            <a:xfrm rot="16200000" flipH="1">
+              <a:off x="1937113" y="2293629"/>
+              <a:ext cx="275547" cy="4"/>
+            </a:xfrm>
+            <a:prstGeom prst="bentConnector3">
+              <a:avLst>
+                <a:gd name="adj1" fmla="val 50000"/>
+              </a:avLst>
+            </a:prstGeom>
+            <a:ln w="25400">
+              <a:solidFill>
+                <a:schemeClr val="accent4"/>
+              </a:solidFill>
+              <a:tailEnd type="triangle" w="lg" len="lg"/>
+            </a:ln>
+          </p:spPr>
+          <p:style>
+            <a:lnRef idx="1">
+              <a:schemeClr val="accent1"/>
+            </a:lnRef>
+            <a:fillRef idx="0">
+              <a:schemeClr val="accent1"/>
+            </a:fillRef>
+            <a:effectRef idx="0">
+              <a:schemeClr val="accent1"/>
+            </a:effectRef>
+            <a:fontRef idx="minor">
+              <a:schemeClr val="tx1"/>
+            </a:fontRef>
+          </p:style>
+        </p:cxnSp>
+        <p:cxnSp>
+          <p:nvCxnSpPr>
+            <p:cNvPr id="71" name="Elbow Connector 70"/>
+            <p:cNvCxnSpPr>
+              <a:stCxn id="19" idx="2"/>
+              <a:endCxn id="27" idx="0"/>
+            </p:cNvCxnSpPr>
+            <p:nvPr/>
+          </p:nvCxnSpPr>
+          <p:spPr>
+            <a:xfrm rot="5400000">
+              <a:off x="1947809" y="1706928"/>
+              <a:ext cx="256918" cy="2767"/>
+            </a:xfrm>
+            <a:prstGeom prst="bentConnector3">
+              <a:avLst>
+                <a:gd name="adj1" fmla="val 50000"/>
+              </a:avLst>
+            </a:prstGeom>
+            <a:ln w="25400">
+              <a:tailEnd type="triangle" w="lg" len="lg"/>
+            </a:ln>
+          </p:spPr>
+          <p:style>
+            <a:lnRef idx="1">
+              <a:schemeClr val="accent1"/>
+            </a:lnRef>
+            <a:fillRef idx="0">
+              <a:schemeClr val="accent1"/>
+            </a:fillRef>
+            <a:effectRef idx="0">
+              <a:schemeClr val="accent1"/>
+            </a:effectRef>
+            <a:fontRef idx="minor">
+              <a:schemeClr val="tx1"/>
+            </a:fontRef>
+          </p:style>
+        </p:cxnSp>
+      </p:grpSp>
+      <p:grpSp>
+        <p:nvGrpSpPr>
+          <p:cNvPr id="212" name="Group 211"/>
+          <p:cNvGrpSpPr/>
+          <p:nvPr/>
+        </p:nvGrpSpPr>
+        <p:grpSpPr>
+          <a:xfrm>
+            <a:off x="6191532" y="946864"/>
+            <a:ext cx="5400482" cy="5723400"/>
+            <a:chOff x="6191532" y="946864"/>
+            <a:chExt cx="5400482" cy="5723400"/>
+          </a:xfrm>
+        </p:grpSpPr>
+        <p:sp>
+          <p:nvSpPr>
+            <p:cNvPr id="13" name="Flowchart: Manual Input 12"/>
+            <p:cNvSpPr/>
+            <p:nvPr/>
+          </p:nvSpPr>
+          <p:spPr>
+            <a:xfrm>
+              <a:off x="8036590" y="1724259"/>
+              <a:ext cx="1710363" cy="354542"/>
+            </a:xfrm>
+            <a:prstGeom prst="flowChartManualInput">
+              <a:avLst/>
+            </a:prstGeom>
+            <a:solidFill>
+              <a:schemeClr val="accent4">
+                <a:alpha val="50000"/>
+              </a:schemeClr>
+            </a:solidFill>
+            <a:ln>
+              <a:noFill/>
+            </a:ln>
+          </p:spPr>
+          <p:style>
+            <a:lnRef idx="0">
+              <a:scrgbClr r="0" g="0" b="0"/>
+            </a:lnRef>
+            <a:fillRef idx="0">
+              <a:scrgbClr r="0" g="0" b="0"/>
+            </a:fillRef>
+            <a:effectRef idx="0">
+              <a:scrgbClr r="0" g="0" b="0"/>
+            </a:effectRef>
+            <a:fontRef idx="minor">
+              <a:schemeClr val="lt1"/>
+            </a:fontRef>
+          </p:style>
+          <p:txBody>
+            <a:bodyPr rtlCol="0" anchor="ctr">
+              <a:spAutoFit/>
+            </a:bodyPr>
+            <a:lstStyle/>
+            <a:p>
+              <a:pPr lvl="0" algn="ctr"/>
+              <a:r>
+                <a:rPr lang="en-US" sz="1200" b="1" dirty="0">
+                  <a:solidFill>
+                    <a:prstClr val="black"/>
+                  </a:solidFill>
+                </a:rPr>
+                <a:t>Click on a Plot Info Line</a:t>
+              </a:r>
+              <a:endParaRPr lang="en-US" sz="1200" b="1" dirty="0">
+                <a:solidFill>
+                  <a:prstClr val="black"/>
+                </a:solidFill>
+              </a:endParaRPr>
+            </a:p>
+          </p:txBody>
+        </p:sp>
+        <p:sp>
+          <p:nvSpPr>
+            <p:cNvPr id="26" name="TextBox 25"/>
+            <p:cNvSpPr txBox="1"/>
+            <p:nvPr/>
+          </p:nvSpPr>
+          <p:spPr>
+            <a:xfrm>
+              <a:off x="7576570" y="946864"/>
+              <a:ext cx="2617703" cy="629516"/>
+            </a:xfrm>
+            <a:prstGeom prst="rect">
+              <a:avLst/>
+            </a:prstGeom>
+            <a:noFill/>
+            <a:ln>
+              <a:solidFill>
+                <a:schemeClr val="accent1">
+                  <a:shade val="50000"/>
+                </a:schemeClr>
+              </a:solidFill>
+            </a:ln>
+          </p:spPr>
+          <p:txBody>
+            <a:bodyPr wrap="square" rtlCol="0">
+              <a:noAutofit/>
+            </a:bodyPr>
+            <a:lstStyle/>
+            <a:p>
+              <a:pPr algn="ctr"/>
+              <a:r>
+                <a:rPr lang="en-US" sz="1400" b="1" dirty="0" smtClean="0"/>
+                <a:t>No Plot Selected – Plot Stopped</a:t>
+              </a:r>
+            </a:p>
+            <a:p>
+              <a:pPr algn="ctr"/>
+              <a:r>
+                <a:rPr lang="en-US" sz="1400" b="1" i="1" dirty="0" smtClean="0">
+                  <a:solidFill>
+                    <a:schemeClr val="accent5"/>
+                  </a:solidFill>
+                </a:rPr>
+                <a:t>No Context Menu</a:t>
+              </a:r>
+            </a:p>
+            <a:p>
+              <a:pPr algn="ctr"/>
+              <a:endParaRPr lang="en-US" sz="1400" b="1" dirty="0"/>
+            </a:p>
+          </p:txBody>
+        </p:sp>
+        <p:cxnSp>
+          <p:nvCxnSpPr>
+            <p:cNvPr id="87" name="Elbow Connector 86"/>
+            <p:cNvCxnSpPr>
+              <a:stCxn id="26" idx="2"/>
+              <a:endCxn id="13" idx="0"/>
+            </p:cNvCxnSpPr>
+            <p:nvPr/>
+          </p:nvCxnSpPr>
+          <p:spPr>
+            <a:xfrm rot="16200000" flipH="1">
+              <a:off x="8796931" y="1664871"/>
+              <a:ext cx="183333" cy="6350"/>
+            </a:xfrm>
+            <a:prstGeom prst="bentConnector3">
+              <a:avLst>
+                <a:gd name="adj1" fmla="val 50000"/>
+              </a:avLst>
+            </a:prstGeom>
+            <a:ln w="25400">
+              <a:tailEnd type="triangle" w="lg" len="lg"/>
+            </a:ln>
+          </p:spPr>
+          <p:style>
+            <a:lnRef idx="1">
+              <a:schemeClr val="accent1"/>
+            </a:lnRef>
+            <a:fillRef idx="0">
+              <a:schemeClr val="accent1"/>
+            </a:fillRef>
+            <a:effectRef idx="0">
+              <a:schemeClr val="accent1"/>
+            </a:effectRef>
+            <a:fontRef idx="minor">
+              <a:schemeClr val="tx1"/>
+            </a:fontRef>
+          </p:style>
+        </p:cxnSp>
+        <p:cxnSp>
+          <p:nvCxnSpPr>
+            <p:cNvPr id="88" name="Elbow Connector 87"/>
+            <p:cNvCxnSpPr>
+              <a:stCxn id="13" idx="2"/>
+              <a:endCxn id="20" idx="0"/>
+            </p:cNvCxnSpPr>
+            <p:nvPr/>
+          </p:nvCxnSpPr>
+          <p:spPr>
+            <a:xfrm rot="16200000" flipH="1">
+              <a:off x="8666096" y="2304476"/>
+              <a:ext cx="451352" cy="1"/>
+            </a:xfrm>
+            <a:prstGeom prst="bentConnector3">
+              <a:avLst>
+                <a:gd name="adj1" fmla="val 50000"/>
+              </a:avLst>
+            </a:prstGeom>
+            <a:ln w="25400">
+              <a:solidFill>
+                <a:schemeClr val="accent4"/>
+              </a:solidFill>
+              <a:tailEnd type="triangle" w="lg" len="lg"/>
+            </a:ln>
+          </p:spPr>
+          <p:style>
+            <a:lnRef idx="1">
+              <a:schemeClr val="accent1"/>
+            </a:lnRef>
+            <a:fillRef idx="0">
+              <a:schemeClr val="accent1"/>
+            </a:fillRef>
+            <a:effectRef idx="0">
+              <a:schemeClr val="accent1"/>
+            </a:effectRef>
+            <a:fontRef idx="minor">
+              <a:schemeClr val="tx1"/>
+            </a:fontRef>
+          </p:style>
+        </p:cxnSp>
+        <p:cxnSp>
+          <p:nvCxnSpPr>
+            <p:cNvPr id="111" name="Elbow Connector 110"/>
+            <p:cNvCxnSpPr>
+              <a:stCxn id="32" idx="1"/>
+              <a:endCxn id="26" idx="1"/>
+            </p:cNvCxnSpPr>
+            <p:nvPr/>
+          </p:nvCxnSpPr>
+          <p:spPr>
+            <a:xfrm rot="10800000" flipH="1">
+              <a:off x="6588788" y="1261623"/>
+              <a:ext cx="987782" cy="4186207"/>
+            </a:xfrm>
+            <a:prstGeom prst="bentConnector3">
+              <a:avLst>
+                <a:gd name="adj1" fmla="val -85674"/>
+              </a:avLst>
+            </a:prstGeom>
+            <a:ln w="25400">
+              <a:solidFill>
+                <a:schemeClr val="accent4"/>
+              </a:solidFill>
+              <a:tailEnd type="triangle" w="lg" len="lg"/>
+            </a:ln>
+          </p:spPr>
+          <p:style>
+            <a:lnRef idx="1">
+              <a:schemeClr val="accent1"/>
+            </a:lnRef>
+            <a:fillRef idx="0">
+              <a:schemeClr val="accent1"/>
+            </a:fillRef>
+            <a:effectRef idx="0">
+              <a:schemeClr val="accent1"/>
+            </a:effectRef>
+            <a:fontRef idx="minor">
+              <a:schemeClr val="tx1"/>
+            </a:fontRef>
+          </p:style>
+        </p:cxnSp>
+        <p:cxnSp>
+          <p:nvCxnSpPr>
+            <p:cNvPr id="102" name="Elbow Connector 101"/>
+            <p:cNvCxnSpPr>
+              <a:stCxn id="28" idx="1"/>
+              <a:endCxn id="26" idx="1"/>
+            </p:cNvCxnSpPr>
+            <p:nvPr/>
+          </p:nvCxnSpPr>
+          <p:spPr>
+            <a:xfrm rot="10800000" flipH="1">
+              <a:off x="7115542" y="1261622"/>
+              <a:ext cx="461028" cy="3785678"/>
+            </a:xfrm>
+            <a:prstGeom prst="bentConnector3">
+              <a:avLst>
+                <a:gd name="adj1" fmla="val -355632"/>
+              </a:avLst>
+            </a:prstGeom>
+            <a:ln w="25400">
+              <a:solidFill>
+                <a:schemeClr val="accent6">
+                  <a:lumMod val="60000"/>
+                  <a:lumOff val="40000"/>
+                </a:schemeClr>
+              </a:solidFill>
+              <a:tailEnd type="triangle" w="lg" len="lg"/>
+            </a:ln>
+          </p:spPr>
+          <p:style>
+            <a:lnRef idx="1">
+              <a:schemeClr val="accent1"/>
+            </a:lnRef>
+            <a:fillRef idx="0">
+              <a:schemeClr val="accent1"/>
+            </a:fillRef>
+            <a:effectRef idx="0">
+              <a:schemeClr val="accent1"/>
+            </a:effectRef>
+            <a:fontRef idx="minor">
+              <a:schemeClr val="tx1"/>
+            </a:fontRef>
+          </p:style>
+        </p:cxnSp>
+        <p:cxnSp>
+          <p:nvCxnSpPr>
+            <p:cNvPr id="181" name="Elbow Connector 180"/>
+            <p:cNvCxnSpPr>
+              <a:stCxn id="165" idx="3"/>
+              <a:endCxn id="26" idx="3"/>
+            </p:cNvCxnSpPr>
+            <p:nvPr/>
+          </p:nvCxnSpPr>
+          <p:spPr>
+            <a:xfrm flipH="1" flipV="1">
+              <a:off x="10194273" y="1261622"/>
+              <a:ext cx="796294" cy="3400875"/>
+            </a:xfrm>
+            <a:prstGeom prst="bentConnector3">
+              <a:avLst>
+                <a:gd name="adj1" fmla="val -94869"/>
+              </a:avLst>
+            </a:prstGeom>
+            <a:ln w="25400">
+              <a:solidFill>
+                <a:schemeClr val="accent4">
+                  <a:lumMod val="60000"/>
+                  <a:lumOff val="40000"/>
+                </a:schemeClr>
+              </a:solidFill>
+              <a:tailEnd type="triangle" w="lg" len="lg"/>
+            </a:ln>
+          </p:spPr>
+          <p:style>
+            <a:lnRef idx="1">
+              <a:schemeClr val="accent1"/>
+            </a:lnRef>
+            <a:fillRef idx="0">
+              <a:schemeClr val="accent1"/>
+            </a:fillRef>
+            <a:effectRef idx="0">
+              <a:schemeClr val="accent1"/>
+            </a:effectRef>
+            <a:fontRef idx="minor">
+              <a:schemeClr val="tx1"/>
+            </a:fontRef>
+          </p:style>
+        </p:cxnSp>
+        <p:grpSp>
+          <p:nvGrpSpPr>
+            <p:cNvPr id="194" name="Group 193"/>
+            <p:cNvGrpSpPr/>
+            <p:nvPr/>
+          </p:nvGrpSpPr>
+          <p:grpSpPr>
+            <a:xfrm>
+              <a:off x="6191532" y="2530153"/>
+              <a:ext cx="5400482" cy="4140111"/>
+              <a:chOff x="6191532" y="2390874"/>
+              <a:chExt cx="5400482" cy="4140111"/>
+            </a:xfrm>
+          </p:grpSpPr>
+          <p:sp>
+            <p:nvSpPr>
+              <p:cNvPr id="20" name="TextBox 19"/>
+              <p:cNvSpPr txBox="1"/>
+              <p:nvPr/>
+            </p:nvSpPr>
+            <p:spPr>
+              <a:xfrm>
+                <a:off x="6191532" y="2390874"/>
+                <a:ext cx="5400482" cy="4131793"/>
+              </a:xfrm>
+              <a:prstGeom prst="rect">
+                <a:avLst/>
+              </a:prstGeom>
+              <a:noFill/>
+              <a:ln>
+                <a:solidFill>
+                  <a:schemeClr val="accent1">
+                    <a:shade val="50000"/>
+                  </a:schemeClr>
+                </a:solidFill>
+              </a:ln>
+            </p:spPr>
+            <p:txBody>
+              <a:bodyPr wrap="square" rtlCol="0">
+                <a:noAutofit/>
+              </a:bodyPr>
+              <a:lstStyle/>
+              <a:p>
+                <a:pPr algn="ctr"/>
+                <a:r>
+                  <a:rPr lang="en-US" sz="1400" b="1" dirty="0" smtClean="0"/>
+                  <a:t>Plot Selected - Plot Stopped</a:t>
+                </a:r>
+              </a:p>
+              <a:p>
+                <a:pPr algn="ctr"/>
+                <a:endParaRPr lang="en-US" sz="1400" b="1" dirty="0"/>
+              </a:p>
+            </p:txBody>
+          </p:sp>
+          <p:pic>
+            <p:nvPicPr>
+              <p:cNvPr id="23" name="Picture 22"/>
+              <p:cNvPicPr>
+                <a:picLocks noChangeAspect="1"/>
+              </p:cNvPicPr>
+              <p:nvPr/>
+            </p:nvPicPr>
+            <p:blipFill>
+              <a:blip r:embed="rId3">
+                <a:extLst>
+                  <a:ext uri="{28A0092B-C50C-407E-A947-70E740481C1C}">
+                    <a14:useLocalDpi xmlns:a14="http://schemas.microsoft.com/office/drawing/2010/main" val="0"/>
+                  </a:ext>
+                </a:extLst>
+              </a:blip>
+              <a:stretch>
+                <a:fillRect/>
+              </a:stretch>
+            </p:blipFill>
+            <p:spPr>
+              <a:xfrm>
+                <a:off x="6696538" y="2742956"/>
+                <a:ext cx="1563397" cy="1896864"/>
+              </a:xfrm>
+              <a:prstGeom prst="rect">
+                <a:avLst/>
+              </a:prstGeom>
+            </p:spPr>
+          </p:pic>
+          <p:sp>
+            <p:nvSpPr>
+              <p:cNvPr id="28" name="Flowchart: Alternate Process 27"/>
+              <p:cNvSpPr/>
+              <p:nvPr/>
+            </p:nvSpPr>
+            <p:spPr>
+              <a:xfrm>
+                <a:off x="7115542" y="4761789"/>
+                <a:ext cx="725387" cy="292463"/>
+              </a:xfrm>
+              <a:prstGeom prst="flowChartAlternateProcess">
+                <a:avLst/>
+              </a:prstGeom>
+              <a:solidFill>
+                <a:schemeClr val="accent6">
+                  <a:alpha val="50000"/>
+                </a:schemeClr>
+              </a:solidFill>
+              <a:ln>
+                <a:noFill/>
+              </a:ln>
+            </p:spPr>
+            <p:style>
+              <a:lnRef idx="0">
+                <a:scrgbClr r="0" g="0" b="0"/>
+              </a:lnRef>
+              <a:fillRef idx="0">
+                <a:scrgbClr r="0" g="0" b="0"/>
+              </a:fillRef>
+              <a:effectRef idx="0">
+                <a:scrgbClr r="0" g="0" b="0"/>
+              </a:effectRef>
+              <a:fontRef idx="minor">
+                <a:schemeClr val="lt1"/>
+              </a:fontRef>
+            </p:style>
+            <p:txBody>
+              <a:bodyPr rtlCol="0" anchor="ctr"/>
+              <a:lstStyle/>
+              <a:p>
+                <a:pPr lvl="0" algn="ctr"/>
+                <a:r>
+                  <a:rPr lang="en-US" sz="1200" b="1" dirty="0">
+                    <a:solidFill>
+                      <a:prstClr val="black"/>
+                    </a:solidFill>
+                  </a:rPr>
+                  <a:t>ESC Key</a:t>
+                </a:r>
+                <a:endParaRPr lang="en-US" sz="1200" b="1" dirty="0">
+                  <a:solidFill>
+                    <a:prstClr val="black"/>
+                  </a:solidFill>
+                </a:endParaRPr>
+              </a:p>
+            </p:txBody>
+          </p:sp>
+          <p:sp>
+            <p:nvSpPr>
+              <p:cNvPr id="31" name="Flowchart: Alternate Process 30"/>
+              <p:cNvSpPr/>
+              <p:nvPr/>
+            </p:nvSpPr>
+            <p:spPr>
+              <a:xfrm>
+                <a:off x="7011110" y="6025941"/>
+                <a:ext cx="934247" cy="292463"/>
+              </a:xfrm>
+              <a:prstGeom prst="flowChartAlternateProcess">
+                <a:avLst/>
+              </a:prstGeom>
+              <a:solidFill>
+                <a:schemeClr val="accent3"/>
+              </a:solidFill>
+              <a:ln>
+                <a:noFill/>
+              </a:ln>
+            </p:spPr>
+            <p:style>
+              <a:lnRef idx="0">
+                <a:scrgbClr r="0" g="0" b="0"/>
+              </a:lnRef>
+              <a:fillRef idx="0">
+                <a:scrgbClr r="0" g="0" b="0"/>
+              </a:fillRef>
+              <a:effectRef idx="0">
+                <a:scrgbClr r="0" g="0" b="0"/>
+              </a:effectRef>
+              <a:fontRef idx="minor">
+                <a:schemeClr val="lt1"/>
+              </a:fontRef>
+            </p:style>
+            <p:txBody>
+              <a:bodyPr rtlCol="0" anchor="ctr"/>
+              <a:lstStyle/>
+              <a:p>
+                <a:pPr lvl="0" algn="ctr"/>
+                <a:r>
+                  <a:rPr lang="en-US" sz="1200" b="1" dirty="0" smtClean="0">
+                    <a:solidFill>
+                      <a:prstClr val="black"/>
+                    </a:solidFill>
+                  </a:rPr>
+                  <a:t>Start Plot</a:t>
+                </a:r>
+                <a:endParaRPr lang="en-US" sz="1200" b="1" dirty="0">
+                  <a:solidFill>
+                    <a:prstClr val="black"/>
+                  </a:solidFill>
+                </a:endParaRPr>
+              </a:p>
+            </p:txBody>
+          </p:sp>
+          <p:sp>
+            <p:nvSpPr>
+              <p:cNvPr id="32" name="Flowchart: Manual Input 31"/>
+              <p:cNvSpPr/>
+              <p:nvPr/>
+            </p:nvSpPr>
+            <p:spPr>
+              <a:xfrm>
+                <a:off x="6588788" y="5131279"/>
+                <a:ext cx="1778893" cy="354542"/>
+              </a:xfrm>
+              <a:prstGeom prst="flowChartManualInput">
+                <a:avLst/>
+              </a:prstGeom>
+              <a:solidFill>
+                <a:schemeClr val="accent4">
+                  <a:alpha val="50000"/>
+                </a:schemeClr>
+              </a:solidFill>
+              <a:ln>
+                <a:noFill/>
+              </a:ln>
+            </p:spPr>
+            <p:style>
+              <a:lnRef idx="0">
+                <a:scrgbClr r="0" g="0" b="0"/>
+              </a:lnRef>
+              <a:fillRef idx="0">
+                <a:scrgbClr r="0" g="0" b="0"/>
+              </a:fillRef>
+              <a:effectRef idx="0">
+                <a:scrgbClr r="0" g="0" b="0"/>
+              </a:effectRef>
+              <a:fontRef idx="minor">
+                <a:schemeClr val="lt1"/>
+              </a:fontRef>
+            </p:style>
+            <p:txBody>
+              <a:bodyPr rtlCol="0" anchor="ctr">
+                <a:spAutoFit/>
+              </a:bodyPr>
+              <a:lstStyle/>
+              <a:p>
+                <a:pPr lvl="0" algn="ctr"/>
+                <a:r>
+                  <a:rPr lang="en-US" sz="1200" b="1" dirty="0">
+                    <a:solidFill>
+                      <a:prstClr val="black"/>
+                    </a:solidFill>
+                  </a:rPr>
+                  <a:t>Click on </a:t>
+                </a:r>
+                <a:r>
+                  <a:rPr lang="en-US" sz="1200" b="1" dirty="0" smtClean="0">
+                    <a:solidFill>
+                      <a:prstClr val="black"/>
+                    </a:solidFill>
+                  </a:rPr>
+                  <a:t>Operation Mode</a:t>
+                </a:r>
+                <a:endParaRPr lang="en-US" sz="1200" b="1" dirty="0">
+                  <a:solidFill>
+                    <a:prstClr val="black"/>
+                  </a:solidFill>
+                </a:endParaRPr>
+              </a:p>
+            </p:txBody>
+          </p:sp>
+          <p:sp>
+            <p:nvSpPr>
+              <p:cNvPr id="33" name="Flowchart: Manual Input 32"/>
+              <p:cNvSpPr/>
+              <p:nvPr/>
+            </p:nvSpPr>
+            <p:spPr>
+              <a:xfrm>
+                <a:off x="6413631" y="5563334"/>
+                <a:ext cx="2129206" cy="354542"/>
+              </a:xfrm>
+              <a:prstGeom prst="flowChartManualInput">
+                <a:avLst/>
+              </a:prstGeom>
+              <a:solidFill>
+                <a:schemeClr val="accent4">
+                  <a:alpha val="50000"/>
+                </a:schemeClr>
+              </a:solidFill>
+              <a:ln>
+                <a:noFill/>
+              </a:ln>
+            </p:spPr>
+            <p:style>
+              <a:lnRef idx="0">
+                <a:scrgbClr r="0" g="0" b="0"/>
+              </a:lnRef>
+              <a:fillRef idx="0">
+                <a:scrgbClr r="0" g="0" b="0"/>
+              </a:fillRef>
+              <a:effectRef idx="0">
+                <a:scrgbClr r="0" g="0" b="0"/>
+              </a:effectRef>
+              <a:fontRef idx="minor">
+                <a:schemeClr val="lt1"/>
+              </a:fontRef>
+            </p:style>
+            <p:txBody>
+              <a:bodyPr rtlCol="0" anchor="ctr">
+                <a:spAutoFit/>
+              </a:bodyPr>
+              <a:lstStyle/>
+              <a:p>
+                <a:pPr lvl="0" algn="ctr"/>
+                <a:r>
+                  <a:rPr lang="en-US" sz="1200" b="1" dirty="0">
+                    <a:solidFill>
+                      <a:prstClr val="black"/>
+                    </a:solidFill>
+                  </a:rPr>
+                  <a:t>Click on </a:t>
+                </a:r>
+                <a:r>
+                  <a:rPr lang="en-US" sz="1200" b="1" dirty="0" smtClean="0">
+                    <a:solidFill>
+                      <a:prstClr val="black"/>
+                    </a:solidFill>
+                  </a:rPr>
+                  <a:t>another </a:t>
+                </a:r>
+                <a:r>
+                  <a:rPr lang="en-US" sz="1200" b="1" dirty="0">
+                    <a:solidFill>
+                      <a:prstClr val="black"/>
+                    </a:solidFill>
+                  </a:rPr>
+                  <a:t>Plot Info Line</a:t>
+                </a:r>
+                <a:endParaRPr lang="en-US" sz="1200" b="1" dirty="0">
+                  <a:solidFill>
+                    <a:prstClr val="black"/>
+                  </a:solidFill>
+                </a:endParaRPr>
+              </a:p>
+            </p:txBody>
+          </p:sp>
+          <p:sp>
+            <p:nvSpPr>
+              <p:cNvPr id="161" name="TextBox 160"/>
+              <p:cNvSpPr txBox="1"/>
+              <p:nvPr/>
+            </p:nvSpPr>
+            <p:spPr>
+              <a:xfrm>
+                <a:off x="6191532" y="2399192"/>
+                <a:ext cx="5400482" cy="4131793"/>
+              </a:xfrm>
+              <a:prstGeom prst="rect">
+                <a:avLst/>
+              </a:prstGeom>
+              <a:noFill/>
+              <a:ln>
+                <a:solidFill>
+                  <a:schemeClr val="accent1">
+                    <a:shade val="50000"/>
+                  </a:schemeClr>
+                </a:solidFill>
+              </a:ln>
+            </p:spPr>
+            <p:txBody>
+              <a:bodyPr wrap="square" rtlCol="0">
+                <a:noAutofit/>
+              </a:bodyPr>
+              <a:lstStyle/>
+              <a:p>
+                <a:pPr algn="ctr"/>
+                <a:r>
+                  <a:rPr lang="en-US" sz="1400" b="1" dirty="0" smtClean="0"/>
+                  <a:t>Plot Selected - Plot Stopped</a:t>
+                </a:r>
+              </a:p>
+              <a:p>
+                <a:pPr algn="ctr"/>
+                <a:endParaRPr lang="en-US" sz="1400" b="1" dirty="0"/>
+              </a:p>
+            </p:txBody>
+          </p:sp>
+          <p:cxnSp>
+            <p:nvCxnSpPr>
+              <p:cNvPr id="113" name="Elbow Connector 112"/>
+              <p:cNvCxnSpPr>
+                <a:stCxn id="33" idx="1"/>
+                <a:endCxn id="20" idx="0"/>
+              </p:cNvCxnSpPr>
+              <p:nvPr/>
+            </p:nvCxnSpPr>
+            <p:spPr>
+              <a:xfrm rot="10800000" flipH="1">
+                <a:off x="6413631" y="2390875"/>
+                <a:ext cx="2478142" cy="3349731"/>
+              </a:xfrm>
+              <a:prstGeom prst="bentConnector4">
+                <a:avLst>
+                  <a:gd name="adj1" fmla="val -16720"/>
+                  <a:gd name="adj2" fmla="val 104836"/>
+                </a:avLst>
+              </a:prstGeom>
+              <a:ln w="25400">
+                <a:solidFill>
+                  <a:schemeClr val="accent4"/>
+                </a:solidFill>
+                <a:tailEnd type="triangle" w="lg" len="lg"/>
+              </a:ln>
+            </p:spPr>
+            <p:style>
+              <a:lnRef idx="1">
+                <a:schemeClr val="accent1"/>
+              </a:lnRef>
+              <a:fillRef idx="0">
+                <a:schemeClr val="accent1"/>
+              </a:fillRef>
+              <a:effectRef idx="0">
+                <a:schemeClr val="accent1"/>
+              </a:effectRef>
+              <a:fontRef idx="minor">
+                <a:schemeClr val="tx1"/>
+              </a:fontRef>
+            </p:style>
+          </p:cxnSp>
+          <p:sp>
+            <p:nvSpPr>
+              <p:cNvPr id="119" name="Rounded Rectangle 118"/>
+              <p:cNvSpPr/>
+              <p:nvPr/>
+            </p:nvSpPr>
+            <p:spPr>
+              <a:xfrm>
+                <a:off x="6586022" y="4165316"/>
+                <a:ext cx="1788411" cy="490488"/>
+              </a:xfrm>
+              <a:prstGeom prst="roundRect">
+                <a:avLst/>
+              </a:prstGeom>
+              <a:solidFill>
+                <a:srgbClr val="FF0000">
+                  <a:alpha val="15000"/>
+                </a:srgbClr>
+              </a:solidFill>
+              <a:ln>
+                <a:solidFill>
+                  <a:srgbClr val="FF0000"/>
+                </a:solidFill>
+              </a:ln>
+            </p:spPr>
+            <p:style>
+              <a:lnRef idx="2">
+                <a:schemeClr val="accent1">
+                  <a:shade val="50000"/>
+                </a:schemeClr>
+              </a:lnRef>
+              <a:fillRef idx="1">
+                <a:schemeClr val="accent1"/>
+              </a:fillRef>
+              <a:effectRef idx="0">
+                <a:schemeClr val="accent1"/>
+              </a:effectRef>
+              <a:fontRef idx="minor">
+                <a:schemeClr val="lt1"/>
+              </a:fontRef>
+            </p:style>
+            <p:txBody>
+              <a:bodyPr rtlCol="0" anchor="ctr"/>
+              <a:lstStyle/>
+              <a:p>
+                <a:pPr algn="ctr"/>
+                <a:endParaRPr lang="en-US"/>
+              </a:p>
+            </p:txBody>
+          </p:sp>
+          <p:sp>
+            <p:nvSpPr>
+              <p:cNvPr id="128" name="Flowchart: Manual Input 127"/>
+              <p:cNvSpPr/>
+              <p:nvPr/>
+            </p:nvSpPr>
+            <p:spPr>
+              <a:xfrm>
+                <a:off x="9248635" y="2687820"/>
+                <a:ext cx="1710363" cy="354542"/>
+              </a:xfrm>
+              <a:prstGeom prst="flowChartManualInput">
+                <a:avLst/>
+              </a:prstGeom>
+              <a:solidFill>
+                <a:srgbClr val="FF0000">
+                  <a:alpha val="15000"/>
+                </a:srgbClr>
+              </a:solidFill>
+              <a:ln>
+                <a:noFill/>
+              </a:ln>
+            </p:spPr>
+            <p:style>
+              <a:lnRef idx="0">
+                <a:scrgbClr r="0" g="0" b="0"/>
+              </a:lnRef>
+              <a:fillRef idx="0">
+                <a:scrgbClr r="0" g="0" b="0"/>
+              </a:fillRef>
+              <a:effectRef idx="0">
+                <a:scrgbClr r="0" g="0" b="0"/>
+              </a:effectRef>
+              <a:fontRef idx="minor">
+                <a:schemeClr val="lt1"/>
+              </a:fontRef>
+            </p:style>
+            <p:txBody>
+              <a:bodyPr rtlCol="0" anchor="ctr">
+                <a:spAutoFit/>
+              </a:bodyPr>
+              <a:lstStyle/>
+              <a:p>
+                <a:pPr lvl="0" algn="ctr"/>
+                <a:r>
+                  <a:rPr lang="en-US" sz="1200" b="1" dirty="0" smtClean="0">
+                    <a:solidFill>
+                      <a:prstClr val="black"/>
+                    </a:solidFill>
+                  </a:rPr>
+                  <a:t>Select a Measure</a:t>
+                </a:r>
+                <a:endParaRPr lang="en-US" sz="1200" b="1" dirty="0">
+                  <a:solidFill>
+                    <a:prstClr val="black"/>
+                  </a:solidFill>
+                </a:endParaRPr>
+              </a:p>
+            </p:txBody>
+          </p:sp>
+          <p:cxnSp>
+            <p:nvCxnSpPr>
+              <p:cNvPr id="130" name="Curved Connector 129"/>
+              <p:cNvCxnSpPr>
+                <a:stCxn id="119" idx="3"/>
+                <a:endCxn id="128" idx="1"/>
+              </p:cNvCxnSpPr>
+              <p:nvPr/>
+            </p:nvCxnSpPr>
+            <p:spPr>
+              <a:xfrm flipV="1">
+                <a:off x="8374433" y="2865091"/>
+                <a:ext cx="874202" cy="1545469"/>
+              </a:xfrm>
+              <a:prstGeom prst="curvedConnector3">
+                <a:avLst>
+                  <a:gd name="adj1" fmla="val 20906"/>
+                </a:avLst>
+              </a:prstGeom>
+              <a:ln w="25400">
+                <a:solidFill>
+                  <a:srgbClr val="FF0000"/>
+                </a:solidFill>
+                <a:prstDash val="sysDash"/>
+                <a:headEnd type="none"/>
+                <a:tailEnd type="triangle" w="lg" len="lg"/>
+              </a:ln>
+            </p:spPr>
+            <p:style>
+              <a:lnRef idx="1">
+                <a:schemeClr val="accent1"/>
+              </a:lnRef>
+              <a:fillRef idx="0">
+                <a:schemeClr val="accent1"/>
+              </a:fillRef>
+              <a:effectRef idx="0">
+                <a:schemeClr val="accent1"/>
+              </a:effectRef>
+              <a:fontRef idx="minor">
+                <a:schemeClr val="tx1"/>
+              </a:fontRef>
+            </p:style>
+          </p:cxnSp>
+          <p:cxnSp>
+            <p:nvCxnSpPr>
+              <p:cNvPr id="133" name="Elbow Connector 132"/>
+              <p:cNvCxnSpPr>
+                <a:stCxn id="128" idx="2"/>
+                <a:endCxn id="153" idx="0"/>
+              </p:cNvCxnSpPr>
+              <p:nvPr/>
+            </p:nvCxnSpPr>
+            <p:spPr>
+              <a:xfrm rot="16200000" flipH="1">
+                <a:off x="9890460" y="3255718"/>
+                <a:ext cx="431947" cy="5233"/>
+              </a:xfrm>
+              <a:prstGeom prst="bentConnector3">
+                <a:avLst/>
+              </a:prstGeom>
+              <a:ln w="25400">
+                <a:solidFill>
+                  <a:srgbClr val="FF8181"/>
+                </a:solidFill>
+                <a:tailEnd type="triangle" w="lg" len="lg"/>
+              </a:ln>
+            </p:spPr>
+            <p:style>
+              <a:lnRef idx="1">
+                <a:schemeClr val="accent1"/>
+              </a:lnRef>
+              <a:fillRef idx="0">
+                <a:schemeClr val="accent1"/>
+              </a:fillRef>
+              <a:effectRef idx="0">
+                <a:schemeClr val="accent1"/>
+              </a:effectRef>
+              <a:fontRef idx="minor">
+                <a:schemeClr val="tx1"/>
+              </a:fontRef>
+            </p:style>
+          </p:cxnSp>
+          <p:sp>
+            <p:nvSpPr>
+              <p:cNvPr id="153" name="TextBox 152"/>
+              <p:cNvSpPr txBox="1"/>
+              <p:nvPr/>
+            </p:nvSpPr>
+            <p:spPr>
+              <a:xfrm>
+                <a:off x="8885422" y="3474309"/>
+                <a:ext cx="2447256" cy="2262877"/>
+              </a:xfrm>
+              <a:prstGeom prst="rect">
+                <a:avLst/>
+              </a:prstGeom>
+              <a:solidFill>
+                <a:srgbClr val="FF0000">
+                  <a:alpha val="5000"/>
+                </a:srgbClr>
+              </a:solidFill>
+              <a:ln w="12700">
+                <a:solidFill>
+                  <a:srgbClr val="FF0000"/>
+                </a:solidFill>
+              </a:ln>
+            </p:spPr>
+            <p:txBody>
+              <a:bodyPr wrap="square" rtlCol="0">
+                <a:noAutofit/>
+              </a:bodyPr>
+              <a:lstStyle/>
+              <a:p>
+                <a:pPr algn="ctr"/>
+                <a:r>
+                  <a:rPr lang="en-US" sz="1400" b="1" dirty="0" smtClean="0">
+                    <a:solidFill>
+                      <a:srgbClr val="FF0000"/>
+                    </a:solidFill>
+                  </a:rPr>
+                  <a:t>Measure Mode</a:t>
+                </a:r>
+                <a:endParaRPr lang="en-US" sz="1400" b="1" dirty="0">
+                  <a:solidFill>
+                    <a:srgbClr val="FF0000"/>
+                  </a:solidFill>
+                </a:endParaRPr>
+              </a:p>
+            </p:txBody>
+          </p:sp>
+          <p:sp>
+            <p:nvSpPr>
+              <p:cNvPr id="163" name="Flowchart: Alternate Process 162"/>
+              <p:cNvSpPr/>
+              <p:nvPr/>
+            </p:nvSpPr>
+            <p:spPr>
+              <a:xfrm>
+                <a:off x="9738428" y="3976457"/>
+                <a:ext cx="725387" cy="292463"/>
+              </a:xfrm>
+              <a:prstGeom prst="flowChartAlternateProcess">
+                <a:avLst/>
+              </a:prstGeom>
+              <a:solidFill>
+                <a:schemeClr val="accent6">
+                  <a:alpha val="50000"/>
+                </a:schemeClr>
+              </a:solidFill>
+              <a:ln>
+                <a:noFill/>
+              </a:ln>
+            </p:spPr>
+            <p:style>
+              <a:lnRef idx="0">
+                <a:scrgbClr r="0" g="0" b="0"/>
+              </a:lnRef>
+              <a:fillRef idx="0">
+                <a:scrgbClr r="0" g="0" b="0"/>
+              </a:fillRef>
+              <a:effectRef idx="0">
+                <a:scrgbClr r="0" g="0" b="0"/>
+              </a:effectRef>
+              <a:fontRef idx="minor">
+                <a:schemeClr val="lt1"/>
+              </a:fontRef>
+            </p:style>
+            <p:txBody>
+              <a:bodyPr rtlCol="0" anchor="ctr"/>
+              <a:lstStyle/>
+              <a:p>
+                <a:pPr lvl="0" algn="ctr"/>
+                <a:r>
+                  <a:rPr lang="en-US" sz="1200" b="1" dirty="0">
+                    <a:solidFill>
+                      <a:prstClr val="black"/>
+                    </a:solidFill>
+                  </a:rPr>
+                  <a:t>ESC Key</a:t>
+                </a:r>
+                <a:endParaRPr lang="en-US" sz="1200" b="1" dirty="0">
+                  <a:solidFill>
+                    <a:prstClr val="black"/>
+                  </a:solidFill>
+                </a:endParaRPr>
+              </a:p>
+            </p:txBody>
+          </p:sp>
+          <p:sp>
+            <p:nvSpPr>
+              <p:cNvPr id="164" name="Flowchart: Alternate Process 163"/>
+              <p:cNvSpPr/>
+              <p:nvPr/>
+            </p:nvSpPr>
+            <p:spPr>
+              <a:xfrm>
+                <a:off x="9633996" y="5240609"/>
+                <a:ext cx="934247" cy="292463"/>
+              </a:xfrm>
+              <a:prstGeom prst="flowChartAlternateProcess">
+                <a:avLst/>
+              </a:prstGeom>
+              <a:solidFill>
+                <a:schemeClr val="accent3"/>
+              </a:solidFill>
+              <a:ln>
+                <a:noFill/>
+              </a:ln>
+            </p:spPr>
+            <p:style>
+              <a:lnRef idx="0">
+                <a:scrgbClr r="0" g="0" b="0"/>
+              </a:lnRef>
+              <a:fillRef idx="0">
+                <a:scrgbClr r="0" g="0" b="0"/>
+              </a:fillRef>
+              <a:effectRef idx="0">
+                <a:scrgbClr r="0" g="0" b="0"/>
+              </a:effectRef>
+              <a:fontRef idx="minor">
+                <a:schemeClr val="lt1"/>
+              </a:fontRef>
+            </p:style>
+            <p:txBody>
+              <a:bodyPr rtlCol="0" anchor="ctr"/>
+              <a:lstStyle/>
+              <a:p>
+                <a:pPr lvl="0" algn="ctr"/>
+                <a:r>
+                  <a:rPr lang="en-US" sz="1200" b="1" dirty="0" smtClean="0">
+                    <a:solidFill>
+                      <a:prstClr val="black"/>
+                    </a:solidFill>
+                  </a:rPr>
+                  <a:t>Start Plot</a:t>
+                </a:r>
+                <a:endParaRPr lang="en-US" sz="1200" b="1" dirty="0">
+                  <a:solidFill>
+                    <a:prstClr val="black"/>
+                  </a:solidFill>
+                </a:endParaRPr>
+              </a:p>
+            </p:txBody>
+          </p:sp>
+          <p:sp>
+            <p:nvSpPr>
+              <p:cNvPr id="165" name="Flowchart: Manual Input 164"/>
+              <p:cNvSpPr/>
+              <p:nvPr/>
+            </p:nvSpPr>
+            <p:spPr>
+              <a:xfrm>
+                <a:off x="9211674" y="4345947"/>
+                <a:ext cx="1778893" cy="354542"/>
+              </a:xfrm>
+              <a:prstGeom prst="flowChartManualInput">
+                <a:avLst/>
+              </a:prstGeom>
+              <a:solidFill>
+                <a:schemeClr val="accent4">
+                  <a:alpha val="50000"/>
+                </a:schemeClr>
+              </a:solidFill>
+              <a:ln>
+                <a:noFill/>
+              </a:ln>
+            </p:spPr>
+            <p:style>
+              <a:lnRef idx="0">
+                <a:scrgbClr r="0" g="0" b="0"/>
+              </a:lnRef>
+              <a:fillRef idx="0">
+                <a:scrgbClr r="0" g="0" b="0"/>
+              </a:fillRef>
+              <a:effectRef idx="0">
+                <a:scrgbClr r="0" g="0" b="0"/>
+              </a:effectRef>
+              <a:fontRef idx="minor">
+                <a:schemeClr val="lt1"/>
+              </a:fontRef>
+            </p:style>
+            <p:txBody>
+              <a:bodyPr rtlCol="0" anchor="ctr">
+                <a:spAutoFit/>
+              </a:bodyPr>
+              <a:lstStyle/>
+              <a:p>
+                <a:pPr lvl="0" algn="ctr"/>
+                <a:r>
+                  <a:rPr lang="en-US" sz="1200" b="1" dirty="0">
+                    <a:solidFill>
+                      <a:prstClr val="black"/>
+                    </a:solidFill>
+                  </a:rPr>
+                  <a:t>Click on </a:t>
+                </a:r>
+                <a:r>
+                  <a:rPr lang="en-US" sz="1200" b="1" dirty="0" smtClean="0">
+                    <a:solidFill>
+                      <a:prstClr val="black"/>
+                    </a:solidFill>
+                  </a:rPr>
+                  <a:t>Operation Mode</a:t>
+                </a:r>
+                <a:endParaRPr lang="en-US" sz="1200" b="1" dirty="0">
+                  <a:solidFill>
+                    <a:prstClr val="black"/>
+                  </a:solidFill>
+                </a:endParaRPr>
+              </a:p>
+            </p:txBody>
+          </p:sp>
+          <p:sp>
+            <p:nvSpPr>
+              <p:cNvPr id="166" name="Flowchart: Manual Input 165"/>
+              <p:cNvSpPr/>
+              <p:nvPr/>
+            </p:nvSpPr>
+            <p:spPr>
+              <a:xfrm>
+                <a:off x="9036517" y="4778002"/>
+                <a:ext cx="2129206" cy="354542"/>
+              </a:xfrm>
+              <a:prstGeom prst="flowChartManualInput">
+                <a:avLst/>
+              </a:prstGeom>
+              <a:solidFill>
+                <a:schemeClr val="accent4">
+                  <a:alpha val="50000"/>
+                </a:schemeClr>
+              </a:solidFill>
+              <a:ln>
+                <a:noFill/>
+              </a:ln>
+            </p:spPr>
+            <p:style>
+              <a:lnRef idx="0">
+                <a:scrgbClr r="0" g="0" b="0"/>
+              </a:lnRef>
+              <a:fillRef idx="0">
+                <a:scrgbClr r="0" g="0" b="0"/>
+              </a:fillRef>
+              <a:effectRef idx="0">
+                <a:scrgbClr r="0" g="0" b="0"/>
+              </a:effectRef>
+              <a:fontRef idx="minor">
+                <a:schemeClr val="lt1"/>
+              </a:fontRef>
+            </p:style>
+            <p:txBody>
+              <a:bodyPr rtlCol="0" anchor="ctr">
+                <a:spAutoFit/>
+              </a:bodyPr>
+              <a:lstStyle/>
+              <a:p>
+                <a:pPr lvl="0" algn="ctr"/>
+                <a:r>
+                  <a:rPr lang="en-US" sz="1200" b="1" dirty="0">
+                    <a:solidFill>
+                      <a:prstClr val="black"/>
+                    </a:solidFill>
+                  </a:rPr>
+                  <a:t>Click on </a:t>
+                </a:r>
+                <a:r>
+                  <a:rPr lang="en-US" sz="1200" b="1" dirty="0" smtClean="0">
+                    <a:solidFill>
+                      <a:prstClr val="black"/>
+                    </a:solidFill>
+                  </a:rPr>
+                  <a:t>another </a:t>
+                </a:r>
+                <a:r>
+                  <a:rPr lang="en-US" sz="1200" b="1" dirty="0">
+                    <a:solidFill>
+                      <a:prstClr val="black"/>
+                    </a:solidFill>
+                  </a:rPr>
+                  <a:t>Plot Info Line</a:t>
+                </a:r>
+                <a:endParaRPr lang="en-US" sz="1200" b="1" dirty="0">
+                  <a:solidFill>
+                    <a:prstClr val="black"/>
+                  </a:solidFill>
+                </a:endParaRPr>
+              </a:p>
+            </p:txBody>
+          </p:sp>
+          <p:cxnSp>
+            <p:nvCxnSpPr>
+              <p:cNvPr id="173" name="Elbow Connector 172"/>
+              <p:cNvCxnSpPr>
+                <a:stCxn id="163" idx="3"/>
+                <a:endCxn id="161" idx="0"/>
+              </p:cNvCxnSpPr>
+              <p:nvPr/>
+            </p:nvCxnSpPr>
+            <p:spPr>
+              <a:xfrm flipH="1" flipV="1">
+                <a:off x="8891773" y="2399192"/>
+                <a:ext cx="1572042" cy="1723497"/>
+              </a:xfrm>
+              <a:prstGeom prst="bentConnector4">
+                <a:avLst>
+                  <a:gd name="adj1" fmla="val -63581"/>
+                  <a:gd name="adj2" fmla="val 109750"/>
+                </a:avLst>
+              </a:prstGeom>
+              <a:ln w="25400">
+                <a:solidFill>
+                  <a:schemeClr val="accent6">
+                    <a:lumMod val="60000"/>
+                    <a:lumOff val="40000"/>
+                  </a:schemeClr>
+                </a:solidFill>
+                <a:tailEnd type="triangle" w="lg" len="lg"/>
+              </a:ln>
+            </p:spPr>
+            <p:style>
+              <a:lnRef idx="1">
+                <a:schemeClr val="accent1"/>
+              </a:lnRef>
+              <a:fillRef idx="0">
+                <a:schemeClr val="accent1"/>
+              </a:fillRef>
+              <a:effectRef idx="0">
+                <a:schemeClr val="accent1"/>
+              </a:effectRef>
+              <a:fontRef idx="minor">
+                <a:schemeClr val="tx1"/>
+              </a:fontRef>
+            </p:style>
+          </p:cxnSp>
+          <p:cxnSp>
+            <p:nvCxnSpPr>
+              <p:cNvPr id="185" name="Elbow Connector 184"/>
+              <p:cNvCxnSpPr>
+                <a:stCxn id="166" idx="3"/>
+                <a:endCxn id="161" idx="0"/>
+              </p:cNvCxnSpPr>
+              <p:nvPr/>
+            </p:nvCxnSpPr>
+            <p:spPr>
+              <a:xfrm flipH="1" flipV="1">
+                <a:off x="8891773" y="2399192"/>
+                <a:ext cx="2273950" cy="2556081"/>
+              </a:xfrm>
+              <a:prstGeom prst="bentConnector4">
+                <a:avLst>
+                  <a:gd name="adj1" fmla="val -33061"/>
+                  <a:gd name="adj2" fmla="val 112971"/>
+                </a:avLst>
+              </a:prstGeom>
+              <a:ln w="25400">
+                <a:solidFill>
+                  <a:schemeClr val="accent4">
+                    <a:lumMod val="60000"/>
+                    <a:lumOff val="40000"/>
+                  </a:schemeClr>
+                </a:solidFill>
+                <a:tailEnd type="triangle" w="lg" len="lg"/>
+              </a:ln>
+            </p:spPr>
+            <p:style>
+              <a:lnRef idx="1">
+                <a:schemeClr val="accent1"/>
+              </a:lnRef>
+              <a:fillRef idx="0">
+                <a:schemeClr val="accent1"/>
+              </a:fillRef>
+              <a:effectRef idx="0">
+                <a:schemeClr val="accent1"/>
+              </a:effectRef>
+              <a:fontRef idx="minor">
+                <a:schemeClr val="tx1"/>
+              </a:fontRef>
+            </p:style>
+          </p:cxnSp>
+        </p:grpSp>
+      </p:grpSp>
+      <p:cxnSp>
+        <p:nvCxnSpPr>
+          <p:cNvPr id="207" name="Elbow Connector 206"/>
+          <p:cNvCxnSpPr>
+            <a:stCxn id="164" idx="2"/>
+            <a:endCxn id="19" idx="3"/>
+          </p:cNvCxnSpPr>
+          <p:nvPr/>
+        </p:nvCxnSpPr>
+        <p:spPr>
+          <a:xfrm rot="5400000" flipH="1">
+            <a:off x="4547777" y="119009"/>
+            <a:ext cx="4407257" cy="6699429"/>
+          </a:xfrm>
+          <a:prstGeom prst="bentConnector4">
+            <a:avLst>
+              <a:gd name="adj1" fmla="val -20164"/>
+              <a:gd name="adj2" fmla="val 83857"/>
+            </a:avLst>
+          </a:prstGeom>
+          <a:ln w="25400">
+            <a:solidFill>
+              <a:schemeClr val="tx1">
+                <a:lumMod val="65000"/>
+                <a:lumOff val="35000"/>
+              </a:schemeClr>
+            </a:solidFill>
+            <a:tailEnd type="triangle" w="lg" len="lg"/>
+          </a:ln>
+        </p:spPr>
+        <p:style>
+          <a:lnRef idx="1">
+            <a:schemeClr val="accent1"/>
+          </a:lnRef>
+          <a:fillRef idx="0">
+            <a:schemeClr val="accent1"/>
+          </a:fillRef>
+          <a:effectRef idx="0">
+            <a:schemeClr val="accent1"/>
+          </a:effectRef>
+          <a:fontRef idx="minor">
+            <a:schemeClr val="tx1"/>
+          </a:fontRef>
+        </p:style>
+      </p:cxnSp>
+      <p:sp>
+        <p:nvSpPr>
+          <p:cNvPr id="213" name="TextBox 212"/>
+          <p:cNvSpPr txBox="1"/>
+          <p:nvPr/>
+        </p:nvSpPr>
+        <p:spPr>
+          <a:xfrm>
+            <a:off x="3808990" y="202120"/>
+            <a:ext cx="425116" cy="307777"/>
+          </a:xfrm>
+          <a:prstGeom prst="rect">
+            <a:avLst/>
+          </a:prstGeom>
+          <a:noFill/>
+        </p:spPr>
+        <p:txBody>
+          <a:bodyPr wrap="none" rtlCol="0">
+            <a:spAutoFit/>
+          </a:bodyPr>
+          <a:lstStyle/>
+          <a:p>
+            <a:r>
+              <a:rPr lang="en-US" sz="1400" b="1" dirty="0" smtClean="0">
+                <a:solidFill>
+                  <a:srgbClr val="FF0000"/>
+                </a:solidFill>
+              </a:rPr>
+              <a:t>NO</a:t>
+            </a:r>
+            <a:endParaRPr lang="en-US" sz="1400" b="1" dirty="0">
+              <a:solidFill>
+                <a:srgbClr val="FF0000"/>
+              </a:solidFill>
+            </a:endParaRPr>
+          </a:p>
+        </p:txBody>
+      </p:sp>
+      <p:sp>
+        <p:nvSpPr>
+          <p:cNvPr id="214" name="TextBox 213"/>
+          <p:cNvSpPr txBox="1"/>
+          <p:nvPr/>
+        </p:nvSpPr>
+        <p:spPr>
+          <a:xfrm>
+            <a:off x="7000172" y="189256"/>
+            <a:ext cx="449034" cy="307777"/>
+          </a:xfrm>
+          <a:prstGeom prst="rect">
+            <a:avLst/>
+          </a:prstGeom>
+          <a:noFill/>
+        </p:spPr>
+        <p:txBody>
+          <a:bodyPr wrap="none" rtlCol="0">
+            <a:spAutoFit/>
+          </a:bodyPr>
+          <a:lstStyle/>
+          <a:p>
+            <a:r>
+              <a:rPr lang="en-US" sz="1400" b="1" dirty="0" smtClean="0">
+                <a:solidFill>
+                  <a:srgbClr val="FF0000"/>
+                </a:solidFill>
+              </a:rPr>
+              <a:t>YES</a:t>
+            </a:r>
+            <a:endParaRPr lang="en-US" sz="1400" b="1" dirty="0">
+              <a:solidFill>
+                <a:srgbClr val="FF0000"/>
+              </a:solidFill>
+            </a:endParaRPr>
+          </a:p>
+        </p:txBody>
+      </p:sp>
+    </p:spTree>
+    <p:extLst>
+      <p:ext uri="{BB962C8B-B14F-4D97-AF65-F5344CB8AC3E}">
+        <p14:creationId xmlns:p14="http://schemas.microsoft.com/office/powerpoint/2010/main" val="3815407654"/>
       </p:ext>
     </p:extLst>
   </p:cSld>
@@ -3272,14 +6216,59 @@
         </p:blipFill>
         <p:spPr>
           <a:xfrm>
-            <a:off x="821871" y="3167743"/>
-            <a:ext cx="10058400" cy="498248"/>
+            <a:off x="634670" y="3167743"/>
+            <a:ext cx="9279059" cy="498248"/>
           </a:xfrm>
           <a:prstGeom prst="rect">
             <a:avLst/>
           </a:prstGeom>
         </p:spPr>
       </p:pic>
+      <p:sp>
+        <p:nvSpPr>
+          <p:cNvPr id="6" name="Rounded Rectangle 5"/>
+          <p:cNvSpPr/>
+          <p:nvPr/>
+        </p:nvSpPr>
+        <p:spPr>
+          <a:xfrm>
+            <a:off x="613104" y="3124943"/>
+            <a:ext cx="4069360" cy="583847"/>
+          </a:xfrm>
+          <a:prstGeom prst="roundRect">
+            <a:avLst/>
+          </a:prstGeom>
+          <a:solidFill>
+            <a:schemeClr val="accent1">
+              <a:alpha val="10000"/>
+            </a:schemeClr>
+          </a:solidFill>
+        </p:spPr>
+        <p:style>
+          <a:lnRef idx="2">
+            <a:schemeClr val="accent1">
+              <a:shade val="50000"/>
+            </a:schemeClr>
+          </a:lnRef>
+          <a:fillRef idx="1">
+            <a:schemeClr val="accent1"/>
+          </a:fillRef>
+          <a:effectRef idx="0">
+            <a:schemeClr val="accent1"/>
+          </a:effectRef>
+          <a:fontRef idx="minor">
+            <a:schemeClr val="lt1"/>
+          </a:fontRef>
+        </p:style>
+        <p:txBody>
+          <a:bodyPr rtlCol="0" anchor="ctr"/>
+          <a:lstStyle/>
+          <a:p>
+            <a:pPr algn="ctr"/>
+            <a:endParaRPr lang="fr-FR"/>
+          </a:p>
+        </p:txBody>
+      </p:sp>
       <p:sp>
         <p:nvSpPr>
           <p:cNvPr id="5" name="Rounded Rectangular Callout 4"/>
@@ -3343,59 +6332,14 @@
       </p:sp>
       <p:sp>
         <p:nvSpPr>
-          <p:cNvPr id="6" name="Rounded Rectangle 5"/>
-          <p:cNvSpPr/>
-          <p:nvPr/>
-        </p:nvSpPr>
-        <p:spPr>
-          <a:xfrm>
-            <a:off x="613104" y="3124943"/>
-            <a:ext cx="4198236" cy="583847"/>
-          </a:xfrm>
-          <a:prstGeom prst="roundRect">
-            <a:avLst/>
-          </a:prstGeom>
-          <a:solidFill>
-            <a:schemeClr val="accent1">
-              <a:alpha val="10000"/>
-            </a:schemeClr>
-          </a:solidFill>
-        </p:spPr>
-        <p:style>
-          <a:lnRef idx="2">
-            <a:schemeClr val="accent1">
-              <a:shade val="50000"/>
-            </a:schemeClr>
-          </a:lnRef>
-          <a:fillRef idx="1">
-            <a:schemeClr val="accent1"/>
-          </a:fillRef>
-          <a:effectRef idx="0">
-            <a:schemeClr val="accent1"/>
-          </a:effectRef>
-          <a:fontRef idx="minor">
-            <a:schemeClr val="lt1"/>
-          </a:fontRef>
-        </p:style>
-        <p:txBody>
-          <a:bodyPr rtlCol="0" anchor="ctr"/>
-          <a:lstStyle/>
-          <a:p>
-            <a:pPr algn="ctr"/>
-            <a:endParaRPr lang="fr-FR"/>
-          </a:p>
-        </p:txBody>
-      </p:sp>
-      <p:sp>
-        <p:nvSpPr>
           <p:cNvPr id="9" name="Rounded Rectangle 8"/>
           <p:cNvSpPr/>
           <p:nvPr/>
         </p:nvSpPr>
         <p:spPr>
           <a:xfrm>
-            <a:off x="4858824" y="3124943"/>
-            <a:ext cx="3094615" cy="583847"/>
+            <a:off x="4736084" y="3124943"/>
+            <a:ext cx="3155986" cy="583847"/>
           </a:xfrm>
           <a:prstGeom prst="roundRect">
             <a:avLst/>
@@ -3500,8 +6444,8 @@
         </p:nvSpPr>
         <p:spPr>
           <a:xfrm>
-            <a:off x="8073544" y="3117412"/>
-            <a:ext cx="2854212" cy="583847"/>
+            <a:off x="8659184" y="3117412"/>
+            <a:ext cx="1308165" cy="583847"/>
           </a:xfrm>
           <a:prstGeom prst="roundRect">
             <a:avLst/>
@@ -3534,6 +6478,83 @@
           <a:p>
             <a:pPr algn="ctr"/>
             <a:endParaRPr lang="fr-FR"/>
+          </a:p>
+        </p:txBody>
+      </p:sp>
+      <p:sp>
+        <p:nvSpPr>
+          <p:cNvPr id="8" name="Rounded Rectangular Callout 7"/>
+          <p:cNvSpPr/>
+          <p:nvPr/>
+        </p:nvSpPr>
+        <p:spPr>
+          <a:xfrm>
+            <a:off x="7536130" y="1993241"/>
+            <a:ext cx="2277824" cy="538619"/>
+          </a:xfrm>
+          <a:prstGeom prst="wedgeRoundRectCallout">
+            <a:avLst>
+              <a:gd name="adj1" fmla="val 27475"/>
+              <a:gd name="adj2" fmla="val 156736"/>
+              <a:gd name="adj3" fmla="val 16667"/>
+            </a:avLst>
+          </a:prstGeom>
+          <a:solidFill>
+            <a:schemeClr val="accent1">
+              <a:alpha val="10000"/>
+            </a:schemeClr>
+          </a:solidFill>
+        </p:spPr>
+        <p:style>
+          <a:lnRef idx="2">
+            <a:schemeClr val="accent1">
+              <a:shade val="50000"/>
+            </a:schemeClr>
+          </a:lnRef>
+          <a:fillRef idx="1">
+            <a:schemeClr val="accent1"/>
+          </a:fillRef>
+          <a:effectRef idx="0">
+            <a:schemeClr val="accent1"/>
+          </a:effectRef>
+          <a:fontRef idx="minor">
+            <a:schemeClr val="lt1"/>
+          </a:fontRef>
+        </p:style>
+        <p:txBody>
+          <a:bodyPr rtlCol="0" anchor="ctr"/>
+          <a:lstStyle/>
+          <a:p>
+            <a:pPr algn="ctr"/>
+            <a:r>
+              <a:rPr lang="en-US" dirty="0" smtClean="0">
+                <a:solidFill>
+                  <a:schemeClr val="tx1"/>
+                </a:solidFill>
+              </a:rPr>
+              <a:t>Logged</a:t>
+            </a:r>
+            <a:r>
+              <a:rPr lang="fr-FR" dirty="0" smtClean="0">
+                <a:solidFill>
+                  <a:schemeClr val="tx1"/>
+                </a:solidFill>
+              </a:rPr>
+              <a:t> Data </a:t>
+            </a:r>
+            <a:r>
+              <a:rPr lang="en-US" dirty="0" smtClean="0">
+                <a:solidFill>
+                  <a:schemeClr val="tx1"/>
+                </a:solidFill>
+              </a:rPr>
+              <a:t>Counter</a:t>
+            </a:r>
+            <a:endParaRPr lang="en-US" dirty="0">
+              <a:solidFill>
+                <a:schemeClr val="tx1"/>
+              </a:solidFill>
+            </a:endParaRPr>
           </a:p>
         </p:txBody>
       </p:sp>
@@ -3797,7 +6818,7 @@
           <a:p>
             <a:pPr algn="ctr"/>
             <a:r>
-              <a:rPr lang="fr-FR" dirty="0" smtClean="0">
+              <a:rPr lang="en-US" dirty="0" smtClean="0">
                 <a:solidFill>
                   <a:schemeClr val="tx1"/>
                 </a:solidFill>
@@ -3808,7 +6829,7 @@
           <a:p>
             <a:pPr algn="ctr"/>
             <a:r>
-              <a:rPr lang="fr-FR" dirty="0" smtClean="0">
+              <a:rPr lang="en-US" dirty="0" smtClean="0">
                 <a:solidFill>
                   <a:schemeClr val="tx1"/>
                 </a:solidFill>
@@ -3819,14 +6840,14 @@
           <a:p>
             <a:pPr algn="ctr"/>
             <a:r>
-              <a:rPr lang="fr-FR" dirty="0" err="1" smtClean="0">
+              <a:rPr lang="en-US" dirty="0" smtClean="0">
                 <a:solidFill>
                   <a:schemeClr val="tx1"/>
                 </a:solidFill>
               </a:rPr>
               <a:t>Selection</a:t>
             </a:r>
-            <a:endParaRPr lang="fr-FR" dirty="0">
+            <a:endParaRPr lang="en-US" dirty="0">
               <a:solidFill>
                 <a:schemeClr val="tx1"/>
               </a:solidFill>
@@ -3992,22 +7013,14 @@
           <a:p>
             <a:pPr algn="ctr"/>
             <a:r>
-              <a:rPr lang="fr-FR" sz="1050" b="1" dirty="0" err="1" smtClean="0">
+              <a:rPr lang="en-US" sz="1050" b="1" dirty="0" smtClean="0">
                 <a:solidFill>
                   <a:schemeClr val="tx1"/>
                 </a:solidFill>
               </a:rPr>
-              <a:t>Operation</a:t>
-            </a:r>
-            <a:r>
-              <a:rPr lang="fr-FR" sz="1050" b="1" dirty="0" smtClean="0">
-                <a:solidFill>
-                  <a:schemeClr val="tx1"/>
-                </a:solidFill>
-              </a:rPr>
-              <a:t> Mode</a:t>
-            </a:r>
-            <a:endParaRPr lang="fr-FR" sz="1050" dirty="0">
+              <a:t>Operation Mode</a:t>
+            </a:r>
+            <a:endParaRPr lang="en-US" sz="1050" dirty="0">
               <a:solidFill>
                 <a:schemeClr val="tx1"/>
               </a:solidFill>
@@ -4061,46 +7074,14 @@
           <a:p>
             <a:pPr algn="ctr"/>
             <a:r>
-              <a:rPr lang="fr-FR" sz="1050" b="1" dirty="0" smtClean="0">
+              <a:rPr lang="en-US" sz="1050" b="1" dirty="0" smtClean="0">
                 <a:solidFill>
                   <a:schemeClr val="tx1"/>
                 </a:solidFill>
               </a:rPr>
-              <a:t>Plot information border box </a:t>
-            </a:r>
-            <a:r>
-              <a:rPr lang="fr-FR" sz="1050" b="1" dirty="0" err="1" smtClean="0">
-                <a:solidFill>
-                  <a:schemeClr val="tx1"/>
-                </a:solidFill>
-              </a:rPr>
-              <a:t>marked</a:t>
-            </a:r>
-            <a:r>
-              <a:rPr lang="fr-FR" sz="1050" b="1" dirty="0" smtClean="0">
-                <a:solidFill>
-                  <a:schemeClr val="tx1"/>
-                </a:solidFill>
-              </a:rPr>
-              <a:t> as </a:t>
-            </a:r>
-            <a:r>
-              <a:rPr lang="fr-FR" sz="1050" b="1" dirty="0" err="1" smtClean="0">
-                <a:solidFill>
-                  <a:schemeClr val="tx1"/>
-                </a:solidFill>
-              </a:rPr>
-              <a:t>selected</a:t>
-            </a:r>
-            <a:r>
-              <a:rPr lang="fr-FR" sz="1050" b="1" dirty="0" smtClean="0">
-                <a:solidFill>
-                  <a:schemeClr val="tx1"/>
-                </a:solidFill>
-              </a:rPr>
-              <a:t>.</a:t>
-            </a:r>
-            <a:endParaRPr lang="fr-FR" sz="1050" b="1" dirty="0">
+              <a:t>Plot information border box marked as selected.</a:t>
+            </a:r>
+            <a:endParaRPr lang="en-US" sz="1050" b="1" dirty="0">
               <a:solidFill>
                 <a:schemeClr val="tx1"/>
               </a:solidFill>
@@ -4154,38 +7135,14 @@
           <a:p>
             <a:pPr algn="ctr"/>
             <a:r>
-              <a:rPr lang="fr-FR" sz="1000" b="1" dirty="0" smtClean="0">
+              <a:rPr lang="en-US" sz="1000" b="1" dirty="0" smtClean="0">
                 <a:solidFill>
                   <a:schemeClr val="tx1"/>
                 </a:solidFill>
               </a:rPr>
-              <a:t>Plot </a:t>
-            </a:r>
-            <a:r>
-              <a:rPr lang="fr-FR" sz="1000" b="1" dirty="0" err="1" smtClean="0">
-                <a:solidFill>
-                  <a:schemeClr val="tx1"/>
-                </a:solidFill>
-              </a:rPr>
-              <a:t>marked</a:t>
-            </a:r>
-            <a:r>
-              <a:rPr lang="fr-FR" sz="1000" b="1" dirty="0" smtClean="0">
-                <a:solidFill>
-                  <a:schemeClr val="tx1"/>
-                </a:solidFill>
-              </a:rPr>
-              <a:t> as </a:t>
-            </a:r>
-            <a:r>
-              <a:rPr lang="fr-FR" sz="1000" b="1" dirty="0" err="1" smtClean="0">
-                <a:solidFill>
-                  <a:schemeClr val="tx1"/>
-                </a:solidFill>
-              </a:rPr>
-              <a:t>selected</a:t>
-            </a:r>
-            <a:endParaRPr lang="fr-FR" sz="1000" b="1" dirty="0">
+              <a:t>Plot marked as selected</a:t>
+            </a:r>
+            <a:endParaRPr lang="en-US" sz="1000" b="1" dirty="0">
               <a:solidFill>
                 <a:schemeClr val="tx1"/>
               </a:solidFill>
@@ -4235,50 +7192,18 @@
           <a:p>
             <a:pPr algn="ctr"/>
             <a:r>
-              <a:rPr lang="fr-FR" sz="1050" b="1" dirty="0" smtClean="0">
+              <a:rPr lang="en-US" sz="1050" b="1" dirty="0" smtClean="0">
                 <a:solidFill>
                   <a:schemeClr val="bg1"/>
                 </a:solidFill>
               </a:rPr>
-              <a:t>Click </a:t>
-            </a:r>
-            <a:r>
-              <a:rPr lang="fr-FR" sz="1050" b="1" dirty="0" err="1" smtClean="0">
-                <a:solidFill>
-                  <a:schemeClr val="bg1"/>
-                </a:solidFill>
-              </a:rPr>
-              <a:t>Here</a:t>
-            </a:r>
-            <a:r>
-              <a:rPr lang="fr-FR" sz="1050" b="1" dirty="0" smtClean="0">
-                <a:solidFill>
-                  <a:schemeClr val="bg1"/>
-                </a:solidFill>
-              </a:rPr>
-              <a:t> to </a:t>
-            </a:r>
-            <a:r>
-              <a:rPr lang="fr-FR" sz="1050" b="1" dirty="0" err="1" smtClean="0">
-                <a:solidFill>
-                  <a:schemeClr val="bg1"/>
-                </a:solidFill>
-              </a:rPr>
-              <a:t>UnSelect</a:t>
-            </a:r>
-            <a:r>
-              <a:rPr lang="fr-FR" sz="1050" b="1" dirty="0" smtClean="0">
-                <a:solidFill>
-                  <a:schemeClr val="bg1"/>
-                </a:solidFill>
-              </a:rPr>
-              <a:t> Plot</a:t>
+              <a:t>Click Here to Unselect Plot</a:t>
             </a:r>
           </a:p>
           <a:p>
             <a:pPr algn="ctr"/>
             <a:r>
-              <a:rPr lang="fr-FR" sz="1050" b="1" dirty="0" smtClean="0">
+              <a:rPr lang="en-US" sz="1050" b="1" dirty="0" smtClean="0">
                 <a:solidFill>
                   <a:schemeClr val="bg1"/>
                 </a:solidFill>
@@ -4289,46 +7214,14 @@
           <a:p>
             <a:pPr algn="ctr"/>
             <a:r>
-              <a:rPr lang="fr-FR" sz="1050" b="1" dirty="0" smtClean="0">
+              <a:rPr lang="en-US" sz="1050" b="1" dirty="0" smtClean="0">
                 <a:solidFill>
                   <a:schemeClr val="bg1"/>
                 </a:solidFill>
               </a:rPr>
-              <a:t>Click </a:t>
-            </a:r>
-            <a:r>
-              <a:rPr lang="fr-FR" sz="1050" b="1" dirty="0" err="1" smtClean="0">
-                <a:solidFill>
-                  <a:schemeClr val="bg1"/>
-                </a:solidFill>
-              </a:rPr>
-              <a:t>Here</a:t>
-            </a:r>
-            <a:r>
-              <a:rPr lang="fr-FR" sz="1050" b="1" dirty="0" smtClean="0">
-                <a:solidFill>
-                  <a:schemeClr val="bg1"/>
-                </a:solidFill>
-              </a:rPr>
-              <a:t> to Select </a:t>
-            </a:r>
-            <a:r>
-              <a:rPr lang="fr-FR" sz="1050" b="1" dirty="0" err="1" smtClean="0">
-                <a:solidFill>
-                  <a:schemeClr val="bg1"/>
-                </a:solidFill>
-              </a:rPr>
-              <a:t>Another</a:t>
-            </a:r>
-            <a:r>
-              <a:rPr lang="fr-FR" sz="1050" b="1" dirty="0" smtClean="0">
-                <a:solidFill>
-                  <a:schemeClr val="bg1"/>
-                </a:solidFill>
-              </a:rPr>
-              <a:t> Plot</a:t>
-            </a:r>
-            <a:endParaRPr lang="fr-FR" sz="1050" b="1" dirty="0">
+              <a:t>Click Here to Select Another Plot</a:t>
+            </a:r>
+            <a:endParaRPr lang="en-US" sz="1050" b="1" dirty="0">
               <a:solidFill>
                 <a:schemeClr val="bg1"/>
               </a:solidFill>
@@ -4528,22 +7421,14 @@
           <a:p>
             <a:pPr algn="ctr"/>
             <a:r>
-              <a:rPr lang="fr-FR" sz="1400" b="1" dirty="0" smtClean="0">
+              <a:rPr lang="en-US" sz="1400" b="1" dirty="0" smtClean="0">
                 <a:solidFill>
                   <a:schemeClr val="tx1"/>
                 </a:solidFill>
               </a:rPr>
-              <a:t>Change plot </a:t>
-            </a:r>
-            <a:r>
-              <a:rPr lang="fr-FR" sz="1400" b="1" dirty="0" err="1" smtClean="0">
-                <a:solidFill>
-                  <a:schemeClr val="tx1"/>
-                </a:solidFill>
-              </a:rPr>
-              <a:t>color</a:t>
-            </a:r>
-            <a:endParaRPr lang="fr-FR" sz="1400" b="1" dirty="0">
+              <a:t>Change plot color</a:t>
+            </a:r>
+            <a:endParaRPr lang="en-US" sz="1400" b="1" dirty="0">
               <a:solidFill>
                 <a:schemeClr val="tx1"/>
               </a:solidFill>
@@ -4600,30 +7485,14 @@
           <a:p>
             <a:pPr algn="ctr"/>
             <a:r>
-              <a:rPr lang="fr-FR" sz="1400" b="1" dirty="0" smtClean="0">
+              <a:rPr lang="en-US" sz="1400" b="1" dirty="0" smtClean="0">
                 <a:solidFill>
                   <a:schemeClr val="tx1"/>
                 </a:solidFill>
               </a:rPr>
-              <a:t>Show/</a:t>
-            </a:r>
-            <a:r>
-              <a:rPr lang="fr-FR" sz="1400" b="1" dirty="0" err="1" smtClean="0">
-                <a:solidFill>
-                  <a:schemeClr val="tx1"/>
-                </a:solidFill>
-              </a:rPr>
-              <a:t>Hide</a:t>
-            </a:r>
-            <a:r>
-              <a:rPr lang="fr-FR" sz="1400" b="1" dirty="0" smtClean="0">
-                <a:solidFill>
-                  <a:schemeClr val="tx1"/>
-                </a:solidFill>
-              </a:rPr>
-              <a:t> plot</a:t>
-            </a:r>
-            <a:endParaRPr lang="fr-FR" sz="1400" b="1" dirty="0">
+              <a:t>Show/Hide plot</a:t>
+            </a:r>
+            <a:endParaRPr lang="en-US" sz="1400" b="1" dirty="0">
               <a:solidFill>
                 <a:schemeClr val="tx1"/>
               </a:solidFill>
@@ -4680,14 +7549,14 @@
           <a:p>
             <a:pPr algn="ctr"/>
             <a:r>
-              <a:rPr lang="fr-FR" sz="1400" b="1" dirty="0" smtClean="0">
+              <a:rPr lang="en-US" sz="1400" b="1" dirty="0" smtClean="0">
                 <a:solidFill>
                   <a:schemeClr val="tx1"/>
                 </a:solidFill>
               </a:rPr>
               <a:t>Reset plot</a:t>
             </a:r>
-            <a:endParaRPr lang="fr-FR" sz="1400" b="1" dirty="0">
+            <a:endParaRPr lang="en-US" sz="1400" b="1" dirty="0">
               <a:solidFill>
                 <a:schemeClr val="tx1"/>
               </a:solidFill>
@@ -4744,14 +7613,14 @@
           <a:p>
             <a:pPr algn="ctr"/>
             <a:r>
-              <a:rPr lang="fr-FR" sz="1400" b="1" dirty="0" smtClean="0">
+              <a:rPr lang="en-US" sz="1400" b="1" dirty="0" smtClean="0">
                 <a:solidFill>
                   <a:schemeClr val="tx1"/>
                 </a:solidFill>
               </a:rPr>
               <a:t>Save Plot data</a:t>
             </a:r>
-            <a:endParaRPr lang="fr-FR" sz="1400" b="1" dirty="0">
+            <a:endParaRPr lang="en-US" sz="1400" b="1" dirty="0">
               <a:solidFill>
                 <a:schemeClr val="tx1"/>
               </a:solidFill>
@@ -4818,8 +7687,8 @@
         </p:blipFill>
         <p:spPr>
           <a:xfrm>
-            <a:off x="4564122" y="604786"/>
-            <a:ext cx="5568043" cy="3565071"/>
+            <a:off x="1871758" y="847224"/>
+            <a:ext cx="7832919" cy="4933864"/>
           </a:xfrm>
           <a:prstGeom prst="rect">
             <a:avLst/>
@@ -4834,13 +7703,13 @@
         </p:nvSpPr>
         <p:spPr>
           <a:xfrm>
-            <a:off x="8482843" y="707614"/>
+            <a:off x="3456712" y="2033188"/>
             <a:ext cx="1346957" cy="206785"/>
           </a:xfrm>
           <a:prstGeom prst="wedgeRoundRectCallout">
             <a:avLst>
-              <a:gd name="adj1" fmla="val -123275"/>
-              <a:gd name="adj2" fmla="val 28814"/>
+              <a:gd name="adj1" fmla="val 77650"/>
+              <a:gd name="adj2" fmla="val -122542"/>
               <a:gd name="adj3" fmla="val 16667"/>
             </a:avLst>
           </a:prstGeom>
@@ -4875,46 +7744,14 @@
           <a:p>
             <a:pPr algn="ctr"/>
             <a:r>
-              <a:rPr lang="fr-FR" sz="1000" b="1" dirty="0" err="1" smtClean="0">
+              <a:rPr lang="en-US" sz="1000" b="1" dirty="0" smtClean="0">
                 <a:solidFill>
                   <a:schemeClr val="tx1"/>
                 </a:solidFill>
               </a:rPr>
-              <a:t>Red</a:t>
-            </a:r>
-            <a:r>
-              <a:rPr lang="fr-FR" sz="1000" b="1" dirty="0" smtClean="0">
-                <a:solidFill>
-                  <a:schemeClr val="tx1"/>
-                </a:solidFill>
-              </a:rPr>
-              <a:t> plot </a:t>
-            </a:r>
-            <a:r>
-              <a:rPr lang="fr-FR" sz="1000" b="1" dirty="0" err="1" smtClean="0">
-                <a:solidFill>
-                  <a:schemeClr val="tx1"/>
-                </a:solidFill>
-              </a:rPr>
-              <a:t>is</a:t>
-            </a:r>
-            <a:r>
-              <a:rPr lang="fr-FR" sz="1000" b="1" dirty="0" smtClean="0">
-                <a:solidFill>
-                  <a:schemeClr val="tx1"/>
-                </a:solidFill>
-              </a:rPr>
-              <a:t> </a:t>
-            </a:r>
-            <a:r>
-              <a:rPr lang="fr-FR" sz="1000" b="1" dirty="0" err="1" smtClean="0">
-                <a:solidFill>
-                  <a:schemeClr val="tx1"/>
-                </a:solidFill>
-              </a:rPr>
-              <a:t>Hidden</a:t>
-            </a:r>
-            <a:endParaRPr lang="fr-FR" sz="1000" b="1" dirty="0">
+              <a:t>Red plot is Hidden</a:t>
+            </a:r>
+            <a:endParaRPr lang="en-US" sz="1000" b="1" dirty="0">
               <a:solidFill>
                 <a:schemeClr val="tx1"/>
               </a:solidFill>
@@ -4930,7 +7767,7 @@
         </p:nvSpPr>
         <p:spPr>
           <a:xfrm>
-            <a:off x="8249272" y="1133342"/>
+            <a:off x="7924015" y="1446325"/>
             <a:ext cx="1580528" cy="198502"/>
           </a:xfrm>
           <a:prstGeom prst="wedgeRoundRectCallout">
@@ -4971,38 +7808,14 @@
           <a:p>
             <a:pPr algn="ctr"/>
             <a:r>
-              <a:rPr lang="fr-FR" sz="1000" b="1" dirty="0" smtClean="0">
+              <a:rPr lang="en-US" sz="1000" b="1" dirty="0" smtClean="0">
                 <a:solidFill>
                   <a:schemeClr val="tx1"/>
                 </a:solidFill>
               </a:rPr>
-              <a:t>White Plot </a:t>
-            </a:r>
-            <a:r>
-              <a:rPr lang="fr-FR" sz="1000" b="1" dirty="0" err="1" smtClean="0">
-                <a:solidFill>
-                  <a:schemeClr val="tx1"/>
-                </a:solidFill>
-              </a:rPr>
-              <a:t>is</a:t>
-            </a:r>
-            <a:r>
-              <a:rPr lang="fr-FR" sz="1000" b="1" dirty="0" smtClean="0">
-                <a:solidFill>
-                  <a:schemeClr val="tx1"/>
-                </a:solidFill>
-              </a:rPr>
-              <a:t> </a:t>
-            </a:r>
-            <a:r>
-              <a:rPr lang="fr-FR" sz="1000" b="1" dirty="0" err="1" smtClean="0">
-                <a:solidFill>
-                  <a:schemeClr val="tx1"/>
-                </a:solidFill>
-              </a:rPr>
-              <a:t>Selected</a:t>
-            </a:r>
-            <a:endParaRPr lang="fr-FR" sz="1000" b="1" dirty="0">
+              <a:t>Yellow Plot is Selected</a:t>
+            </a:r>
+            <a:endParaRPr lang="en-US" sz="1000" b="1" dirty="0">
               <a:solidFill>
                 <a:schemeClr val="tx1"/>
               </a:solidFill>
@@ -5018,13 +7831,13 @@
         </p:nvSpPr>
         <p:spPr>
           <a:xfrm>
-            <a:off x="5419933" y="3700176"/>
+            <a:off x="5033304" y="4347570"/>
             <a:ext cx="1346957" cy="206785"/>
           </a:xfrm>
           <a:prstGeom prst="wedgeRoundRectCallout">
             <a:avLst>
-              <a:gd name="adj1" fmla="val 152698"/>
-              <a:gd name="adj2" fmla="val 33621"/>
+              <a:gd name="adj1" fmla="val 103036"/>
+              <a:gd name="adj2" fmla="val -10896"/>
               <a:gd name="adj3" fmla="val 16667"/>
             </a:avLst>
           </a:prstGeom>
@@ -5059,22 +7872,14 @@
           <a:p>
             <a:pPr algn="ctr"/>
             <a:r>
-              <a:rPr lang="fr-FR" sz="1000" b="1" dirty="0" smtClean="0">
+              <a:rPr lang="en-US" sz="1000" b="1" dirty="0" smtClean="0">
                 <a:solidFill>
                   <a:schemeClr val="tx1"/>
                 </a:solidFill>
               </a:rPr>
-              <a:t>Simple </a:t>
-            </a:r>
-            <a:r>
-              <a:rPr lang="fr-FR" sz="1000" b="1" dirty="0" err="1" smtClean="0">
-                <a:solidFill>
-                  <a:schemeClr val="tx1"/>
-                </a:solidFill>
-              </a:rPr>
-              <a:t>Measure</a:t>
-            </a:r>
-            <a:endParaRPr lang="fr-FR" sz="1000" b="1" dirty="0">
+              <a:t>FREQ Measure</a:t>
+            </a:r>
+            <a:endParaRPr lang="en-US" sz="1000" b="1" dirty="0">
               <a:solidFill>
                 <a:schemeClr val="tx1"/>
               </a:solidFill>
@@ -5090,13 +7895,13 @@
         </p:nvSpPr>
         <p:spPr>
           <a:xfrm>
-            <a:off x="5419933" y="2803115"/>
+            <a:off x="5033306" y="3748200"/>
             <a:ext cx="1346957" cy="206785"/>
           </a:xfrm>
           <a:prstGeom prst="wedgeRoundRectCallout">
             <a:avLst>
-              <a:gd name="adj1" fmla="val 146057"/>
-              <a:gd name="adj2" fmla="val 362866"/>
+              <a:gd name="adj1" fmla="val 98218"/>
+              <a:gd name="adj2" fmla="val 74992"/>
               <a:gd name="adj3" fmla="val 16667"/>
             </a:avLst>
           </a:prstGeom>
@@ -5131,22 +7936,78 @@
           <a:p>
             <a:pPr algn="ctr"/>
             <a:r>
-              <a:rPr lang="fr-FR" sz="1000" b="1" dirty="0" smtClean="0">
+              <a:rPr lang="en-US" sz="1000" b="1" dirty="0" smtClean="0">
                 <a:solidFill>
                   <a:schemeClr val="tx1"/>
                 </a:solidFill>
               </a:rPr>
-              <a:t>BOX </a:t>
-            </a:r>
-            <a:r>
-              <a:rPr lang="fr-FR" sz="1000" b="1" dirty="0" err="1" smtClean="0">
+              <a:t>BOX Measure</a:t>
+            </a:r>
+            <a:endParaRPr lang="en-US" sz="1000" b="1" dirty="0">
+              <a:solidFill>
+                <a:schemeClr val="tx1"/>
+              </a:solidFill>
+            </a:endParaRPr>
+          </a:p>
+        </p:txBody>
+      </p:sp>
+      <p:sp>
+        <p:nvSpPr>
+          <p:cNvPr id="7" name="Rounded Rectangular Callout 6"/>
+          <p:cNvSpPr/>
+          <p:nvPr/>
+        </p:nvSpPr>
+        <p:spPr>
+          <a:xfrm>
+            <a:off x="5033305" y="4047885"/>
+            <a:ext cx="1346957" cy="206785"/>
+          </a:xfrm>
+          <a:prstGeom prst="wedgeRoundRectCallout">
+            <a:avLst>
+              <a:gd name="adj1" fmla="val 101407"/>
+              <a:gd name="adj2" fmla="val 33443"/>
+              <a:gd name="adj3" fmla="val 16667"/>
+            </a:avLst>
+          </a:prstGeom>
+          <a:solidFill>
+            <a:schemeClr val="bg1"/>
+          </a:solidFill>
+          <a:ln>
+            <a:solidFill>
+              <a:schemeClr val="bg2"/>
+            </a:solidFill>
+          </a:ln>
+        </p:spPr>
+        <p:style>
+          <a:lnRef idx="2">
+            <a:schemeClr val="accent1">
+              <a:shade val="50000"/>
+            </a:schemeClr>
+          </a:lnRef>
+          <a:fillRef idx="1">
+            <a:schemeClr val="accent1"/>
+          </a:fillRef>
+          <a:effectRef idx="0">
+            <a:schemeClr val="accent1"/>
+          </a:effectRef>
+          <a:fontRef idx="minor">
+            <a:schemeClr val="lt1"/>
+          </a:fontRef>
+        </p:style>
+        <p:txBody>
+          <a:bodyPr rtlCol="0" anchor="ctr"/>
+          <a:lstStyle/>
+          <a:p>
+            <a:pPr algn="ctr"/>
+            <a:r>
+              <a:rPr lang="en-US" sz="1000" b="1" dirty="0" smtClean="0">
                 <a:solidFill>
                   <a:schemeClr val="tx1"/>
                 </a:solidFill>
               </a:rPr>
-              <a:t>Measure</a:t>
-            </a:r>
-            <a:endParaRPr lang="fr-FR" sz="1000" b="1" dirty="0">
+              <a:t>ARROW Measure</a:t>
+            </a:r>
+            <a:endParaRPr lang="en-US" sz="1000" b="1" dirty="0">
               <a:solidFill>
                 <a:schemeClr val="tx1"/>
               </a:solidFill>
@@ -5334,22 +8195,14 @@
           <a:p>
             <a:pPr algn="ctr"/>
             <a:r>
-              <a:rPr lang="fr-FR" sz="1000" b="1" dirty="0" err="1" smtClean="0">
+              <a:rPr lang="en-US" sz="1000" b="1" dirty="0" smtClean="0">
                 <a:solidFill>
                   <a:schemeClr val="tx1"/>
                 </a:solidFill>
               </a:rPr>
-              <a:t>Measure</a:t>
-            </a:r>
-            <a:r>
-              <a:rPr lang="fr-FR" sz="1000" b="1" dirty="0" smtClean="0">
-                <a:solidFill>
-                  <a:schemeClr val="tx1"/>
-                </a:solidFill>
-              </a:rPr>
-              <a:t> Start</a:t>
-            </a:r>
-            <a:endParaRPr lang="fr-FR" sz="1000" b="1" dirty="0">
+              <a:t>Measure Start</a:t>
+            </a:r>
+            <a:endParaRPr lang="en-US" sz="1000" b="1" dirty="0">
               <a:solidFill>
                 <a:schemeClr val="tx1"/>
               </a:solidFill>
@@ -5406,20 +8259,12 @@
           <a:p>
             <a:pPr algn="ctr"/>
             <a:r>
-              <a:rPr lang="fr-FR" sz="1000" b="1" dirty="0" err="1" smtClean="0">
+              <a:rPr lang="en-US" sz="1000" b="1" dirty="0" smtClean="0">
                 <a:solidFill>
                   <a:schemeClr val="tx1"/>
                 </a:solidFill>
               </a:rPr>
-              <a:t>Measure</a:t>
-            </a:r>
-            <a:r>
-              <a:rPr lang="fr-FR" sz="1000" b="1" dirty="0" smtClean="0">
-                <a:solidFill>
-                  <a:schemeClr val="tx1"/>
-                </a:solidFill>
-              </a:rPr>
-              <a:t> End</a:t>
+              <a:t>Measure End</a:t>
             </a:r>
           </a:p>
         </p:txBody>
@@ -5473,14 +8318,14 @@
           <a:p>
             <a:pPr algn="ctr"/>
             <a:r>
-              <a:rPr lang="fr-FR" sz="1000" b="1" dirty="0" err="1" smtClean="0">
+              <a:rPr lang="en-US" sz="1000" b="1" dirty="0" smtClean="0">
                 <a:solidFill>
                   <a:schemeClr val="tx1"/>
                 </a:solidFill>
               </a:rPr>
               <a:t>Measure</a:t>
             </a:r>
-            <a:endParaRPr lang="fr-FR" sz="1000" b="1" dirty="0">
+            <a:endParaRPr lang="en-US" sz="1000" b="1" dirty="0">
               <a:solidFill>
                 <a:schemeClr val="tx1"/>
               </a:solidFill>
@@ -5537,7 +8382,7 @@
           <a:p>
             <a:pPr algn="ctr"/>
             <a:r>
-              <a:rPr lang="fr-FR" sz="1000" b="1" dirty="0" smtClean="0">
+              <a:rPr lang="en-US" sz="1000" b="1" dirty="0" smtClean="0">
                 <a:solidFill>
                   <a:schemeClr val="tx1"/>
                 </a:solidFill>
@@ -5548,30 +8393,14 @@
           <a:p>
             <a:pPr algn="ctr"/>
             <a:r>
-              <a:rPr lang="fr-FR" sz="1000" b="1" dirty="0" smtClean="0">
+              <a:rPr lang="en-US" sz="1000" b="1" dirty="0" smtClean="0">
                 <a:solidFill>
                   <a:schemeClr val="tx1"/>
                 </a:solidFill>
               </a:rPr>
-              <a:t>(</a:t>
-            </a:r>
-            <a:r>
-              <a:rPr lang="fr-FR" sz="1000" b="1" dirty="0" err="1" smtClean="0">
-                <a:solidFill>
-                  <a:schemeClr val="tx1"/>
-                </a:solidFill>
-              </a:rPr>
-              <a:t>Follow</a:t>
-            </a:r>
-            <a:r>
-              <a:rPr lang="fr-FR" sz="1000" b="1" dirty="0" smtClean="0">
-                <a:solidFill>
-                  <a:schemeClr val="tx1"/>
-                </a:solidFill>
-              </a:rPr>
-              <a:t> the Plot)</a:t>
-            </a:r>
-            <a:endParaRPr lang="fr-FR" sz="1000" b="1" dirty="0">
+              <a:t>(Follow the Plot)</a:t>
+            </a:r>
+            <a:endParaRPr lang="en-US" sz="1000" b="1" dirty="0">
               <a:solidFill>
                 <a:schemeClr val="tx1"/>
               </a:solidFill>
@@ -5617,11 +8446,7 @@
             <a:pPr algn="ctr"/>
             <a:r>
               <a:rPr lang="fr-FR" sz="1400" b="1" dirty="0" smtClean="0"/>
-              <a:t>Ctrl Key to Start a new </a:t>
-            </a:r>
-            <a:r>
-              <a:rPr lang="fr-FR" sz="1400" b="1" dirty="0" err="1" smtClean="0"/>
-              <a:t>measure</a:t>
+              <a:t>Ctrl Key to Start a new Arrow</a:t>
             </a:r>
             <a:endParaRPr lang="fr-FR" sz="1400" b="1" dirty="0"/>
           </a:p>
@@ -5632,16 +8457,12 @@
               <a:t>Shift Key to </a:t>
             </a:r>
             <a:r>
-              <a:rPr lang="fr-FR" sz="1400" b="1" dirty="0" err="1" smtClean="0"/>
+              <a:rPr lang="en-US" sz="1400" b="1" dirty="0" smtClean="0"/>
               <a:t>erase</a:t>
             </a:r>
             <a:r>
               <a:rPr lang="fr-FR" sz="1400" b="1" dirty="0" smtClean="0"/>
-              <a:t> </a:t>
-            </a:r>
-            <a:r>
-              <a:rPr lang="fr-FR" sz="1400" b="1" dirty="0" err="1" smtClean="0"/>
-              <a:t>measure</a:t>
+              <a:t> Arrow</a:t>
             </a:r>
             <a:endParaRPr lang="fr-FR" sz="1400" b="1" dirty="0"/>
           </a:p>
@@ -5686,6 +8507,390 @@
       </p:grpSpPr>
       <p:pic>
         <p:nvPicPr>
+          <p:cNvPr id="3" name="Picture 2"/>
+          <p:cNvPicPr>
+            <a:picLocks noChangeAspect="1"/>
+          </p:cNvPicPr>
+          <p:nvPr/>
+        </p:nvPicPr>
+        <p:blipFill>
+          <a:blip r:embed="rId2">
+            <a:extLst>
+              <a:ext uri="{28A0092B-C50C-407E-A947-70E740481C1C}">
+                <a14:useLocalDpi xmlns:a14="http://schemas.microsoft.com/office/drawing/2010/main" val="0"/>
+              </a:ext>
+            </a:extLst>
+          </a:blip>
+          <a:stretch>
+            <a:fillRect/>
+          </a:stretch>
+        </p:blipFill>
+        <p:spPr>
+          <a:xfrm>
+            <a:off x="2068773" y="239725"/>
+            <a:ext cx="8556171" cy="4834672"/>
+          </a:xfrm>
+          <a:prstGeom prst="rect">
+            <a:avLst/>
+          </a:prstGeom>
+        </p:spPr>
+      </p:pic>
+      <p:sp>
+        <p:nvSpPr>
+          <p:cNvPr id="11" name="Rounded Rectangular Callout 10"/>
+          <p:cNvSpPr/>
+          <p:nvPr/>
+        </p:nvSpPr>
+        <p:spPr>
+          <a:xfrm>
+            <a:off x="7770194" y="2275490"/>
+            <a:ext cx="1226661" cy="225972"/>
+          </a:xfrm>
+          <a:prstGeom prst="wedgeRoundRectCallout">
+            <a:avLst>
+              <a:gd name="adj1" fmla="val -135475"/>
+              <a:gd name="adj2" fmla="val 521910"/>
+              <a:gd name="adj3" fmla="val 16667"/>
+            </a:avLst>
+          </a:prstGeom>
+          <a:solidFill>
+            <a:schemeClr val="bg1"/>
+          </a:solidFill>
+          <a:ln>
+            <a:solidFill>
+              <a:schemeClr val="bg2"/>
+            </a:solidFill>
+          </a:ln>
+        </p:spPr>
+        <p:style>
+          <a:lnRef idx="2">
+            <a:schemeClr val="accent1">
+              <a:shade val="50000"/>
+            </a:schemeClr>
+          </a:lnRef>
+          <a:fillRef idx="1">
+            <a:schemeClr val="accent1"/>
+          </a:fillRef>
+          <a:effectRef idx="0">
+            <a:schemeClr val="accent1"/>
+          </a:effectRef>
+          <a:fontRef idx="minor">
+            <a:schemeClr val="lt1"/>
+          </a:fontRef>
+        </p:style>
+        <p:txBody>
+          <a:bodyPr rtlCol="0" anchor="ctr"/>
+          <a:lstStyle/>
+          <a:p>
+            <a:pPr algn="ctr"/>
+            <a:r>
+              <a:rPr lang="en-US" sz="1000" b="1" dirty="0" smtClean="0">
+                <a:solidFill>
+                  <a:schemeClr val="tx1"/>
+                </a:solidFill>
+              </a:rPr>
+              <a:t>Measure Points</a:t>
+            </a:r>
+            <a:endParaRPr lang="en-US" sz="1000" b="1" dirty="0">
+              <a:solidFill>
+                <a:schemeClr val="tx1"/>
+              </a:solidFill>
+            </a:endParaRPr>
+          </a:p>
+        </p:txBody>
+      </p:sp>
+      <p:sp>
+        <p:nvSpPr>
+          <p:cNvPr id="14" name="Rounded Rectangular Callout 13"/>
+          <p:cNvSpPr/>
+          <p:nvPr/>
+        </p:nvSpPr>
+        <p:spPr>
+          <a:xfrm>
+            <a:off x="4840837" y="4393325"/>
+            <a:ext cx="861026" cy="214264"/>
+          </a:xfrm>
+          <a:prstGeom prst="wedgeRoundRectCallout">
+            <a:avLst>
+              <a:gd name="adj1" fmla="val -87022"/>
+              <a:gd name="adj2" fmla="val -112146"/>
+              <a:gd name="adj3" fmla="val 16667"/>
+            </a:avLst>
+          </a:prstGeom>
+          <a:solidFill>
+            <a:schemeClr val="bg2"/>
+          </a:solidFill>
+          <a:ln>
+            <a:solidFill>
+              <a:schemeClr val="bg2"/>
+            </a:solidFill>
+          </a:ln>
+        </p:spPr>
+        <p:style>
+          <a:lnRef idx="2">
+            <a:schemeClr val="accent1">
+              <a:shade val="50000"/>
+            </a:schemeClr>
+          </a:lnRef>
+          <a:fillRef idx="1">
+            <a:schemeClr val="accent1"/>
+          </a:fillRef>
+          <a:effectRef idx="0">
+            <a:schemeClr val="accent1"/>
+          </a:effectRef>
+          <a:fontRef idx="minor">
+            <a:schemeClr val="lt1"/>
+          </a:fontRef>
+        </p:style>
+        <p:txBody>
+          <a:bodyPr rtlCol="0" anchor="ctr"/>
+          <a:lstStyle/>
+          <a:p>
+            <a:pPr algn="ctr"/>
+            <a:r>
+              <a:rPr lang="en-US" sz="1000" b="1" dirty="0" smtClean="0">
+                <a:solidFill>
+                  <a:schemeClr val="tx1"/>
+                </a:solidFill>
+              </a:rPr>
+              <a:t>Start Line</a:t>
+            </a:r>
+            <a:endParaRPr lang="en-US" sz="1000" b="1" dirty="0">
+              <a:solidFill>
+                <a:schemeClr val="tx1"/>
+              </a:solidFill>
+            </a:endParaRPr>
+          </a:p>
+        </p:txBody>
+      </p:sp>
+      <p:sp>
+        <p:nvSpPr>
+          <p:cNvPr id="12" name="Rounded Rectangular Callout 11"/>
+          <p:cNvSpPr/>
+          <p:nvPr/>
+        </p:nvSpPr>
+        <p:spPr>
+          <a:xfrm>
+            <a:off x="2884665" y="2044262"/>
+            <a:ext cx="1471873" cy="993227"/>
+          </a:xfrm>
+          <a:prstGeom prst="wedgeRoundRectCallout">
+            <a:avLst>
+              <a:gd name="adj1" fmla="val -5478"/>
+              <a:gd name="adj2" fmla="val 82555"/>
+              <a:gd name="adj3" fmla="val 16667"/>
+            </a:avLst>
+          </a:prstGeom>
+          <a:solidFill>
+            <a:schemeClr val="bg2"/>
+          </a:solidFill>
+          <a:ln>
+            <a:solidFill>
+              <a:schemeClr val="bg2"/>
+            </a:solidFill>
+          </a:ln>
+        </p:spPr>
+        <p:style>
+          <a:lnRef idx="2">
+            <a:schemeClr val="accent1">
+              <a:shade val="50000"/>
+            </a:schemeClr>
+          </a:lnRef>
+          <a:fillRef idx="1">
+            <a:schemeClr val="accent1"/>
+          </a:fillRef>
+          <a:effectRef idx="0">
+            <a:schemeClr val="accent1"/>
+          </a:effectRef>
+          <a:fontRef idx="minor">
+            <a:schemeClr val="lt1"/>
+          </a:fontRef>
+        </p:style>
+        <p:txBody>
+          <a:bodyPr rtlCol="0" anchor="ctr"/>
+          <a:lstStyle/>
+          <a:p>
+            <a:pPr algn="ctr"/>
+            <a:r>
+              <a:rPr lang="en-US" sz="1100" b="1" dirty="0" smtClean="0">
+                <a:solidFill>
+                  <a:schemeClr val="tx1"/>
+                </a:solidFill>
+              </a:rPr>
+              <a:t>Measure Box</a:t>
+            </a:r>
+          </a:p>
+          <a:p>
+            <a:r>
+              <a:rPr lang="en-US" sz="1000" b="1" i="1" dirty="0" smtClean="0">
+                <a:solidFill>
+                  <a:srgbClr val="00B0F0"/>
+                </a:solidFill>
+              </a:rPr>
+              <a:t>The “Frequency” value is the average value computed from all the measure points.</a:t>
+            </a:r>
+            <a:endParaRPr lang="en-US" sz="1000" b="1" dirty="0">
+              <a:solidFill>
+                <a:schemeClr val="tx1"/>
+              </a:solidFill>
+            </a:endParaRPr>
+          </a:p>
+        </p:txBody>
+      </p:sp>
+      <p:sp>
+        <p:nvSpPr>
+          <p:cNvPr id="13" name="Rounded Rectangular Callout 12"/>
+          <p:cNvSpPr/>
+          <p:nvPr/>
+        </p:nvSpPr>
+        <p:spPr>
+          <a:xfrm>
+            <a:off x="7141779" y="4354279"/>
+            <a:ext cx="812837" cy="212466"/>
+          </a:xfrm>
+          <a:prstGeom prst="wedgeRoundRectCallout">
+            <a:avLst>
+              <a:gd name="adj1" fmla="val 84382"/>
+              <a:gd name="adj2" fmla="val -95991"/>
+              <a:gd name="adj3" fmla="val 16667"/>
+            </a:avLst>
+          </a:prstGeom>
+          <a:solidFill>
+            <a:schemeClr val="bg2"/>
+          </a:solidFill>
+          <a:ln>
+            <a:solidFill>
+              <a:schemeClr val="bg2"/>
+            </a:solidFill>
+          </a:ln>
+        </p:spPr>
+        <p:style>
+          <a:lnRef idx="2">
+            <a:schemeClr val="accent1">
+              <a:shade val="50000"/>
+            </a:schemeClr>
+          </a:lnRef>
+          <a:fillRef idx="1">
+            <a:schemeClr val="accent1"/>
+          </a:fillRef>
+          <a:effectRef idx="0">
+            <a:schemeClr val="accent1"/>
+          </a:effectRef>
+          <a:fontRef idx="minor">
+            <a:schemeClr val="lt1"/>
+          </a:fontRef>
+        </p:style>
+        <p:txBody>
+          <a:bodyPr rtlCol="0" anchor="ctr"/>
+          <a:lstStyle/>
+          <a:p>
+            <a:pPr algn="ctr"/>
+            <a:r>
+              <a:rPr lang="en-US" sz="1000" b="1" dirty="0" smtClean="0">
+                <a:solidFill>
+                  <a:schemeClr val="tx1"/>
+                </a:solidFill>
+              </a:rPr>
+              <a:t>End Line</a:t>
+            </a:r>
+            <a:endParaRPr lang="en-US" sz="1000" b="1" dirty="0">
+              <a:solidFill>
+                <a:schemeClr val="tx1"/>
+              </a:solidFill>
+            </a:endParaRPr>
+          </a:p>
+        </p:txBody>
+      </p:sp>
+      <p:sp>
+        <p:nvSpPr>
+          <p:cNvPr id="4" name="Cloud 3"/>
+          <p:cNvSpPr/>
+          <p:nvPr/>
+        </p:nvSpPr>
+        <p:spPr>
+          <a:xfrm>
+            <a:off x="4963518" y="1384397"/>
+            <a:ext cx="2584679" cy="1222169"/>
+          </a:xfrm>
+          <a:prstGeom prst="cloud">
+            <a:avLst/>
+          </a:prstGeom>
+        </p:spPr>
+        <p:style>
+          <a:lnRef idx="2">
+            <a:schemeClr val="accent1">
+              <a:shade val="50000"/>
+            </a:schemeClr>
+          </a:lnRef>
+          <a:fillRef idx="1">
+            <a:schemeClr val="accent1"/>
+          </a:fillRef>
+          <a:effectRef idx="0">
+            <a:schemeClr val="accent1"/>
+          </a:effectRef>
+          <a:fontRef idx="minor">
+            <a:schemeClr val="lt1"/>
+          </a:fontRef>
+        </p:style>
+        <p:txBody>
+          <a:bodyPr rtlCol="0" anchor="ctr"/>
+          <a:lstStyle/>
+          <a:p>
+            <a:pPr algn="ctr"/>
+            <a:r>
+              <a:rPr lang="en-US" sz="1100" b="1" dirty="0" smtClean="0"/>
+              <a:t>First “Ctrl Key” SET the Start Line, Second “Ctrl Key” set the End Line.</a:t>
+            </a:r>
+          </a:p>
+          <a:p>
+            <a:pPr algn="ctr"/>
+            <a:r>
+              <a:rPr lang="en-US" sz="1100" b="1" dirty="0" smtClean="0"/>
+              <a:t>“Shift Key” erase the lines. </a:t>
+            </a:r>
+            <a:endParaRPr lang="en-US" sz="1100" b="1" dirty="0"/>
+          </a:p>
+        </p:txBody>
+      </p:sp>
+    </p:spTree>
+    <p:extLst>
+      <p:ext uri="{BB962C8B-B14F-4D97-AF65-F5344CB8AC3E}">
+        <p14:creationId xmlns:p14="http://schemas.microsoft.com/office/powerpoint/2010/main" val="1708315026"/>
+      </p:ext>
+    </p:extLst>
+  </p:cSld>
+  <p:clrMapOvr>
+    <a:masterClrMapping/>
+  </p:clrMapOvr>
+  <p:timing>
+    <p:tnLst>
+      <p:par>
+        <p:cTn id="1" dur="indefinite" restart="never" nodeType="tmRoot"/>
+      </p:par>
+    </p:tnLst>
+  </p:timing>
+</p:sld>
+</file>
+
+<file path=ppt/slides/slide9.xml><?xml version="1.0" encoding="utf-8"?>
+<p:sld xmlns:a="http://schemas.openxmlformats.org/drawingml/2006/main" xmlns:r="http://schemas.openxmlformats.org/officeDocument/2006/relationships" xmlns:p="http://schemas.openxmlformats.org/presentationml/2006/main">
+  <p:cSld>
+    <p:spTree>
+      <p:nvGrpSpPr>
+        <p:cNvPr id="1" name=""/>
+        <p:cNvGrpSpPr/>
+        <p:nvPr/>
+      </p:nvGrpSpPr>
+      <p:grpSpPr>
+        <a:xfrm>
+          <a:off x="0" y="0"/>
+          <a:ext cx="0" cy="0"/>
+          <a:chOff x="0" y="0"/>
+          <a:chExt cx="0" cy="0"/>
+        </a:xfrm>
+      </p:grpSpPr>
+      <p:pic>
+        <p:nvPicPr>
           <p:cNvPr id="2" name="Picture 1"/>
           <p:cNvPicPr>
             <a:picLocks noChangeAspect="1"/>
@@ -5767,7 +8972,7 @@
           <a:p>
             <a:pPr algn="ctr"/>
             <a:r>
-              <a:rPr lang="fr-FR" sz="1000" b="1" dirty="0" smtClean="0">
+              <a:rPr lang="en-US" sz="1000" b="1" dirty="0" smtClean="0">
                 <a:solidFill>
                   <a:schemeClr val="bg1"/>
                 </a:solidFill>
@@ -5778,30 +8983,14 @@
           <a:p>
             <a:pPr algn="ctr"/>
             <a:r>
-              <a:rPr lang="fr-FR" sz="1000" b="1" dirty="0" smtClean="0">
+              <a:rPr lang="en-US" sz="1000" b="1" dirty="0" smtClean="0">
                 <a:solidFill>
                   <a:schemeClr val="bg1"/>
                 </a:solidFill>
               </a:rPr>
-              <a:t>(</a:t>
-            </a:r>
-            <a:r>
-              <a:rPr lang="fr-FR" sz="1000" b="1" dirty="0" err="1" smtClean="0">
-                <a:solidFill>
-                  <a:schemeClr val="bg1"/>
-                </a:solidFill>
-              </a:rPr>
-              <a:t>Follow</a:t>
-            </a:r>
-            <a:r>
-              <a:rPr lang="fr-FR" sz="1000" b="1" dirty="0" smtClean="0">
-                <a:solidFill>
-                  <a:schemeClr val="bg1"/>
-                </a:solidFill>
-              </a:rPr>
-              <a:t> the Plot)</a:t>
-            </a:r>
-            <a:endParaRPr lang="fr-FR" sz="1000" b="1" dirty="0">
+              <a:t>(Follow the Plot)</a:t>
+            </a:r>
+            <a:endParaRPr lang="en-US" sz="1000" b="1" dirty="0">
               <a:solidFill>
                 <a:schemeClr val="bg1"/>
               </a:solidFill>

</xml_diff>

<commit_message>
19/03/2019 at  9:44:45  / update README.md  M README.md  M doc/images.pptx  M installer/readMe.txt
</commit_message>
<xml_diff>
--- a/doc/images.pptx
+++ b/doc/images.pptx
@@ -3376,288 +3376,16 @@
           <a:chExt cx="0" cy="0"/>
         </a:xfrm>
       </p:grpSpPr>
-      <p:sp>
-        <p:nvSpPr>
-          <p:cNvPr id="20" name="TextBox 19"/>
-          <p:cNvSpPr txBox="1"/>
-          <p:nvPr/>
-        </p:nvSpPr>
-        <p:spPr>
-          <a:xfrm>
-            <a:off x="2246110" y="1485645"/>
-            <a:ext cx="9211506" cy="4939703"/>
-          </a:xfrm>
-          <a:prstGeom prst="rect">
-            <a:avLst/>
-          </a:prstGeom>
-          <a:noFill/>
-          <a:ln>
-            <a:solidFill>
-              <a:schemeClr val="accent1">
-                <a:shade val="50000"/>
-              </a:schemeClr>
-            </a:solidFill>
-          </a:ln>
-        </p:spPr>
-        <p:txBody>
-          <a:bodyPr wrap="square" rtlCol="0">
-            <a:noAutofit/>
-          </a:bodyPr>
-          <a:lstStyle/>
-          <a:p>
-            <a:r>
-              <a:rPr lang="en-US" sz="1400" b="1" dirty="0" smtClean="0"/>
-              <a:t>One Plot Selected</a:t>
-            </a:r>
-          </a:p>
-          <a:p>
-            <a:pPr algn="ctr"/>
-            <a:endParaRPr lang="en-US" sz="1400" b="1" dirty="0"/>
-          </a:p>
-        </p:txBody>
-      </p:sp>
-      <p:sp>
-        <p:nvSpPr>
-          <p:cNvPr id="19" name="TextBox 18"/>
-          <p:cNvSpPr txBox="1"/>
-          <p:nvPr/>
-        </p:nvSpPr>
-        <p:spPr>
-          <a:xfrm>
-            <a:off x="4478923" y="272610"/>
-            <a:ext cx="3430534" cy="991595"/>
-          </a:xfrm>
-          <a:prstGeom prst="rect">
-            <a:avLst/>
-          </a:prstGeom>
-          <a:noFill/>
-          <a:ln>
-            <a:solidFill>
-              <a:schemeClr val="accent1">
-                <a:shade val="50000"/>
-              </a:schemeClr>
-            </a:solidFill>
-          </a:ln>
-        </p:spPr>
-        <p:txBody>
-          <a:bodyPr wrap="square" rtlCol="0">
-            <a:noAutofit/>
-          </a:bodyPr>
-          <a:lstStyle/>
-          <a:p>
-            <a:r>
-              <a:rPr lang="en-US" sz="1400" b="1" dirty="0" smtClean="0"/>
-              <a:t>No Plot Selected</a:t>
-            </a:r>
-          </a:p>
-          <a:p>
-            <a:pPr algn="ctr"/>
-            <a:endParaRPr lang="en-US" sz="1400" b="1" dirty="0"/>
-          </a:p>
-        </p:txBody>
-      </p:sp>
-      <p:sp>
-        <p:nvSpPr>
-          <p:cNvPr id="12" name="Rounded Rectangle 11"/>
-          <p:cNvSpPr/>
-          <p:nvPr/>
-        </p:nvSpPr>
-        <p:spPr>
-          <a:xfrm>
-            <a:off x="1245793" y="840757"/>
-            <a:ext cx="2368850" cy="312983"/>
-          </a:xfrm>
-          <a:prstGeom prst="roundRect">
-            <a:avLst/>
-          </a:prstGeom>
-        </p:spPr>
-        <p:style>
-          <a:lnRef idx="2">
-            <a:schemeClr val="accent1"/>
-          </a:lnRef>
-          <a:fillRef idx="1">
-            <a:schemeClr val="lt1"/>
-          </a:fillRef>
-          <a:effectRef idx="0">
-            <a:schemeClr val="accent1"/>
-          </a:effectRef>
-          <a:fontRef idx="minor">
-            <a:schemeClr val="dk1"/>
-          </a:fontRef>
-        </p:style>
-        <p:txBody>
-          <a:bodyPr rtlCol="0" anchor="ctr"/>
-          <a:lstStyle/>
-          <a:p>
-            <a:pPr lvl="0" algn="ctr"/>
-            <a:r>
-              <a:rPr lang="en-US" sz="1400" b="1" dirty="0">
-                <a:solidFill>
-                  <a:prstClr val="black"/>
-                </a:solidFill>
-              </a:rPr>
-              <a:t>No Plot Selected</a:t>
-            </a:r>
-            <a:endParaRPr lang="en-US" sz="1400" b="1" dirty="0">
-              <a:solidFill>
-                <a:prstClr val="black"/>
-              </a:solidFill>
-            </a:endParaRPr>
-          </a:p>
-        </p:txBody>
-      </p:sp>
-      <p:sp>
-        <p:nvSpPr>
-          <p:cNvPr id="13" name="Flowchart: Manual Input 12"/>
-          <p:cNvSpPr/>
-          <p:nvPr/>
-        </p:nvSpPr>
-        <p:spPr>
-          <a:xfrm>
-            <a:off x="5107956" y="606020"/>
-            <a:ext cx="2172467" cy="469474"/>
-          </a:xfrm>
-          <a:prstGeom prst="flowChartManualInput">
-            <a:avLst/>
-          </a:prstGeom>
-        </p:spPr>
-        <p:style>
-          <a:lnRef idx="2">
-            <a:schemeClr val="accent1"/>
-          </a:lnRef>
-          <a:fillRef idx="1">
-            <a:schemeClr val="lt1"/>
-          </a:fillRef>
-          <a:effectRef idx="0">
-            <a:schemeClr val="accent1"/>
-          </a:effectRef>
-          <a:fontRef idx="minor">
-            <a:schemeClr val="dk1"/>
-          </a:fontRef>
-        </p:style>
-        <p:txBody>
-          <a:bodyPr rtlCol="0" anchor="ctr"/>
-          <a:lstStyle/>
-          <a:p>
-            <a:pPr lvl="0" algn="ctr"/>
-            <a:r>
-              <a:rPr lang="en-US" sz="1400" b="1">
-                <a:solidFill>
-                  <a:prstClr val="black"/>
-                </a:solidFill>
-              </a:rPr>
-              <a:t>Click on a Plot Info Line</a:t>
-            </a:r>
-            <a:endParaRPr lang="en-US" sz="1400" b="1" dirty="0">
-              <a:solidFill>
-                <a:prstClr val="black"/>
-              </a:solidFill>
-            </a:endParaRPr>
-          </a:p>
-        </p:txBody>
-      </p:sp>
-      <p:sp>
-        <p:nvSpPr>
-          <p:cNvPr id="14" name="Flowchart: Decision 13"/>
-          <p:cNvSpPr/>
-          <p:nvPr/>
-        </p:nvSpPr>
-        <p:spPr>
-          <a:xfrm>
-            <a:off x="6265773" y="1679992"/>
-            <a:ext cx="2839347" cy="612648"/>
-          </a:xfrm>
-          <a:prstGeom prst="flowChartDecision">
-            <a:avLst/>
-          </a:prstGeom>
-        </p:spPr>
-        <p:style>
-          <a:lnRef idx="2">
-            <a:schemeClr val="accent1"/>
-          </a:lnRef>
-          <a:fillRef idx="1">
-            <a:schemeClr val="lt1"/>
-          </a:fillRef>
-          <a:effectRef idx="0">
-            <a:schemeClr val="accent1"/>
-          </a:effectRef>
-          <a:fontRef idx="minor">
-            <a:schemeClr val="dk1"/>
-          </a:fontRef>
-        </p:style>
-        <p:txBody>
-          <a:bodyPr rtlCol="0" anchor="ctr"/>
-          <a:lstStyle/>
-          <a:p>
-            <a:pPr algn="ctr"/>
-            <a:r>
-              <a:rPr lang="en-US" sz="1400" b="1" dirty="0" smtClean="0"/>
-              <a:t>Plotting Stopped</a:t>
-            </a:r>
-            <a:endParaRPr lang="en-US" sz="1400" b="1" dirty="0"/>
-          </a:p>
-        </p:txBody>
-      </p:sp>
-      <p:sp>
-        <p:nvSpPr>
-          <p:cNvPr id="21" name="Flowchart: Alternate Process 20"/>
-          <p:cNvSpPr/>
-          <p:nvPr/>
-        </p:nvSpPr>
-        <p:spPr>
-          <a:xfrm>
-            <a:off x="2534545" y="1863587"/>
-            <a:ext cx="914400" cy="478657"/>
-          </a:xfrm>
-          <a:prstGeom prst="flowChartAlternateProcess">
-            <a:avLst/>
-          </a:prstGeom>
-        </p:spPr>
-        <p:style>
-          <a:lnRef idx="2">
-            <a:schemeClr val="accent1"/>
-          </a:lnRef>
-          <a:fillRef idx="1">
-            <a:schemeClr val="lt1"/>
-          </a:fillRef>
-          <a:effectRef idx="0">
-            <a:schemeClr val="accent1"/>
-          </a:effectRef>
-          <a:fontRef idx="minor">
-            <a:schemeClr val="dk1"/>
-          </a:fontRef>
-        </p:style>
-        <p:txBody>
-          <a:bodyPr rtlCol="0" anchor="ctr"/>
-          <a:lstStyle/>
-          <a:p>
-            <a:pPr lvl="0" algn="ctr"/>
-            <a:r>
-              <a:rPr lang="en-US" sz="1400" b="1">
-                <a:solidFill>
-                  <a:prstClr val="black"/>
-                </a:solidFill>
-              </a:rPr>
-              <a:t>ESC Key</a:t>
-            </a:r>
-            <a:endParaRPr lang="en-US" sz="1400" b="1" dirty="0">
-              <a:solidFill>
-                <a:prstClr val="black"/>
-              </a:solidFill>
-            </a:endParaRPr>
-          </a:p>
-        </p:txBody>
-      </p:sp>
       <p:pic>
         <p:nvPicPr>
-          <p:cNvPr id="22" name="Picture 21"/>
+          <p:cNvPr id="25" name="Picture 24"/>
           <p:cNvPicPr>
             <a:picLocks noChangeAspect="1"/>
           </p:cNvPicPr>
           <p:nvPr/>
         </p:nvPicPr>
         <p:blipFill>
-          <a:blip r:embed="rId2" cstate="print">
+          <a:blip r:embed="rId2">
             <a:extLst>
               <a:ext uri="{28A0092B-C50C-407E-A947-70E740481C1C}">
                 <a14:useLocalDpi xmlns:a14="http://schemas.microsoft.com/office/drawing/2010/main" val="0"/>
@@ -3670,8 +3398,8 @@
         </p:blipFill>
         <p:spPr>
           <a:xfrm>
-            <a:off x="4510877" y="1843840"/>
-            <a:ext cx="1402897" cy="1334277"/>
+            <a:off x="2914131" y="411057"/>
+            <a:ext cx="1487945" cy="968829"/>
           </a:xfrm>
           <a:prstGeom prst="rect">
             <a:avLst/>
@@ -3680,7 +3408,7 @@
       </p:pic>
       <p:pic>
         <p:nvPicPr>
-          <p:cNvPr id="23" name="Picture 22"/>
+          <p:cNvPr id="26" name="Picture 25"/>
           <p:cNvPicPr>
             <a:picLocks noChangeAspect="1"/>
           </p:cNvPicPr>
@@ -3700,54 +3428,55 @@
         </p:blipFill>
         <p:spPr>
           <a:xfrm>
-            <a:off x="9494559" y="1843840"/>
-            <a:ext cx="1563397" cy="1896864"/>
+            <a:off x="410267" y="411057"/>
+            <a:ext cx="1485900" cy="968829"/>
           </a:xfrm>
           <a:prstGeom prst="rect">
             <a:avLst/>
           </a:prstGeom>
         </p:spPr>
       </p:pic>
-      <p:sp>
-        <p:nvSpPr>
-          <p:cNvPr id="24" name="TextBox 23"/>
-          <p:cNvSpPr txBox="1"/>
+      <p:pic>
+        <p:nvPicPr>
+          <p:cNvPr id="1026" name="Picture 2" descr="https://lh6.googleusercontent.com/uc1wqDiEHVVoG7NZwrq4sq_s4VPOAgv3lYI9e-SgTDcXYPaqwu1Fdhnw7pWqcOX1TamSUp4gyxBbisX6NUh7DxYfy8NFBz62Iu0ajIIqPxoxVpNPLRxvRd6Hn5RxzdrY38LIxw"/>
+          <p:cNvPicPr>
+            <a:picLocks noChangeAspect="1" noChangeArrowheads="1"/>
+          </p:cNvPicPr>
           <p:nvPr/>
-        </p:nvSpPr>
-        <p:spPr>
+        </p:nvPicPr>
+        <p:blipFill>
+          <a:blip r:embed="rId4" cstate="print">
+            <a:extLst>
+              <a:ext uri="{28A0092B-C50C-407E-A947-70E740481C1C}">
+                <a14:useLocalDpi xmlns:a14="http://schemas.microsoft.com/office/drawing/2010/main" val="0"/>
+              </a:ext>
+            </a:extLst>
+          </a:blip>
+          <a:srcRect/>
+          <a:stretch>
+            <a:fillRect/>
+          </a:stretch>
+        </p:blipFill>
+        <p:spPr bwMode="auto">
           <a:xfrm>
-            <a:off x="5368015" y="3918382"/>
-            <a:ext cx="5689941" cy="2068651"/>
+            <a:off x="2219367" y="709734"/>
+            <a:ext cx="409575" cy="409575"/>
           </a:xfrm>
           <a:prstGeom prst="rect">
             <a:avLst/>
           </a:prstGeom>
           <a:noFill/>
-          <a:ln>
-            <a:solidFill>
-              <a:schemeClr val="accent1">
-                <a:shade val="50000"/>
-              </a:schemeClr>
-            </a:solidFill>
-          </a:ln>
+          <a:extLst>
+            <a:ext uri="{909E8E84-426E-40DD-AFC4-6F175D3DCCD1}">
+              <a14:hiddenFill xmlns:a14="http://schemas.microsoft.com/office/drawing/2010/main">
+                <a:solidFill>
+                  <a:srgbClr val="FFFFFF"/>
+                </a:solidFill>
+              </a14:hiddenFill>
+            </a:ext>
+          </a:extLst>
         </p:spPr>
-        <p:txBody>
-          <a:bodyPr wrap="square" rtlCol="0">
-            <a:noAutofit/>
-          </a:bodyPr>
-          <a:lstStyle/>
-          <a:p>
-            <a:r>
-              <a:rPr lang="en-US" sz="1400" b="1" dirty="0" smtClean="0"/>
-              <a:t>One Plot Selected</a:t>
-            </a:r>
-          </a:p>
-          <a:p>
-            <a:pPr algn="ctr"/>
-            <a:endParaRPr lang="en-US" sz="1400" b="1" dirty="0"/>
-          </a:p>
-        </p:txBody>
-      </p:sp>
+      </p:pic>
     </p:spTree>
     <p:extLst>
       <p:ext uri="{BB962C8B-B14F-4D97-AF65-F5344CB8AC3E}">

</xml_diff>

<commit_message>
19/03/2019 at  9:53:08  M README.md  M doc/images.pptx
</commit_message>
<xml_diff>
--- a/doc/images.pptx
+++ b/doc/images.pptx
@@ -16,6 +16,7 @@
     <p:sldId id="263" r:id="rId10"/>
     <p:sldId id="265" r:id="rId11"/>
     <p:sldId id="266" r:id="rId12"/>
+    <p:sldId id="267" r:id="rId13"/>
   </p:sldIdLst>
   <p:sldSz cx="12192000" cy="6858000"/>
   <p:notesSz cx="6858000" cy="9144000"/>
@@ -253,7 +254,7 @@
           <a:p>
             <a:fld id="{9A2D6F07-9B14-4B65-97D8-EE305D3D2280}" type="datetimeFigureOut">
               <a:rPr lang="fr-FR" smtClean="0"/>
-              <a:t>18/03/2019</a:t>
+              <a:t>19/03/2019</a:t>
             </a:fld>
             <a:endParaRPr lang="fr-FR"/>
           </a:p>
@@ -423,7 +424,7 @@
           <a:p>
             <a:fld id="{9A2D6F07-9B14-4B65-97D8-EE305D3D2280}" type="datetimeFigureOut">
               <a:rPr lang="fr-FR" smtClean="0"/>
-              <a:t>18/03/2019</a:t>
+              <a:t>19/03/2019</a:t>
             </a:fld>
             <a:endParaRPr lang="fr-FR"/>
           </a:p>
@@ -603,7 +604,7 @@
           <a:p>
             <a:fld id="{9A2D6F07-9B14-4B65-97D8-EE305D3D2280}" type="datetimeFigureOut">
               <a:rPr lang="fr-FR" smtClean="0"/>
-              <a:t>18/03/2019</a:t>
+              <a:t>19/03/2019</a:t>
             </a:fld>
             <a:endParaRPr lang="fr-FR"/>
           </a:p>
@@ -773,7 +774,7 @@
           <a:p>
             <a:fld id="{9A2D6F07-9B14-4B65-97D8-EE305D3D2280}" type="datetimeFigureOut">
               <a:rPr lang="fr-FR" smtClean="0"/>
-              <a:t>18/03/2019</a:t>
+              <a:t>19/03/2019</a:t>
             </a:fld>
             <a:endParaRPr lang="fr-FR"/>
           </a:p>
@@ -1019,7 +1020,7 @@
           <a:p>
             <a:fld id="{9A2D6F07-9B14-4B65-97D8-EE305D3D2280}" type="datetimeFigureOut">
               <a:rPr lang="fr-FR" smtClean="0"/>
-              <a:t>18/03/2019</a:t>
+              <a:t>19/03/2019</a:t>
             </a:fld>
             <a:endParaRPr lang="fr-FR"/>
           </a:p>
@@ -1251,7 +1252,7 @@
           <a:p>
             <a:fld id="{9A2D6F07-9B14-4B65-97D8-EE305D3D2280}" type="datetimeFigureOut">
               <a:rPr lang="fr-FR" smtClean="0"/>
-              <a:t>18/03/2019</a:t>
+              <a:t>19/03/2019</a:t>
             </a:fld>
             <a:endParaRPr lang="fr-FR"/>
           </a:p>
@@ -1618,7 +1619,7 @@
           <a:p>
             <a:fld id="{9A2D6F07-9B14-4B65-97D8-EE305D3D2280}" type="datetimeFigureOut">
               <a:rPr lang="fr-FR" smtClean="0"/>
-              <a:t>18/03/2019</a:t>
+              <a:t>19/03/2019</a:t>
             </a:fld>
             <a:endParaRPr lang="fr-FR"/>
           </a:p>
@@ -1736,7 +1737,7 @@
           <a:p>
             <a:fld id="{9A2D6F07-9B14-4B65-97D8-EE305D3D2280}" type="datetimeFigureOut">
               <a:rPr lang="fr-FR" smtClean="0"/>
-              <a:t>18/03/2019</a:t>
+              <a:t>19/03/2019</a:t>
             </a:fld>
             <a:endParaRPr lang="fr-FR"/>
           </a:p>
@@ -1831,7 +1832,7 @@
           <a:p>
             <a:fld id="{9A2D6F07-9B14-4B65-97D8-EE305D3D2280}" type="datetimeFigureOut">
               <a:rPr lang="fr-FR" smtClean="0"/>
-              <a:t>18/03/2019</a:t>
+              <a:t>19/03/2019</a:t>
             </a:fld>
             <a:endParaRPr lang="fr-FR"/>
           </a:p>
@@ -2108,7 +2109,7 @@
           <a:p>
             <a:fld id="{9A2D6F07-9B14-4B65-97D8-EE305D3D2280}" type="datetimeFigureOut">
               <a:rPr lang="fr-FR" smtClean="0"/>
-              <a:t>18/03/2019</a:t>
+              <a:t>19/03/2019</a:t>
             </a:fld>
             <a:endParaRPr lang="fr-FR"/>
           </a:p>
@@ -2361,7 +2362,7 @@
           <a:p>
             <a:fld id="{9A2D6F07-9B14-4B65-97D8-EE305D3D2280}" type="datetimeFigureOut">
               <a:rPr lang="fr-FR" smtClean="0"/>
-              <a:t>18/03/2019</a:t>
+              <a:t>19/03/2019</a:t>
             </a:fld>
             <a:endParaRPr lang="fr-FR"/>
           </a:p>
@@ -2574,7 +2575,7 @@
           <a:p>
             <a:fld id="{9A2D6F07-9B14-4B65-97D8-EE305D3D2280}" type="datetimeFigureOut">
               <a:rPr lang="fr-FR" smtClean="0"/>
-              <a:t>18/03/2019</a:t>
+              <a:t>19/03/2019</a:t>
             </a:fld>
             <a:endParaRPr lang="fr-FR"/>
           </a:p>
@@ -3855,11 +3856,6 @@
                   </a:rPr>
                   <a:t>Click on a Plot Info Line</a:t>
                 </a:r>
-                <a:endParaRPr lang="en-US" sz="1200" b="1" dirty="0">
-                  <a:solidFill>
-                    <a:prstClr val="black"/>
-                  </a:solidFill>
-                </a:endParaRPr>
               </a:p>
             </p:txBody>
           </p:sp>
@@ -3968,11 +3964,6 @@
                     </a:rPr>
                     <a:t>ESC Key</a:t>
                   </a:r>
-                  <a:endParaRPr lang="en-US" sz="1200" b="1" dirty="0">
-                    <a:solidFill>
-                      <a:prstClr val="black"/>
-                    </a:solidFill>
-                  </a:endParaRPr>
                 </a:p>
               </p:txBody>
             </p:sp>
@@ -4142,11 +4133,6 @@
                     </a:rPr>
                     <a:t>Plot Info Line</a:t>
                   </a:r>
-                  <a:endParaRPr lang="en-US" sz="1200" b="1" dirty="0">
-                    <a:solidFill>
-                      <a:prstClr val="black"/>
-                    </a:solidFill>
-                  </a:endParaRPr>
                 </a:p>
               </p:txBody>
             </p:sp>
@@ -4481,11 +4467,6 @@
                 </a:rPr>
                 <a:t>Click on a Plot Info Line</a:t>
               </a:r>
-              <a:endParaRPr lang="en-US" sz="1200" b="1" dirty="0">
-                <a:solidFill>
-                  <a:prstClr val="black"/>
-                </a:solidFill>
-              </a:endParaRPr>
             </a:p>
           </p:txBody>
         </p:sp>
@@ -4884,11 +4865,6 @@
                   </a:rPr>
                   <a:t>ESC Key</a:t>
                 </a:r>
-                <a:endParaRPr lang="en-US" sz="1200" b="1" dirty="0">
-                  <a:solidFill>
-                    <a:prstClr val="black"/>
-                  </a:solidFill>
-                </a:endParaRPr>
               </a:p>
             </p:txBody>
           </p:sp>
@@ -5084,11 +5060,6 @@
                   </a:rPr>
                   <a:t>Plot Info Line</a:t>
                 </a:r>
-                <a:endParaRPr lang="en-US" sz="1200" b="1" dirty="0">
-                  <a:solidFill>
-                    <a:prstClr val="black"/>
-                  </a:solidFill>
-                </a:endParaRPr>
               </a:p>
             </p:txBody>
           </p:sp>
@@ -5465,11 +5436,6 @@
                   </a:rPr>
                   <a:t>ESC Key</a:t>
                 </a:r>
-                <a:endParaRPr lang="en-US" sz="1200" b="1" dirty="0">
-                  <a:solidFill>
-                    <a:prstClr val="black"/>
-                  </a:solidFill>
-                </a:endParaRPr>
               </a:p>
             </p:txBody>
           </p:sp>
@@ -5665,11 +5631,6 @@
                   </a:rPr>
                   <a:t>Plot Info Line</a:t>
                 </a:r>
-                <a:endParaRPr lang="en-US" sz="1200" b="1" dirty="0">
-                  <a:solidFill>
-                    <a:prstClr val="black"/>
-                  </a:solidFill>
-                </a:endParaRPr>
               </a:p>
             </p:txBody>
           </p:sp>
@@ -5890,6 +5851,103 @@
     <p:extLst>
       <p:ext uri="{BB962C8B-B14F-4D97-AF65-F5344CB8AC3E}">
         <p14:creationId xmlns:p14="http://schemas.microsoft.com/office/powerpoint/2010/main" val="3815407654"/>
+      </p:ext>
+    </p:extLst>
+  </p:cSld>
+  <p:clrMapOvr>
+    <a:masterClrMapping/>
+  </p:clrMapOvr>
+  <p:timing>
+    <p:tnLst>
+      <p:par>
+        <p:cTn id="1" dur="indefinite" restart="never" nodeType="tmRoot"/>
+      </p:par>
+    </p:tnLst>
+  </p:timing>
+</p:sld>
+</file>
+
+<file path=ppt/slides/slide12.xml><?xml version="1.0" encoding="utf-8"?>
+<p:sld xmlns:a="http://schemas.openxmlformats.org/drawingml/2006/main" xmlns:r="http://schemas.openxmlformats.org/officeDocument/2006/relationships" xmlns:p="http://schemas.openxmlformats.org/presentationml/2006/main">
+  <p:cSld>
+    <p:spTree>
+      <p:nvGrpSpPr>
+        <p:cNvPr id="1" name=""/>
+        <p:cNvGrpSpPr/>
+        <p:nvPr/>
+      </p:nvGrpSpPr>
+      <p:grpSpPr>
+        <a:xfrm>
+          <a:off x="0" y="0"/>
+          <a:ext cx="0" cy="0"/>
+          <a:chOff x="0" y="0"/>
+          <a:chExt cx="0" cy="0"/>
+        </a:xfrm>
+      </p:grpSpPr>
+      <p:pic>
+        <p:nvPicPr>
+          <p:cNvPr id="4" name="Picture 3"/>
+          <p:cNvPicPr>
+            <a:picLocks noChangeAspect="1"/>
+          </p:cNvPicPr>
+          <p:nvPr/>
+        </p:nvPicPr>
+        <p:blipFill>
+          <a:blip r:embed="rId2" cstate="print">
+            <a:extLst>
+              <a:ext uri="{28A0092B-C50C-407E-A947-70E740481C1C}">
+                <a14:useLocalDpi xmlns:a14="http://schemas.microsoft.com/office/drawing/2010/main" val="0"/>
+              </a:ext>
+            </a:extLst>
+          </a:blip>
+          <a:stretch>
+            <a:fillRect/>
+          </a:stretch>
+        </p:blipFill>
+        <p:spPr>
+          <a:xfrm>
+            <a:off x="2688109" y="126124"/>
+            <a:ext cx="5643233" cy="5055476"/>
+          </a:xfrm>
+          <a:prstGeom prst="rect">
+            <a:avLst/>
+          </a:prstGeom>
+        </p:spPr>
+      </p:pic>
+      <p:pic>
+        <p:nvPicPr>
+          <p:cNvPr id="5" name="Picture 4"/>
+          <p:cNvPicPr>
+            <a:picLocks noChangeAspect="1"/>
+          </p:cNvPicPr>
+          <p:nvPr/>
+        </p:nvPicPr>
+        <p:blipFill>
+          <a:blip r:embed="rId3" cstate="print">
+            <a:extLst>
+              <a:ext uri="{28A0092B-C50C-407E-A947-70E740481C1C}">
+                <a14:useLocalDpi xmlns:a14="http://schemas.microsoft.com/office/drawing/2010/main" val="0"/>
+              </a:ext>
+            </a:extLst>
+          </a:blip>
+          <a:stretch>
+            <a:fillRect/>
+          </a:stretch>
+        </p:blipFill>
+        <p:spPr>
+          <a:xfrm>
+            <a:off x="259521" y="304331"/>
+            <a:ext cx="2260521" cy="2901324"/>
+          </a:xfrm>
+          <a:prstGeom prst="rect">
+            <a:avLst/>
+          </a:prstGeom>
+        </p:spPr>
+      </p:pic>
+    </p:spTree>
+    <p:extLst>
+      <p:ext uri="{BB962C8B-B14F-4D97-AF65-F5344CB8AC3E}">
+        <p14:creationId xmlns:p14="http://schemas.microsoft.com/office/powerpoint/2010/main" val="3402426437"/>
       </p:ext>
     </p:extLst>
   </p:cSld>

</xml_diff>

<commit_message>
04/04/2019 at 18:52:41  Version 1.2.1 Doc OK  M buttonw.cpp  M doc/images.pptx  M doc/lets_play.jpg  M doc/plot_stopped.JPG  M doc/plot_stopped_pptx.JPG  M doc/plotter_details_pptx.JPG  M doc/yaspContextMenu1.JPG  M doc/yaspTopMenuBar0.jpg  M doc/yasp_widgets_0.JPG  M installer/YASP_Setup.exe  M installer/updates.json  M installer/yasp.iss  M mainwindow.cpp
</commit_message>
<xml_diff>
--- a/doc/images.pptx
+++ b/doc/images.pptx
@@ -254,7 +254,7 @@
           <a:p>
             <a:fld id="{9A2D6F07-9B14-4B65-97D8-EE305D3D2280}" type="datetimeFigureOut">
               <a:rPr lang="fr-FR" smtClean="0"/>
-              <a:t>19/03/2019</a:t>
+              <a:t>04/04/2019</a:t>
             </a:fld>
             <a:endParaRPr lang="fr-FR"/>
           </a:p>
@@ -424,7 +424,7 @@
           <a:p>
             <a:fld id="{9A2D6F07-9B14-4B65-97D8-EE305D3D2280}" type="datetimeFigureOut">
               <a:rPr lang="fr-FR" smtClean="0"/>
-              <a:t>19/03/2019</a:t>
+              <a:t>04/04/2019</a:t>
             </a:fld>
             <a:endParaRPr lang="fr-FR"/>
           </a:p>
@@ -604,7 +604,7 @@
           <a:p>
             <a:fld id="{9A2D6F07-9B14-4B65-97D8-EE305D3D2280}" type="datetimeFigureOut">
               <a:rPr lang="fr-FR" smtClean="0"/>
-              <a:t>19/03/2019</a:t>
+              <a:t>04/04/2019</a:t>
             </a:fld>
             <a:endParaRPr lang="fr-FR"/>
           </a:p>
@@ -774,7 +774,7 @@
           <a:p>
             <a:fld id="{9A2D6F07-9B14-4B65-97D8-EE305D3D2280}" type="datetimeFigureOut">
               <a:rPr lang="fr-FR" smtClean="0"/>
-              <a:t>19/03/2019</a:t>
+              <a:t>04/04/2019</a:t>
             </a:fld>
             <a:endParaRPr lang="fr-FR"/>
           </a:p>
@@ -1020,7 +1020,7 @@
           <a:p>
             <a:fld id="{9A2D6F07-9B14-4B65-97D8-EE305D3D2280}" type="datetimeFigureOut">
               <a:rPr lang="fr-FR" smtClean="0"/>
-              <a:t>19/03/2019</a:t>
+              <a:t>04/04/2019</a:t>
             </a:fld>
             <a:endParaRPr lang="fr-FR"/>
           </a:p>
@@ -1252,7 +1252,7 @@
           <a:p>
             <a:fld id="{9A2D6F07-9B14-4B65-97D8-EE305D3D2280}" type="datetimeFigureOut">
               <a:rPr lang="fr-FR" smtClean="0"/>
-              <a:t>19/03/2019</a:t>
+              <a:t>04/04/2019</a:t>
             </a:fld>
             <a:endParaRPr lang="fr-FR"/>
           </a:p>
@@ -1619,7 +1619,7 @@
           <a:p>
             <a:fld id="{9A2D6F07-9B14-4B65-97D8-EE305D3D2280}" type="datetimeFigureOut">
               <a:rPr lang="fr-FR" smtClean="0"/>
-              <a:t>19/03/2019</a:t>
+              <a:t>04/04/2019</a:t>
             </a:fld>
             <a:endParaRPr lang="fr-FR"/>
           </a:p>
@@ -1737,7 +1737,7 @@
           <a:p>
             <a:fld id="{9A2D6F07-9B14-4B65-97D8-EE305D3D2280}" type="datetimeFigureOut">
               <a:rPr lang="fr-FR" smtClean="0"/>
-              <a:t>19/03/2019</a:t>
+              <a:t>04/04/2019</a:t>
             </a:fld>
             <a:endParaRPr lang="fr-FR"/>
           </a:p>
@@ -1832,7 +1832,7 @@
           <a:p>
             <a:fld id="{9A2D6F07-9B14-4B65-97D8-EE305D3D2280}" type="datetimeFigureOut">
               <a:rPr lang="fr-FR" smtClean="0"/>
-              <a:t>19/03/2019</a:t>
+              <a:t>04/04/2019</a:t>
             </a:fld>
             <a:endParaRPr lang="fr-FR"/>
           </a:p>
@@ -2109,7 +2109,7 @@
           <a:p>
             <a:fld id="{9A2D6F07-9B14-4B65-97D8-EE305D3D2280}" type="datetimeFigureOut">
               <a:rPr lang="fr-FR" smtClean="0"/>
-              <a:t>19/03/2019</a:t>
+              <a:t>04/04/2019</a:t>
             </a:fld>
             <a:endParaRPr lang="fr-FR"/>
           </a:p>
@@ -2362,7 +2362,7 @@
           <a:p>
             <a:fld id="{9A2D6F07-9B14-4B65-97D8-EE305D3D2280}" type="datetimeFigureOut">
               <a:rPr lang="fr-FR" smtClean="0"/>
-              <a:t>19/03/2019</a:t>
+              <a:t>04/04/2019</a:t>
             </a:fld>
             <a:endParaRPr lang="fr-FR"/>
           </a:p>
@@ -2575,7 +2575,7 @@
           <a:p>
             <a:fld id="{9A2D6F07-9B14-4B65-97D8-EE305D3D2280}" type="datetimeFigureOut">
               <a:rPr lang="fr-FR" smtClean="0"/>
-              <a:t>19/03/2019</a:t>
+              <a:t>04/04/2019</a:t>
             </a:fld>
             <a:endParaRPr lang="fr-FR"/>
           </a:p>
@@ -3073,51 +3073,6 @@
       </p:sp>
       <p:sp>
         <p:nvSpPr>
-          <p:cNvPr id="6" name="Rounded Rectangle 5"/>
-          <p:cNvSpPr/>
-          <p:nvPr/>
-        </p:nvSpPr>
-        <p:spPr>
-          <a:xfrm>
-            <a:off x="2104373" y="1177447"/>
-            <a:ext cx="8755693" cy="2987457"/>
-          </a:xfrm>
-          <a:prstGeom prst="roundRect">
-            <a:avLst/>
-          </a:prstGeom>
-          <a:solidFill>
-            <a:schemeClr val="accent1">
-              <a:alpha val="10000"/>
-            </a:schemeClr>
-          </a:solidFill>
-        </p:spPr>
-        <p:style>
-          <a:lnRef idx="2">
-            <a:schemeClr val="accent1">
-              <a:shade val="50000"/>
-            </a:schemeClr>
-          </a:lnRef>
-          <a:fillRef idx="1">
-            <a:schemeClr val="accent1"/>
-          </a:fillRef>
-          <a:effectRef idx="0">
-            <a:schemeClr val="accent1"/>
-          </a:effectRef>
-          <a:fontRef idx="minor">
-            <a:schemeClr val="lt1"/>
-          </a:fontRef>
-        </p:style>
-        <p:txBody>
-          <a:bodyPr rtlCol="0" anchor="ctr"/>
-          <a:lstStyle/>
-          <a:p>
-            <a:pPr algn="ctr"/>
-            <a:endParaRPr lang="fr-FR"/>
-          </a:p>
-        </p:txBody>
-      </p:sp>
-      <p:sp>
-        <p:nvSpPr>
           <p:cNvPr id="7" name="Rounded Rectangle 6"/>
           <p:cNvSpPr/>
           <p:nvPr/>
@@ -3337,6 +3292,81 @@
                 <a:schemeClr val="tx1"/>
               </a:solidFill>
             </a:endParaRPr>
+          </a:p>
+        </p:txBody>
+      </p:sp>
+      <p:pic>
+        <p:nvPicPr>
+          <p:cNvPr id="9" name="Picture 8"/>
+          <p:cNvPicPr>
+            <a:picLocks noChangeAspect="1"/>
+          </p:cNvPicPr>
+          <p:nvPr/>
+        </p:nvPicPr>
+        <p:blipFill>
+          <a:blip r:embed="rId3">
+            <a:extLst>
+              <a:ext uri="{28A0092B-C50C-407E-A947-70E740481C1C}">
+                <a14:useLocalDpi xmlns:a14="http://schemas.microsoft.com/office/drawing/2010/main" val="0"/>
+              </a:ext>
+            </a:extLst>
+          </a:blip>
+          <a:stretch>
+            <a:fillRect/>
+          </a:stretch>
+        </p:blipFill>
+        <p:spPr>
+          <a:xfrm>
+            <a:off x="2756335" y="1371064"/>
+            <a:ext cx="7567742" cy="342122"/>
+          </a:xfrm>
+          <a:prstGeom prst="rect">
+            <a:avLst/>
+          </a:prstGeom>
+        </p:spPr>
+      </p:pic>
+      <p:sp>
+        <p:nvSpPr>
+          <p:cNvPr id="6" name="Rounded Rectangle 5"/>
+          <p:cNvSpPr/>
+          <p:nvPr/>
+        </p:nvSpPr>
+        <p:spPr>
+          <a:xfrm>
+            <a:off x="2104373" y="1177447"/>
+            <a:ext cx="8755693" cy="2987457"/>
+          </a:xfrm>
+          <a:prstGeom prst="roundRect">
+            <a:avLst/>
+          </a:prstGeom>
+          <a:solidFill>
+            <a:schemeClr val="accent1">
+              <a:alpha val="10000"/>
+            </a:schemeClr>
+          </a:solidFill>
+        </p:spPr>
+        <p:style>
+          <a:lnRef idx="2">
+            <a:schemeClr val="accent1">
+              <a:shade val="50000"/>
+            </a:schemeClr>
+          </a:lnRef>
+          <a:fillRef idx="1">
+            <a:schemeClr val="accent1"/>
+          </a:fillRef>
+          <a:effectRef idx="0">
+            <a:schemeClr val="accent1"/>
+          </a:effectRef>
+          <a:fontRef idx="minor">
+            <a:schemeClr val="lt1"/>
+          </a:fontRef>
+        </p:style>
+        <p:txBody>
+          <a:bodyPr rtlCol="0" anchor="ctr"/>
+          <a:lstStyle/>
+          <a:p>
+            <a:pPr algn="ctr"/>
+            <a:endParaRPr lang="fr-FR"/>
           </a:p>
         </p:txBody>
       </p:sp>
@@ -5906,8 +5936,8 @@
         </p:blipFill>
         <p:spPr>
           <a:xfrm>
-            <a:off x="2688109" y="126124"/>
-            <a:ext cx="5643233" cy="5055476"/>
+            <a:off x="2688109" y="301406"/>
+            <a:ext cx="5643233" cy="4704912"/>
           </a:xfrm>
           <a:prstGeom prst="rect">
             <a:avLst/>
@@ -5936,8 +5966,8 @@
         </p:blipFill>
         <p:spPr>
           <a:xfrm>
-            <a:off x="259521" y="304331"/>
-            <a:ext cx="2260521" cy="2901324"/>
+            <a:off x="259521" y="587522"/>
+            <a:ext cx="2260521" cy="2334941"/>
           </a:xfrm>
           <a:prstGeom prst="rect">
             <a:avLst/>
@@ -5983,7 +6013,7 @@
       </p:grpSpPr>
       <p:pic>
         <p:nvPicPr>
-          <p:cNvPr id="2" name="Picture 1"/>
+          <p:cNvPr id="12" name="Picture 11"/>
           <p:cNvPicPr>
             <a:picLocks noChangeAspect="1"/>
           </p:cNvPicPr>
@@ -6003,8 +6033,8 @@
         </p:blipFill>
         <p:spPr>
           <a:xfrm>
-            <a:off x="634670" y="3167743"/>
-            <a:ext cx="9279059" cy="498248"/>
+            <a:off x="402276" y="3202907"/>
+            <a:ext cx="9465550" cy="427918"/>
           </a:xfrm>
           <a:prstGeom prst="rect">
             <a:avLst/>
@@ -6019,8 +6049,8 @@
         </p:nvSpPr>
         <p:spPr>
           <a:xfrm>
-            <a:off x="613104" y="3124943"/>
-            <a:ext cx="4069360" cy="583847"/>
+            <a:off x="384469" y="3155673"/>
+            <a:ext cx="4351492" cy="511865"/>
           </a:xfrm>
           <a:prstGeom prst="roundRect">
             <a:avLst/>
@@ -6064,13 +6094,13 @@
         </p:nvSpPr>
         <p:spPr>
           <a:xfrm>
-            <a:off x="821871" y="1996640"/>
-            <a:ext cx="1921883" cy="538619"/>
+            <a:off x="821871" y="2059998"/>
+            <a:ext cx="1921883" cy="475261"/>
           </a:xfrm>
           <a:prstGeom prst="wedgeRoundRectCallout">
             <a:avLst>
-              <a:gd name="adj1" fmla="val 27475"/>
-              <a:gd name="adj2" fmla="val 156736"/>
+              <a:gd name="adj1" fmla="val 35491"/>
+              <a:gd name="adj2" fmla="val 174513"/>
               <a:gd name="adj3" fmla="val 16667"/>
             </a:avLst>
           </a:prstGeom>
@@ -6125,8 +6155,8 @@
         </p:nvSpPr>
         <p:spPr>
           <a:xfrm>
-            <a:off x="4736084" y="3124943"/>
-            <a:ext cx="3155986" cy="583847"/>
+            <a:off x="4795630" y="3155673"/>
+            <a:ext cx="2760380" cy="511865"/>
           </a:xfrm>
           <a:prstGeom prst="roundRect">
             <a:avLst/>
@@ -6170,13 +6200,13 @@
         </p:nvSpPr>
         <p:spPr>
           <a:xfrm>
-            <a:off x="4564365" y="1996639"/>
-            <a:ext cx="1921883" cy="538619"/>
+            <a:off x="3520756" y="2059997"/>
+            <a:ext cx="1921883" cy="475261"/>
           </a:xfrm>
           <a:prstGeom prst="wedgeRoundRectCallout">
             <a:avLst>
-              <a:gd name="adj1" fmla="val 27475"/>
-              <a:gd name="adj2" fmla="val 156736"/>
+              <a:gd name="adj1" fmla="val 66262"/>
+              <a:gd name="adj2" fmla="val 168730"/>
               <a:gd name="adj3" fmla="val 16667"/>
             </a:avLst>
           </a:prstGeom>
@@ -6231,8 +6261,8 @@
         </p:nvSpPr>
         <p:spPr>
           <a:xfrm>
-            <a:off x="8659184" y="3117412"/>
-            <a:ext cx="1308165" cy="583847"/>
+            <a:off x="8850796" y="3155673"/>
+            <a:ext cx="1017030" cy="511865"/>
           </a:xfrm>
           <a:prstGeom prst="roundRect">
             <a:avLst/>
@@ -6276,13 +6306,13 @@
         </p:nvSpPr>
         <p:spPr>
           <a:xfrm>
-            <a:off x="7536130" y="1993241"/>
-            <a:ext cx="2277824" cy="538619"/>
+            <a:off x="7759760" y="2077278"/>
+            <a:ext cx="2277824" cy="475261"/>
           </a:xfrm>
           <a:prstGeom prst="wedgeRoundRectCallout">
             <a:avLst>
-              <a:gd name="adj1" fmla="val 27475"/>
-              <a:gd name="adj2" fmla="val 156736"/>
+              <a:gd name="adj1" fmla="val 17003"/>
+              <a:gd name="adj2" fmla="val 171129"/>
               <a:gd name="adj3" fmla="val 16667"/>
             </a:avLst>
           </a:prstGeom>
@@ -6338,6 +6368,112 @@
               <a:t>Counter</a:t>
             </a:r>
             <a:endParaRPr lang="en-US" dirty="0">
+              <a:solidFill>
+                <a:schemeClr val="tx1"/>
+              </a:solidFill>
+            </a:endParaRPr>
+          </a:p>
+        </p:txBody>
+      </p:sp>
+      <p:sp>
+        <p:nvSpPr>
+          <p:cNvPr id="13" name="Rounded Rectangle 12"/>
+          <p:cNvSpPr/>
+          <p:nvPr/>
+        </p:nvSpPr>
+        <p:spPr>
+          <a:xfrm>
+            <a:off x="7600768" y="3155673"/>
+            <a:ext cx="1180451" cy="511865"/>
+          </a:xfrm>
+          <a:prstGeom prst="roundRect">
+            <a:avLst/>
+          </a:prstGeom>
+          <a:solidFill>
+            <a:schemeClr val="accent1">
+              <a:alpha val="10000"/>
+            </a:schemeClr>
+          </a:solidFill>
+        </p:spPr>
+        <p:style>
+          <a:lnRef idx="2">
+            <a:schemeClr val="accent1">
+              <a:shade val="50000"/>
+            </a:schemeClr>
+          </a:lnRef>
+          <a:fillRef idx="1">
+            <a:schemeClr val="accent1"/>
+          </a:fillRef>
+          <a:effectRef idx="0">
+            <a:schemeClr val="accent1"/>
+          </a:effectRef>
+          <a:fontRef idx="minor">
+            <a:schemeClr val="lt1"/>
+          </a:fontRef>
+        </p:style>
+        <p:txBody>
+          <a:bodyPr rtlCol="0" anchor="ctr"/>
+          <a:lstStyle/>
+          <a:p>
+            <a:pPr algn="ctr"/>
+            <a:endParaRPr lang="fr-FR"/>
+          </a:p>
+        </p:txBody>
+      </p:sp>
+      <p:sp>
+        <p:nvSpPr>
+          <p:cNvPr id="14" name="Rounded Rectangular Callout 13"/>
+          <p:cNvSpPr/>
+          <p:nvPr/>
+        </p:nvSpPr>
+        <p:spPr>
+          <a:xfrm>
+            <a:off x="5983357" y="2077277"/>
+            <a:ext cx="1578784" cy="475261"/>
+          </a:xfrm>
+          <a:prstGeom prst="wedgeRoundRectCallout">
+            <a:avLst>
+              <a:gd name="adj1" fmla="val 78853"/>
+              <a:gd name="adj2" fmla="val 169775"/>
+              <a:gd name="adj3" fmla="val 16667"/>
+            </a:avLst>
+          </a:prstGeom>
+          <a:solidFill>
+            <a:schemeClr val="accent1">
+              <a:alpha val="10000"/>
+            </a:schemeClr>
+          </a:solidFill>
+        </p:spPr>
+        <p:style>
+          <a:lnRef idx="2">
+            <a:schemeClr val="accent1">
+              <a:shade val="50000"/>
+            </a:schemeClr>
+          </a:lnRef>
+          <a:fillRef idx="1">
+            <a:schemeClr val="accent1"/>
+          </a:fillRef>
+          <a:effectRef idx="0">
+            <a:schemeClr val="accent1"/>
+          </a:effectRef>
+          <a:fontRef idx="minor">
+            <a:schemeClr val="lt1"/>
+          </a:fontRef>
+        </p:style>
+        <p:txBody>
+          <a:bodyPr rtlCol="0" anchor="ctr"/>
+          <a:lstStyle/>
+          <a:p>
+            <a:pPr algn="ctr"/>
+            <a:r>
+              <a:rPr lang="fr-FR" dirty="0" smtClean="0">
+                <a:solidFill>
+                  <a:schemeClr val="tx1"/>
+                </a:solidFill>
+              </a:rPr>
+              <a:t>Scroll Control</a:t>
+            </a:r>
+            <a:endParaRPr lang="fr-FR" dirty="0">
               <a:solidFill>
                 <a:schemeClr val="tx1"/>
               </a:solidFill>

</xml_diff>

<commit_message>
07/04/2019 at 10:26:57  Added releases to ship projects on GitHub  M doc/images.pptx D  installer/YASP_Setup.exe  M installer/readMe.txt  M mainwindow.cpp  M yasp.pro  M yasp.pro.user
</commit_message>
<xml_diff>
--- a/doc/images.pptx
+++ b/doc/images.pptx
@@ -7287,8 +7287,8 @@
         </p:blipFill>
         <p:spPr>
           <a:xfrm>
-            <a:off x="4659085" y="1910443"/>
-            <a:ext cx="2873829" cy="3037114"/>
+            <a:off x="4663992" y="1910443"/>
+            <a:ext cx="2864014" cy="3037114"/>
           </a:xfrm>
           <a:prstGeom prst="rect">
             <a:avLst/>
@@ -7303,13 +7303,13 @@
         </p:nvSpPr>
         <p:spPr>
           <a:xfrm>
-            <a:off x="2931838" y="2496658"/>
+            <a:off x="2434882" y="3094331"/>
             <a:ext cx="1632284" cy="301818"/>
           </a:xfrm>
           <a:prstGeom prst="wedgeRoundRectCallout">
             <a:avLst>
-              <a:gd name="adj1" fmla="val 112578"/>
-              <a:gd name="adj2" fmla="val 135665"/>
+              <a:gd name="adj1" fmla="val 90353"/>
+              <a:gd name="adj2" fmla="val 117553"/>
               <a:gd name="adj3" fmla="val 16667"/>
             </a:avLst>
           </a:prstGeom>
@@ -7367,13 +7367,13 @@
         </p:nvSpPr>
         <p:spPr>
           <a:xfrm>
-            <a:off x="2931838" y="2932401"/>
+            <a:off x="2434882" y="3542302"/>
             <a:ext cx="1632284" cy="301818"/>
           </a:xfrm>
           <a:prstGeom prst="wedgeRoundRectCallout">
             <a:avLst>
-              <a:gd name="adj1" fmla="val 114404"/>
-              <a:gd name="adj2" fmla="val 73096"/>
+              <a:gd name="adj1" fmla="val 86090"/>
+              <a:gd name="adj2" fmla="val 54984"/>
               <a:gd name="adj3" fmla="val 16667"/>
             </a:avLst>
           </a:prstGeom>
@@ -7431,13 +7431,13 @@
         </p:nvSpPr>
         <p:spPr>
           <a:xfrm>
-            <a:off x="2931838" y="3382461"/>
+            <a:off x="2434882" y="3939046"/>
             <a:ext cx="1632284" cy="301818"/>
           </a:xfrm>
           <a:prstGeom prst="wedgeRoundRectCallout">
             <a:avLst>
-              <a:gd name="adj1" fmla="val 111969"/>
-              <a:gd name="adj2" fmla="val -15817"/>
+              <a:gd name="adj1" fmla="val 87613"/>
+              <a:gd name="adj2" fmla="val 26993"/>
               <a:gd name="adj3" fmla="val 16667"/>
             </a:avLst>
           </a:prstGeom>
@@ -7495,13 +7495,13 @@
         </p:nvSpPr>
         <p:spPr>
           <a:xfrm>
-            <a:off x="2931838" y="3841255"/>
+            <a:off x="2434882" y="4717128"/>
             <a:ext cx="1632284" cy="301818"/>
           </a:xfrm>
           <a:prstGeom prst="wedgeRoundRectCallout">
             <a:avLst>
-              <a:gd name="adj1" fmla="val 110142"/>
-              <a:gd name="adj2" fmla="val -91558"/>
+              <a:gd name="adj1" fmla="val 89440"/>
+              <a:gd name="adj2" fmla="val -43809"/>
               <a:gd name="adj3" fmla="val 16667"/>
             </a:avLst>
           </a:prstGeom>
@@ -7542,6 +7542,86 @@
                 </a:solidFill>
               </a:rPr>
               <a:t>Save Plot data</a:t>
+            </a:r>
+            <a:endParaRPr lang="en-US" sz="1400" b="1" dirty="0">
+              <a:solidFill>
+                <a:schemeClr val="tx1"/>
+              </a:solidFill>
+            </a:endParaRPr>
+          </a:p>
+        </p:txBody>
+      </p:sp>
+      <p:sp>
+        <p:nvSpPr>
+          <p:cNvPr id="7" name="Rounded Rectangular Callout 6"/>
+          <p:cNvSpPr/>
+          <p:nvPr/>
+        </p:nvSpPr>
+        <p:spPr>
+          <a:xfrm>
+            <a:off x="2434882" y="4328087"/>
+            <a:ext cx="1632284" cy="301818"/>
+          </a:xfrm>
+          <a:prstGeom prst="wedgeRoundRectCallout">
+            <a:avLst>
+              <a:gd name="adj1" fmla="val 89744"/>
+              <a:gd name="adj2" fmla="val -9231"/>
+              <a:gd name="adj3" fmla="val 16667"/>
+            </a:avLst>
+          </a:prstGeom>
+          <a:solidFill>
+            <a:schemeClr val="bg1"/>
+          </a:solidFill>
+          <a:ln>
+            <a:solidFill>
+              <a:schemeClr val="bg2"/>
+            </a:solidFill>
+          </a:ln>
+        </p:spPr>
+        <p:style>
+          <a:lnRef idx="2">
+            <a:schemeClr val="accent1">
+              <a:shade val="50000"/>
+            </a:schemeClr>
+          </a:lnRef>
+          <a:fillRef idx="1">
+            <a:schemeClr val="accent1"/>
+          </a:fillRef>
+          <a:effectRef idx="0">
+            <a:schemeClr val="accent1"/>
+          </a:effectRef>
+          <a:fontRef idx="minor">
+            <a:schemeClr val="lt1"/>
+          </a:fontRef>
+        </p:style>
+        <p:txBody>
+          <a:bodyPr rtlCol="0" anchor="ctr"/>
+          <a:lstStyle/>
+          <a:p>
+            <a:pPr algn="ctr"/>
+            <a:r>
+              <a:rPr lang="en-US" sz="1400" b="1" dirty="0" err="1" smtClean="0">
+                <a:solidFill>
+                  <a:schemeClr val="tx1"/>
+                </a:solidFill>
+              </a:rPr>
+              <a:t>AutoRange</a:t>
+            </a:r>
+            <a:r>
+              <a:rPr lang="en-US" sz="1400" b="1" dirty="0" smtClean="0">
+                <a:solidFill>
+                  <a:schemeClr val="tx1"/>
+                </a:solidFill>
+              </a:rPr>
+              <a:t> </a:t>
+            </a:r>
+            <a:r>
+              <a:rPr lang="en-US" sz="1400" b="1" dirty="0" smtClean="0">
+                <a:solidFill>
+                  <a:schemeClr val="tx1"/>
+                </a:solidFill>
+              </a:rPr>
+              <a:t>plot</a:t>
             </a:r>
             <a:endParaRPr lang="en-US" sz="1400" b="1" dirty="0">
               <a:solidFill>
@@ -7610,8 +7690,8 @@
         </p:blipFill>
         <p:spPr>
           <a:xfrm>
-            <a:off x="1871758" y="847224"/>
-            <a:ext cx="7832919" cy="4933864"/>
+            <a:off x="1871758" y="1225063"/>
+            <a:ext cx="7832919" cy="4178185"/>
           </a:xfrm>
           <a:prstGeom prst="rect">
             <a:avLst/>
@@ -7626,13 +7706,13 @@
         </p:nvSpPr>
         <p:spPr>
           <a:xfrm>
-            <a:off x="3456712" y="2033188"/>
+            <a:off x="3272838" y="2251849"/>
             <a:ext cx="1346957" cy="206785"/>
           </a:xfrm>
           <a:prstGeom prst="wedgeRoundRectCallout">
             <a:avLst>
-              <a:gd name="adj1" fmla="val 77650"/>
-              <a:gd name="adj2" fmla="val -122542"/>
+              <a:gd name="adj1" fmla="val 65106"/>
+              <a:gd name="adj2" fmla="val -377287"/>
               <a:gd name="adj3" fmla="val 16667"/>
             </a:avLst>
           </a:prstGeom>
@@ -7690,7 +7770,7 @@
         </p:nvSpPr>
         <p:spPr>
           <a:xfrm>
-            <a:off x="7924015" y="1446325"/>
+            <a:off x="7128885" y="1724620"/>
             <a:ext cx="1580528" cy="198502"/>
           </a:xfrm>
           <a:prstGeom prst="wedgeRoundRectCallout">
@@ -7754,7 +7834,7 @@
         </p:nvSpPr>
         <p:spPr>
           <a:xfrm>
-            <a:off x="5033304" y="4347570"/>
+            <a:off x="3885334" y="4878378"/>
             <a:ext cx="1346957" cy="206785"/>
           </a:xfrm>
           <a:prstGeom prst="wedgeRoundRectCallout">
@@ -7818,12 +7898,12 @@
         </p:nvSpPr>
         <p:spPr>
           <a:xfrm>
-            <a:off x="5033306" y="3748200"/>
+            <a:off x="3885334" y="4353508"/>
             <a:ext cx="1346957" cy="206785"/>
           </a:xfrm>
           <a:prstGeom prst="wedgeRoundRectCallout">
             <a:avLst>
-              <a:gd name="adj1" fmla="val 98218"/>
+              <a:gd name="adj1" fmla="val 100432"/>
               <a:gd name="adj2" fmla="val 74992"/>
               <a:gd name="adj3" fmla="val 16667"/>
             </a:avLst>
@@ -7882,7 +7962,7 @@
         </p:nvSpPr>
         <p:spPr>
           <a:xfrm>
-            <a:off x="5033305" y="4047885"/>
+            <a:off x="3885334" y="4619385"/>
             <a:ext cx="1346957" cy="206785"/>
           </a:xfrm>
           <a:prstGeom prst="wedgeRoundRectCallout">

</xml_diff>